<commit_message>
adding last pre changes to 6 lection presentation
</commit_message>
<xml_diff>
--- a/lections/cpp_craft_lec_6_pre.pptx
+++ b/lections/cpp_craft_lec_6_pre.pptx
@@ -5,10 +5,10 @@
     <p:sldMasterId id="2147483648" r:id="rId1"/>
   </p:sldMasterIdLst>
   <p:notesMasterIdLst>
-    <p:notesMasterId r:id="rId26"/>
+    <p:notesMasterId r:id="rId39"/>
   </p:notesMasterIdLst>
   <p:handoutMasterIdLst>
-    <p:handoutMasterId r:id="rId27"/>
+    <p:handoutMasterId r:id="rId40"/>
   </p:handoutMasterIdLst>
   <p:sldIdLst>
     <p:sldId id="257" r:id="rId2"/>
@@ -35,6 +35,19 @@
     <p:sldId id="281" r:id="rId23"/>
     <p:sldId id="282" r:id="rId24"/>
     <p:sldId id="283" r:id="rId25"/>
+    <p:sldId id="284" r:id="rId26"/>
+    <p:sldId id="285" r:id="rId27"/>
+    <p:sldId id="286" r:id="rId28"/>
+    <p:sldId id="287" r:id="rId29"/>
+    <p:sldId id="288" r:id="rId30"/>
+    <p:sldId id="289" r:id="rId31"/>
+    <p:sldId id="290" r:id="rId32"/>
+    <p:sldId id="291" r:id="rId33"/>
+    <p:sldId id="292" r:id="rId34"/>
+    <p:sldId id="294" r:id="rId35"/>
+    <p:sldId id="295" r:id="rId36"/>
+    <p:sldId id="296" r:id="rId37"/>
+    <p:sldId id="293" r:id="rId38"/>
   </p:sldIdLst>
   <p:sldSz cx="9144000" cy="6858000" type="screen4x3"/>
   <p:notesSz cx="6858000" cy="9144000"/>
@@ -3333,18 +3346,46 @@
         </dgm:presLayoutVars>
       </dgm:prSet>
       <dgm:spPr/>
+      <dgm:t>
+        <a:bodyPr/>
+        <a:lstStyle/>
+        <a:p>
+          <a:endParaRPr lang="en-US"/>
+        </a:p>
+      </dgm:t>
     </dgm:pt>
     <dgm:pt modelId="{1FFE5E81-10CA-4F12-9075-F13E7877B1BC}" type="pres">
       <dgm:prSet presAssocID="{A551C180-E9A5-4526-B984-26CD9196E7C7}" presName="centerShape" presStyleLbl="node0" presStyleIdx="0" presStyleCnt="1" custScaleX="254862"/>
       <dgm:spPr/>
+      <dgm:t>
+        <a:bodyPr/>
+        <a:lstStyle/>
+        <a:p>
+          <a:endParaRPr lang="en-US"/>
+        </a:p>
+      </dgm:t>
     </dgm:pt>
     <dgm:pt modelId="{D6BE3C65-F1CE-43C8-8B3D-25637D151ED4}" type="pres">
       <dgm:prSet presAssocID="{3E21111D-01F8-4E33-A050-7AE74FEBE91F}" presName="Name9" presStyleLbl="parChTrans1D2" presStyleIdx="0" presStyleCnt="4"/>
       <dgm:spPr/>
+      <dgm:t>
+        <a:bodyPr/>
+        <a:lstStyle/>
+        <a:p>
+          <a:endParaRPr lang="en-US"/>
+        </a:p>
+      </dgm:t>
     </dgm:pt>
     <dgm:pt modelId="{F445C779-85F9-4E4D-80D8-E078A5FC9632}" type="pres">
       <dgm:prSet presAssocID="{3E21111D-01F8-4E33-A050-7AE74FEBE91F}" presName="connTx" presStyleLbl="parChTrans1D2" presStyleIdx="0" presStyleCnt="4"/>
       <dgm:spPr/>
+      <dgm:t>
+        <a:bodyPr/>
+        <a:lstStyle/>
+        <a:p>
+          <a:endParaRPr lang="en-US"/>
+        </a:p>
+      </dgm:t>
     </dgm:pt>
     <dgm:pt modelId="{9B1E4921-8591-4F16-BAB1-F211B63C6944}" type="pres">
       <dgm:prSet presAssocID="{94D3C02B-A90D-44E2-A6EF-69A74F419FE4}" presName="node" presStyleLbl="node1" presStyleIdx="0" presStyleCnt="4" custRadScaleRad="104819">
@@ -3353,14 +3394,35 @@
         </dgm:presLayoutVars>
       </dgm:prSet>
       <dgm:spPr/>
+      <dgm:t>
+        <a:bodyPr/>
+        <a:lstStyle/>
+        <a:p>
+          <a:endParaRPr lang="en-US"/>
+        </a:p>
+      </dgm:t>
     </dgm:pt>
     <dgm:pt modelId="{B91D495E-4980-4F7F-9ABE-8E8A0638E7AE}" type="pres">
       <dgm:prSet presAssocID="{7E6C8925-4D3B-4DF1-8F5D-B262CE1840D5}" presName="Name9" presStyleLbl="parChTrans1D2" presStyleIdx="1" presStyleCnt="4"/>
       <dgm:spPr/>
+      <dgm:t>
+        <a:bodyPr/>
+        <a:lstStyle/>
+        <a:p>
+          <a:endParaRPr lang="en-US"/>
+        </a:p>
+      </dgm:t>
     </dgm:pt>
     <dgm:pt modelId="{62430BA0-D5AD-4E6B-9FA2-5D8680EAD270}" type="pres">
       <dgm:prSet presAssocID="{7E6C8925-4D3B-4DF1-8F5D-B262CE1840D5}" presName="connTx" presStyleLbl="parChTrans1D2" presStyleIdx="1" presStyleCnt="4"/>
       <dgm:spPr/>
+      <dgm:t>
+        <a:bodyPr/>
+        <a:lstStyle/>
+        <a:p>
+          <a:endParaRPr lang="en-US"/>
+        </a:p>
+      </dgm:t>
     </dgm:pt>
     <dgm:pt modelId="{37697121-A71D-4DB0-A438-705405C953F9}" type="pres">
       <dgm:prSet presAssocID="{62D88C9D-5C2F-4926-B30F-B246A50E708E}" presName="node" presStyleLbl="node1" presStyleIdx="1" presStyleCnt="4" custRadScaleRad="201813" custRadScaleInc="184">
@@ -3380,10 +3442,24 @@
     <dgm:pt modelId="{ACBF6EBA-70AD-4BE8-8379-3BD8474B01D9}" type="pres">
       <dgm:prSet presAssocID="{19F5F391-38C5-40AB-B989-DFCED2E163E5}" presName="Name9" presStyleLbl="parChTrans1D2" presStyleIdx="2" presStyleCnt="4"/>
       <dgm:spPr/>
+      <dgm:t>
+        <a:bodyPr/>
+        <a:lstStyle/>
+        <a:p>
+          <a:endParaRPr lang="en-US"/>
+        </a:p>
+      </dgm:t>
     </dgm:pt>
     <dgm:pt modelId="{6844CE33-352E-4612-B734-C7644EFE60C6}" type="pres">
       <dgm:prSet presAssocID="{19F5F391-38C5-40AB-B989-DFCED2E163E5}" presName="connTx" presStyleLbl="parChTrans1D2" presStyleIdx="2" presStyleCnt="4"/>
       <dgm:spPr/>
+      <dgm:t>
+        <a:bodyPr/>
+        <a:lstStyle/>
+        <a:p>
+          <a:endParaRPr lang="en-US"/>
+        </a:p>
+      </dgm:t>
     </dgm:pt>
     <dgm:pt modelId="{03DC4DC3-4958-419D-B29F-042BD6E36997}" type="pres">
       <dgm:prSet presAssocID="{B4F39BC6-58CC-4E14-9B37-3C03092E5BBA}" presName="node" presStyleLbl="node1" presStyleIdx="2" presStyleCnt="4">
@@ -3403,10 +3479,24 @@
     <dgm:pt modelId="{0E385C51-2AEF-4912-BCD2-1E1294FE326E}" type="pres">
       <dgm:prSet presAssocID="{CDA3EBF0-3CE0-4CD4-9E22-10710C89FB2A}" presName="Name9" presStyleLbl="parChTrans1D2" presStyleIdx="3" presStyleCnt="4"/>
       <dgm:spPr/>
+      <dgm:t>
+        <a:bodyPr/>
+        <a:lstStyle/>
+        <a:p>
+          <a:endParaRPr lang="en-US"/>
+        </a:p>
+      </dgm:t>
     </dgm:pt>
     <dgm:pt modelId="{55CD284F-AD82-42B6-A2A7-C8CFD9E0F11D}" type="pres">
       <dgm:prSet presAssocID="{CDA3EBF0-3CE0-4CD4-9E22-10710C89FB2A}" presName="connTx" presStyleLbl="parChTrans1D2" presStyleIdx="3" presStyleCnt="4"/>
       <dgm:spPr/>
+      <dgm:t>
+        <a:bodyPr/>
+        <a:lstStyle/>
+        <a:p>
+          <a:endParaRPr lang="en-US"/>
+        </a:p>
+      </dgm:t>
     </dgm:pt>
     <dgm:pt modelId="{F1294A69-9D2A-463A-A893-2D7BFACE41C0}" type="pres">
       <dgm:prSet presAssocID="{84B91EC6-46B9-4C25-9DB1-6F76B78A667F}" presName="node" presStyleLbl="node1" presStyleIdx="3" presStyleCnt="4" custRadScaleRad="190240" custRadScaleInc="-195">
@@ -3426,8 +3516,8 @@
   </dgm:ptLst>
   <dgm:cxnLst>
     <dgm:cxn modelId="{545A90BD-6B86-427C-9646-8D874A2DB47B}" type="presOf" srcId="{64E3CB31-DB73-4DD5-8F5D-E89C2041476C}" destId="{122C55E3-234A-487C-88EE-3A973A476CD5}" srcOrd="0" destOrd="0" presId="urn:microsoft.com/office/officeart/2005/8/layout/radial1"/>
+    <dgm:cxn modelId="{6AFCB29B-50B5-453C-AEF9-12218EEA9506}" type="presOf" srcId="{CDA3EBF0-3CE0-4CD4-9E22-10710C89FB2A}" destId="{0E385C51-2AEF-4912-BCD2-1E1294FE326E}" srcOrd="0" destOrd="0" presId="urn:microsoft.com/office/officeart/2005/8/layout/radial1"/>
     <dgm:cxn modelId="{1D3FB92D-1C62-41B1-A7F7-BCD65C6EEAD2}" srcId="{64E3CB31-DB73-4DD5-8F5D-E89C2041476C}" destId="{A551C180-E9A5-4526-B984-26CD9196E7C7}" srcOrd="0" destOrd="0" parTransId="{F87D4964-8550-432D-9174-D45F7559AA57}" sibTransId="{83F8559C-1F3E-476C-B22C-397D73E6A1D8}"/>
-    <dgm:cxn modelId="{6AFCB29B-50B5-453C-AEF9-12218EEA9506}" type="presOf" srcId="{CDA3EBF0-3CE0-4CD4-9E22-10710C89FB2A}" destId="{0E385C51-2AEF-4912-BCD2-1E1294FE326E}" srcOrd="0" destOrd="0" presId="urn:microsoft.com/office/officeart/2005/8/layout/radial1"/>
     <dgm:cxn modelId="{B8E17DD5-D501-4B58-837D-0CB2E7C98BE9}" type="presOf" srcId="{7E6C8925-4D3B-4DF1-8F5D-B262CE1840D5}" destId="{62430BA0-D5AD-4E6B-9FA2-5D8680EAD270}" srcOrd="1" destOrd="0" presId="urn:microsoft.com/office/officeart/2005/8/layout/radial1"/>
     <dgm:cxn modelId="{E1DF33FD-C869-4B9D-B2DD-7E75E53F2376}" srcId="{A551C180-E9A5-4526-B984-26CD9196E7C7}" destId="{84B91EC6-46B9-4C25-9DB1-6F76B78A667F}" srcOrd="3" destOrd="0" parTransId="{CDA3EBF0-3CE0-4CD4-9E22-10710C89FB2A}" sibTransId="{84BCE628-9BF8-4B0A-A4C8-A8F72009871F}"/>
     <dgm:cxn modelId="{2A5B5160-AFF5-46EC-AFA8-038659BA2008}" type="presOf" srcId="{A551C180-E9A5-4526-B984-26CD9196E7C7}" destId="{1FFE5E81-10CA-4F12-9075-F13E7877B1BC}" srcOrd="0" destOrd="0" presId="urn:microsoft.com/office/officeart/2005/8/layout/radial1"/>
@@ -3436,12 +3526,12 @@
     <dgm:cxn modelId="{FDC4517B-AC37-4B5D-8D85-6995921AAADB}" type="presOf" srcId="{B4F39BC6-58CC-4E14-9B37-3C03092E5BBA}" destId="{03DC4DC3-4958-419D-B29F-042BD6E36997}" srcOrd="0" destOrd="0" presId="urn:microsoft.com/office/officeart/2005/8/layout/radial1"/>
     <dgm:cxn modelId="{0E1FF51D-4113-4BDD-B4C2-7B9E12327D16}" type="presOf" srcId="{3E21111D-01F8-4E33-A050-7AE74FEBE91F}" destId="{F445C779-85F9-4E4D-80D8-E078A5FC9632}" srcOrd="1" destOrd="0" presId="urn:microsoft.com/office/officeart/2005/8/layout/radial1"/>
     <dgm:cxn modelId="{1840A9F0-4EEA-4288-9C9E-0D01D733978D}" srcId="{A551C180-E9A5-4526-B984-26CD9196E7C7}" destId="{B4F39BC6-58CC-4E14-9B37-3C03092E5BBA}" srcOrd="2" destOrd="0" parTransId="{19F5F391-38C5-40AB-B989-DFCED2E163E5}" sibTransId="{F5968979-2F4D-4C54-9F0B-ECC789299F3C}"/>
+    <dgm:cxn modelId="{7D6A9D2B-0A4E-4F3C-B673-53DC07AE8D40}" type="presOf" srcId="{84B91EC6-46B9-4C25-9DB1-6F76B78A667F}" destId="{F1294A69-9D2A-463A-A893-2D7BFACE41C0}" srcOrd="0" destOrd="0" presId="urn:microsoft.com/office/officeart/2005/8/layout/radial1"/>
     <dgm:cxn modelId="{55AD23F6-1777-43D1-A3ED-9E1943222537}" type="presOf" srcId="{19F5F391-38C5-40AB-B989-DFCED2E163E5}" destId="{6844CE33-352E-4612-B734-C7644EFE60C6}" srcOrd="1" destOrd="0" presId="urn:microsoft.com/office/officeart/2005/8/layout/radial1"/>
-    <dgm:cxn modelId="{7D6A9D2B-0A4E-4F3C-B673-53DC07AE8D40}" type="presOf" srcId="{84B91EC6-46B9-4C25-9DB1-6F76B78A667F}" destId="{F1294A69-9D2A-463A-A893-2D7BFACE41C0}" srcOrd="0" destOrd="0" presId="urn:microsoft.com/office/officeart/2005/8/layout/radial1"/>
     <dgm:cxn modelId="{C2FA8B60-8C9B-4360-A89E-56967DF54C1C}" type="presOf" srcId="{62D88C9D-5C2F-4926-B30F-B246A50E708E}" destId="{37697121-A71D-4DB0-A438-705405C953F9}" srcOrd="0" destOrd="0" presId="urn:microsoft.com/office/officeart/2005/8/layout/radial1"/>
     <dgm:cxn modelId="{1C83E7CB-CB17-4C5F-9EFC-B487EE5FD567}" type="presOf" srcId="{7E6C8925-4D3B-4DF1-8F5D-B262CE1840D5}" destId="{B91D495E-4980-4F7F-9ABE-8E8A0638E7AE}" srcOrd="0" destOrd="0" presId="urn:microsoft.com/office/officeart/2005/8/layout/radial1"/>
+    <dgm:cxn modelId="{7AD9EB19-05A3-4CE9-AF72-A231302B3665}" type="presOf" srcId="{CDA3EBF0-3CE0-4CD4-9E22-10710C89FB2A}" destId="{55CD284F-AD82-42B6-A2A7-C8CFD9E0F11D}" srcOrd="1" destOrd="0" presId="urn:microsoft.com/office/officeart/2005/8/layout/radial1"/>
     <dgm:cxn modelId="{3C68C5E9-D47B-4B22-8E05-10C549762C62}" type="presOf" srcId="{19F5F391-38C5-40AB-B989-DFCED2E163E5}" destId="{ACBF6EBA-70AD-4BE8-8379-3BD8474B01D9}" srcOrd="0" destOrd="0" presId="urn:microsoft.com/office/officeart/2005/8/layout/radial1"/>
-    <dgm:cxn modelId="{7AD9EB19-05A3-4CE9-AF72-A231302B3665}" type="presOf" srcId="{CDA3EBF0-3CE0-4CD4-9E22-10710C89FB2A}" destId="{55CD284F-AD82-42B6-A2A7-C8CFD9E0F11D}" srcOrd="1" destOrd="0" presId="urn:microsoft.com/office/officeart/2005/8/layout/radial1"/>
     <dgm:cxn modelId="{1F7B8323-FB0A-49B7-805E-945D478A331D}" srcId="{A551C180-E9A5-4526-B984-26CD9196E7C7}" destId="{94D3C02B-A90D-44E2-A6EF-69A74F419FE4}" srcOrd="0" destOrd="0" parTransId="{3E21111D-01F8-4E33-A050-7AE74FEBE91F}" sibTransId="{F27925DB-175F-470E-8A29-C25D178396C8}"/>
     <dgm:cxn modelId="{F01AF40D-2365-40CA-999C-BC42CAA4E60F}" srcId="{A551C180-E9A5-4526-B984-26CD9196E7C7}" destId="{62D88C9D-5C2F-4926-B30F-B246A50E708E}" srcOrd="1" destOrd="0" parTransId="{7E6C8925-4D3B-4DF1-8F5D-B262CE1840D5}" sibTransId="{AD614D8F-C3EE-419A-B03B-2C94A9BD1293}"/>
     <dgm:cxn modelId="{F315FFB4-076E-4A36-9915-E2D7BE5118FC}" type="presParOf" srcId="{122C55E3-234A-487C-88EE-3A973A476CD5}" destId="{1FFE5E81-10CA-4F12-9075-F13E7877B1BC}" srcOrd="0" destOrd="0" presId="urn:microsoft.com/office/officeart/2005/8/layout/radial1"/>
@@ -3677,18 +3767,46 @@
         </dgm:presLayoutVars>
       </dgm:prSet>
       <dgm:spPr/>
+      <dgm:t>
+        <a:bodyPr/>
+        <a:lstStyle/>
+        <a:p>
+          <a:endParaRPr lang="en-US"/>
+        </a:p>
+      </dgm:t>
     </dgm:pt>
     <dgm:pt modelId="{7D488BC9-2BBB-44C0-88DC-1EA6BDC413F1}" type="pres">
       <dgm:prSet presAssocID="{0CE5DC7E-3B50-46AA-BAAB-AF461EFC327E}" presName="centerShape" presStyleLbl="node0" presStyleIdx="0" presStyleCnt="1"/>
       <dgm:spPr/>
+      <dgm:t>
+        <a:bodyPr/>
+        <a:lstStyle/>
+        <a:p>
+          <a:endParaRPr lang="en-US"/>
+        </a:p>
+      </dgm:t>
     </dgm:pt>
     <dgm:pt modelId="{2E5FB230-9B38-4AE6-99D9-657FBAC5641E}" type="pres">
       <dgm:prSet presAssocID="{5669ADCA-6265-48B0-AAE4-7EE222476E7A}" presName="Name9" presStyleLbl="parChTrans1D2" presStyleIdx="0" presStyleCnt="4"/>
       <dgm:spPr/>
+      <dgm:t>
+        <a:bodyPr/>
+        <a:lstStyle/>
+        <a:p>
+          <a:endParaRPr lang="en-US"/>
+        </a:p>
+      </dgm:t>
     </dgm:pt>
     <dgm:pt modelId="{9A07C9F0-428E-40AE-9442-4A9094BC2C31}" type="pres">
       <dgm:prSet presAssocID="{5669ADCA-6265-48B0-AAE4-7EE222476E7A}" presName="connTx" presStyleLbl="parChTrans1D2" presStyleIdx="0" presStyleCnt="4"/>
       <dgm:spPr/>
+      <dgm:t>
+        <a:bodyPr/>
+        <a:lstStyle/>
+        <a:p>
+          <a:endParaRPr lang="en-US"/>
+        </a:p>
+      </dgm:t>
     </dgm:pt>
     <dgm:pt modelId="{A2C5A60F-D791-4C1A-816B-91F872D942A7}" type="pres">
       <dgm:prSet presAssocID="{019B1368-E6F4-4DF8-9621-555C5F9EE990}" presName="node" presStyleLbl="node1" presStyleIdx="0" presStyleCnt="4">
@@ -3708,10 +3826,24 @@
     <dgm:pt modelId="{C30C7988-2979-4C57-B581-35357835163B}" type="pres">
       <dgm:prSet presAssocID="{CAD08196-8BC3-4DBF-B125-2D4B693BDDBB}" presName="Name9" presStyleLbl="parChTrans1D2" presStyleIdx="1" presStyleCnt="4"/>
       <dgm:spPr/>
+      <dgm:t>
+        <a:bodyPr/>
+        <a:lstStyle/>
+        <a:p>
+          <a:endParaRPr lang="en-US"/>
+        </a:p>
+      </dgm:t>
     </dgm:pt>
     <dgm:pt modelId="{F063716C-8404-4D5B-A837-BD1F893E75FA}" type="pres">
       <dgm:prSet presAssocID="{CAD08196-8BC3-4DBF-B125-2D4B693BDDBB}" presName="connTx" presStyleLbl="parChTrans1D2" presStyleIdx="1" presStyleCnt="4"/>
       <dgm:spPr/>
+      <dgm:t>
+        <a:bodyPr/>
+        <a:lstStyle/>
+        <a:p>
+          <a:endParaRPr lang="en-US"/>
+        </a:p>
+      </dgm:t>
     </dgm:pt>
     <dgm:pt modelId="{99CED985-6BDC-4D37-841D-8F65DC045BAF}" type="pres">
       <dgm:prSet presAssocID="{4F950967-BFB5-4DE4-B23B-4026F60CCE62}" presName="node" presStyleLbl="node1" presStyleIdx="1" presStyleCnt="4">
@@ -3720,14 +3852,35 @@
         </dgm:presLayoutVars>
       </dgm:prSet>
       <dgm:spPr/>
+      <dgm:t>
+        <a:bodyPr/>
+        <a:lstStyle/>
+        <a:p>
+          <a:endParaRPr lang="en-US"/>
+        </a:p>
+      </dgm:t>
     </dgm:pt>
     <dgm:pt modelId="{D2344716-D425-4725-9ADA-3C3F2B8F5B71}" type="pres">
       <dgm:prSet presAssocID="{90C679C3-821B-4DBF-8EEF-9D2C692B59E5}" presName="Name9" presStyleLbl="parChTrans1D2" presStyleIdx="2" presStyleCnt="4"/>
       <dgm:spPr/>
+      <dgm:t>
+        <a:bodyPr/>
+        <a:lstStyle/>
+        <a:p>
+          <a:endParaRPr lang="en-US"/>
+        </a:p>
+      </dgm:t>
     </dgm:pt>
     <dgm:pt modelId="{967A94A9-73FA-40F9-89C8-B5AE358A32F4}" type="pres">
       <dgm:prSet presAssocID="{90C679C3-821B-4DBF-8EEF-9D2C692B59E5}" presName="connTx" presStyleLbl="parChTrans1D2" presStyleIdx="2" presStyleCnt="4"/>
       <dgm:spPr/>
+      <dgm:t>
+        <a:bodyPr/>
+        <a:lstStyle/>
+        <a:p>
+          <a:endParaRPr lang="en-US"/>
+        </a:p>
+      </dgm:t>
     </dgm:pt>
     <dgm:pt modelId="{66D10175-255D-498D-BD6D-B9BAA7FD37AB}" type="pres">
       <dgm:prSet presAssocID="{A8876980-0D3C-4AFF-8E3C-F288E6B92630}" presName="node" presStyleLbl="node1" presStyleIdx="2" presStyleCnt="4">
@@ -3736,14 +3889,35 @@
         </dgm:presLayoutVars>
       </dgm:prSet>
       <dgm:spPr/>
+      <dgm:t>
+        <a:bodyPr/>
+        <a:lstStyle/>
+        <a:p>
+          <a:endParaRPr lang="en-US"/>
+        </a:p>
+      </dgm:t>
     </dgm:pt>
     <dgm:pt modelId="{1DAD54D3-327E-4B05-93BC-91EAE64E75C6}" type="pres">
       <dgm:prSet presAssocID="{F9451152-7757-40FA-8C16-D12CE1D31D6F}" presName="Name9" presStyleLbl="parChTrans1D2" presStyleIdx="3" presStyleCnt="4"/>
       <dgm:spPr/>
+      <dgm:t>
+        <a:bodyPr/>
+        <a:lstStyle/>
+        <a:p>
+          <a:endParaRPr lang="en-US"/>
+        </a:p>
+      </dgm:t>
     </dgm:pt>
     <dgm:pt modelId="{705AF114-2BA3-457C-A7CB-774BB7710DF3}" type="pres">
       <dgm:prSet presAssocID="{F9451152-7757-40FA-8C16-D12CE1D31D6F}" presName="connTx" presStyleLbl="parChTrans1D2" presStyleIdx="3" presStyleCnt="4"/>
       <dgm:spPr/>
+      <dgm:t>
+        <a:bodyPr/>
+        <a:lstStyle/>
+        <a:p>
+          <a:endParaRPr lang="en-US"/>
+        </a:p>
+      </dgm:t>
     </dgm:pt>
     <dgm:pt modelId="{2564DC54-0DF8-438E-97B9-FF09A10AF132}" type="pres">
       <dgm:prSet presAssocID="{25822CC7-8E32-4656-A8FE-CFA44817416C}" presName="node" presStyleLbl="node1" presStyleIdx="3" presStyleCnt="4">
@@ -3752,6 +3926,13 @@
         </dgm:presLayoutVars>
       </dgm:prSet>
       <dgm:spPr/>
+      <dgm:t>
+        <a:bodyPr/>
+        <a:lstStyle/>
+        <a:p>
+          <a:endParaRPr lang="en-US"/>
+        </a:p>
+      </dgm:t>
     </dgm:pt>
   </dgm:ptLst>
   <dgm:cxnLst>
@@ -3766,8 +3947,8 @@
     <dgm:cxn modelId="{501BE206-A2F6-4ECB-9731-39CA6C8814E5}" type="presOf" srcId="{CAD08196-8BC3-4DBF-B125-2D4B693BDDBB}" destId="{C30C7988-2979-4C57-B581-35357835163B}" srcOrd="0" destOrd="0" presId="urn:microsoft.com/office/officeart/2005/8/layout/radial1"/>
     <dgm:cxn modelId="{CD531DF6-4F67-41A9-8BB0-7AF6B66AB0B1}" type="presOf" srcId="{25822CC7-8E32-4656-A8FE-CFA44817416C}" destId="{2564DC54-0DF8-438E-97B9-FF09A10AF132}" srcOrd="0" destOrd="0" presId="urn:microsoft.com/office/officeart/2005/8/layout/radial1"/>
     <dgm:cxn modelId="{09F32188-60F4-49C7-A3D5-6BE4BE3C92A8}" type="presOf" srcId="{0CE5DC7E-3B50-46AA-BAAB-AF461EFC327E}" destId="{7D488BC9-2BBB-44C0-88DC-1EA6BDC413F1}" srcOrd="0" destOrd="0" presId="urn:microsoft.com/office/officeart/2005/8/layout/radial1"/>
+    <dgm:cxn modelId="{CCE10DF9-CA0A-4263-BD2C-F56E1F4299D5}" type="presOf" srcId="{59CB8A36-F376-4C3E-8AD1-7FC64692B5B7}" destId="{BD5AD237-31A9-4EEE-A0FF-DCDF4A467B31}" srcOrd="0" destOrd="0" presId="urn:microsoft.com/office/officeart/2005/8/layout/radial1"/>
     <dgm:cxn modelId="{F21DF75B-619D-4BFA-9BEE-EF6D8A4F155D}" type="presOf" srcId="{5669ADCA-6265-48B0-AAE4-7EE222476E7A}" destId="{2E5FB230-9B38-4AE6-99D9-657FBAC5641E}" srcOrd="0" destOrd="0" presId="urn:microsoft.com/office/officeart/2005/8/layout/radial1"/>
-    <dgm:cxn modelId="{CCE10DF9-CA0A-4263-BD2C-F56E1F4299D5}" type="presOf" srcId="{59CB8A36-F376-4C3E-8AD1-7FC64692B5B7}" destId="{BD5AD237-31A9-4EEE-A0FF-DCDF4A467B31}" srcOrd="0" destOrd="0" presId="urn:microsoft.com/office/officeart/2005/8/layout/radial1"/>
     <dgm:cxn modelId="{7506477F-9F87-41F9-86A8-A7E37FBE277D}" type="presOf" srcId="{4F950967-BFB5-4DE4-B23B-4026F60CCE62}" destId="{99CED985-6BDC-4D37-841D-8F65DC045BAF}" srcOrd="0" destOrd="0" presId="urn:microsoft.com/office/officeart/2005/8/layout/radial1"/>
     <dgm:cxn modelId="{A2FFF121-727D-4599-9F54-A31FB518AB0F}" type="presOf" srcId="{F9451152-7757-40FA-8C16-D12CE1D31D6F}" destId="{705AF114-2BA3-457C-A7CB-774BB7710DF3}" srcOrd="1" destOrd="0" presId="urn:microsoft.com/office/officeart/2005/8/layout/radial1"/>
     <dgm:cxn modelId="{D2AB469B-5A30-40D3-AB10-1649EA1F2475}" srcId="{0CE5DC7E-3B50-46AA-BAAB-AF461EFC327E}" destId="{4F950967-BFB5-4DE4-B23B-4026F60CCE62}" srcOrd="1" destOrd="0" parTransId="{CAD08196-8BC3-4DBF-B125-2D4B693BDDBB}" sibTransId="{362CF62E-12E0-4014-8944-BC92DB0B9E99}"/>
@@ -4007,18 +4188,46 @@
         </dgm:presLayoutVars>
       </dgm:prSet>
       <dgm:spPr/>
+      <dgm:t>
+        <a:bodyPr/>
+        <a:lstStyle/>
+        <a:p>
+          <a:endParaRPr lang="en-US"/>
+        </a:p>
+      </dgm:t>
     </dgm:pt>
     <dgm:pt modelId="{7D488BC9-2BBB-44C0-88DC-1EA6BDC413F1}" type="pres">
       <dgm:prSet presAssocID="{0CE5DC7E-3B50-46AA-BAAB-AF461EFC327E}" presName="centerShape" presStyleLbl="node0" presStyleIdx="0" presStyleCnt="1"/>
       <dgm:spPr/>
+      <dgm:t>
+        <a:bodyPr/>
+        <a:lstStyle/>
+        <a:p>
+          <a:endParaRPr lang="en-US"/>
+        </a:p>
+      </dgm:t>
     </dgm:pt>
     <dgm:pt modelId="{2E5FB230-9B38-4AE6-99D9-657FBAC5641E}" type="pres">
       <dgm:prSet presAssocID="{5669ADCA-6265-48B0-AAE4-7EE222476E7A}" presName="Name9" presStyleLbl="parChTrans1D2" presStyleIdx="0" presStyleCnt="4"/>
       <dgm:spPr/>
+      <dgm:t>
+        <a:bodyPr/>
+        <a:lstStyle/>
+        <a:p>
+          <a:endParaRPr lang="en-US"/>
+        </a:p>
+      </dgm:t>
     </dgm:pt>
     <dgm:pt modelId="{9A07C9F0-428E-40AE-9442-4A9094BC2C31}" type="pres">
       <dgm:prSet presAssocID="{5669ADCA-6265-48B0-AAE4-7EE222476E7A}" presName="connTx" presStyleLbl="parChTrans1D2" presStyleIdx="0" presStyleCnt="4"/>
       <dgm:spPr/>
+      <dgm:t>
+        <a:bodyPr/>
+        <a:lstStyle/>
+        <a:p>
+          <a:endParaRPr lang="en-US"/>
+        </a:p>
+      </dgm:t>
     </dgm:pt>
     <dgm:pt modelId="{A2C5A60F-D791-4C1A-816B-91F872D942A7}" type="pres">
       <dgm:prSet presAssocID="{019B1368-E6F4-4DF8-9621-555C5F9EE990}" presName="node" presStyleLbl="node1" presStyleIdx="0" presStyleCnt="4">
@@ -4038,10 +4247,24 @@
     <dgm:pt modelId="{C30C7988-2979-4C57-B581-35357835163B}" type="pres">
       <dgm:prSet presAssocID="{CAD08196-8BC3-4DBF-B125-2D4B693BDDBB}" presName="Name9" presStyleLbl="parChTrans1D2" presStyleIdx="1" presStyleCnt="4"/>
       <dgm:spPr/>
+      <dgm:t>
+        <a:bodyPr/>
+        <a:lstStyle/>
+        <a:p>
+          <a:endParaRPr lang="en-US"/>
+        </a:p>
+      </dgm:t>
     </dgm:pt>
     <dgm:pt modelId="{F063716C-8404-4D5B-A837-BD1F893E75FA}" type="pres">
       <dgm:prSet presAssocID="{CAD08196-8BC3-4DBF-B125-2D4B693BDDBB}" presName="connTx" presStyleLbl="parChTrans1D2" presStyleIdx="1" presStyleCnt="4"/>
       <dgm:spPr/>
+      <dgm:t>
+        <a:bodyPr/>
+        <a:lstStyle/>
+        <a:p>
+          <a:endParaRPr lang="en-US"/>
+        </a:p>
+      </dgm:t>
     </dgm:pt>
     <dgm:pt modelId="{99CED985-6BDC-4D37-841D-8F65DC045BAF}" type="pres">
       <dgm:prSet presAssocID="{4F950967-BFB5-4DE4-B23B-4026F60CCE62}" presName="node" presStyleLbl="node1" presStyleIdx="1" presStyleCnt="4">
@@ -4050,14 +4273,35 @@
         </dgm:presLayoutVars>
       </dgm:prSet>
       <dgm:spPr/>
+      <dgm:t>
+        <a:bodyPr/>
+        <a:lstStyle/>
+        <a:p>
+          <a:endParaRPr lang="en-US"/>
+        </a:p>
+      </dgm:t>
     </dgm:pt>
     <dgm:pt modelId="{D2344716-D425-4725-9ADA-3C3F2B8F5B71}" type="pres">
       <dgm:prSet presAssocID="{90C679C3-821B-4DBF-8EEF-9D2C692B59E5}" presName="Name9" presStyleLbl="parChTrans1D2" presStyleIdx="2" presStyleCnt="4"/>
       <dgm:spPr/>
+      <dgm:t>
+        <a:bodyPr/>
+        <a:lstStyle/>
+        <a:p>
+          <a:endParaRPr lang="en-US"/>
+        </a:p>
+      </dgm:t>
     </dgm:pt>
     <dgm:pt modelId="{967A94A9-73FA-40F9-89C8-B5AE358A32F4}" type="pres">
       <dgm:prSet presAssocID="{90C679C3-821B-4DBF-8EEF-9D2C692B59E5}" presName="connTx" presStyleLbl="parChTrans1D2" presStyleIdx="2" presStyleCnt="4"/>
       <dgm:spPr/>
+      <dgm:t>
+        <a:bodyPr/>
+        <a:lstStyle/>
+        <a:p>
+          <a:endParaRPr lang="en-US"/>
+        </a:p>
+      </dgm:t>
     </dgm:pt>
     <dgm:pt modelId="{66D10175-255D-498D-BD6D-B9BAA7FD37AB}" type="pres">
       <dgm:prSet presAssocID="{A8876980-0D3C-4AFF-8E3C-F288E6B92630}" presName="node" presStyleLbl="node1" presStyleIdx="2" presStyleCnt="4">
@@ -4066,14 +4310,35 @@
         </dgm:presLayoutVars>
       </dgm:prSet>
       <dgm:spPr/>
+      <dgm:t>
+        <a:bodyPr/>
+        <a:lstStyle/>
+        <a:p>
+          <a:endParaRPr lang="en-US"/>
+        </a:p>
+      </dgm:t>
     </dgm:pt>
     <dgm:pt modelId="{1DAD54D3-327E-4B05-93BC-91EAE64E75C6}" type="pres">
       <dgm:prSet presAssocID="{F9451152-7757-40FA-8C16-D12CE1D31D6F}" presName="Name9" presStyleLbl="parChTrans1D2" presStyleIdx="3" presStyleCnt="4"/>
       <dgm:spPr/>
+      <dgm:t>
+        <a:bodyPr/>
+        <a:lstStyle/>
+        <a:p>
+          <a:endParaRPr lang="en-US"/>
+        </a:p>
+      </dgm:t>
     </dgm:pt>
     <dgm:pt modelId="{705AF114-2BA3-457C-A7CB-774BB7710DF3}" type="pres">
       <dgm:prSet presAssocID="{F9451152-7757-40FA-8C16-D12CE1D31D6F}" presName="connTx" presStyleLbl="parChTrans1D2" presStyleIdx="3" presStyleCnt="4"/>
       <dgm:spPr/>
+      <dgm:t>
+        <a:bodyPr/>
+        <a:lstStyle/>
+        <a:p>
+          <a:endParaRPr lang="en-US"/>
+        </a:p>
+      </dgm:t>
     </dgm:pt>
     <dgm:pt modelId="{2564DC54-0DF8-438E-97B9-FF09A10AF132}" type="pres">
       <dgm:prSet presAssocID="{25822CC7-8E32-4656-A8FE-CFA44817416C}" presName="node" presStyleLbl="node1" presStyleIdx="3" presStyleCnt="4">
@@ -4082,6 +4347,13 @@
         </dgm:presLayoutVars>
       </dgm:prSet>
       <dgm:spPr/>
+      <dgm:t>
+        <a:bodyPr/>
+        <a:lstStyle/>
+        <a:p>
+          <a:endParaRPr lang="en-US"/>
+        </a:p>
+      </dgm:t>
     </dgm:pt>
   </dgm:ptLst>
   <dgm:cxnLst>
@@ -4097,8 +4369,8 @@
     <dgm:cxn modelId="{4D14F367-6D43-4310-8D7F-EC6CECB7FA52}" type="presOf" srcId="{CAD08196-8BC3-4DBF-B125-2D4B693BDDBB}" destId="{F063716C-8404-4D5B-A837-BD1F893E75FA}" srcOrd="1" destOrd="0" presId="urn:microsoft.com/office/officeart/2005/8/layout/radial1"/>
     <dgm:cxn modelId="{A4F90AC7-FFFF-45DA-8C15-D9F2981B1C3B}" type="presOf" srcId="{4F950967-BFB5-4DE4-B23B-4026F60CCE62}" destId="{99CED985-6BDC-4D37-841D-8F65DC045BAF}" srcOrd="0" destOrd="0" presId="urn:microsoft.com/office/officeart/2005/8/layout/radial1"/>
     <dgm:cxn modelId="{456D7091-FE69-45E8-A353-E89F43725A3F}" type="presOf" srcId="{5669ADCA-6265-48B0-AAE4-7EE222476E7A}" destId="{9A07C9F0-428E-40AE-9442-4A9094BC2C31}" srcOrd="1" destOrd="0" presId="urn:microsoft.com/office/officeart/2005/8/layout/radial1"/>
+    <dgm:cxn modelId="{C142262E-E61E-4F9C-B89E-853F27F3A60B}" type="presOf" srcId="{F9451152-7757-40FA-8C16-D12CE1D31D6F}" destId="{705AF114-2BA3-457C-A7CB-774BB7710DF3}" srcOrd="1" destOrd="0" presId="urn:microsoft.com/office/officeart/2005/8/layout/radial1"/>
     <dgm:cxn modelId="{1452B8A4-320B-4DE5-936A-E184289B4842}" type="presOf" srcId="{019B1368-E6F4-4DF8-9621-555C5F9EE990}" destId="{A2C5A60F-D791-4C1A-816B-91F872D942A7}" srcOrd="0" destOrd="0" presId="urn:microsoft.com/office/officeart/2005/8/layout/radial1"/>
-    <dgm:cxn modelId="{C142262E-E61E-4F9C-B89E-853F27F3A60B}" type="presOf" srcId="{F9451152-7757-40FA-8C16-D12CE1D31D6F}" destId="{705AF114-2BA3-457C-A7CB-774BB7710DF3}" srcOrd="1" destOrd="0" presId="urn:microsoft.com/office/officeart/2005/8/layout/radial1"/>
     <dgm:cxn modelId="{B760B4AE-6DEC-4C83-8C8D-E98AB9849242}" type="presOf" srcId="{CAD08196-8BC3-4DBF-B125-2D4B693BDDBB}" destId="{C30C7988-2979-4C57-B581-35357835163B}" srcOrd="0" destOrd="0" presId="urn:microsoft.com/office/officeart/2005/8/layout/radial1"/>
     <dgm:cxn modelId="{529E0986-EC39-487A-BBB8-A8CB56D7882C}" type="presOf" srcId="{59CB8A36-F376-4C3E-8AD1-7FC64692B5B7}" destId="{BD5AD237-31A9-4EEE-A0FF-DCDF4A467B31}" srcOrd="0" destOrd="0" presId="urn:microsoft.com/office/officeart/2005/8/layout/radial1"/>
     <dgm:cxn modelId="{C44101BC-BC17-4E85-AEFF-E00652D5839C}" type="presOf" srcId="{5669ADCA-6265-48B0-AAE4-7EE222476E7A}" destId="{2E5FB230-9B38-4AE6-99D9-657FBAC5641E}" srcOrd="0" destOrd="0" presId="urn:microsoft.com/office/officeart/2005/8/layout/radial1"/>
@@ -4337,18 +4609,46 @@
         </dgm:presLayoutVars>
       </dgm:prSet>
       <dgm:spPr/>
+      <dgm:t>
+        <a:bodyPr/>
+        <a:lstStyle/>
+        <a:p>
+          <a:endParaRPr lang="en-US"/>
+        </a:p>
+      </dgm:t>
     </dgm:pt>
     <dgm:pt modelId="{7D488BC9-2BBB-44C0-88DC-1EA6BDC413F1}" type="pres">
       <dgm:prSet presAssocID="{0CE5DC7E-3B50-46AA-BAAB-AF461EFC327E}" presName="centerShape" presStyleLbl="node0" presStyleIdx="0" presStyleCnt="1"/>
       <dgm:spPr/>
+      <dgm:t>
+        <a:bodyPr/>
+        <a:lstStyle/>
+        <a:p>
+          <a:endParaRPr lang="en-US"/>
+        </a:p>
+      </dgm:t>
     </dgm:pt>
     <dgm:pt modelId="{2E5FB230-9B38-4AE6-99D9-657FBAC5641E}" type="pres">
       <dgm:prSet presAssocID="{5669ADCA-6265-48B0-AAE4-7EE222476E7A}" presName="Name9" presStyleLbl="parChTrans1D2" presStyleIdx="0" presStyleCnt="4"/>
       <dgm:spPr/>
+      <dgm:t>
+        <a:bodyPr/>
+        <a:lstStyle/>
+        <a:p>
+          <a:endParaRPr lang="en-US"/>
+        </a:p>
+      </dgm:t>
     </dgm:pt>
     <dgm:pt modelId="{9A07C9F0-428E-40AE-9442-4A9094BC2C31}" type="pres">
       <dgm:prSet presAssocID="{5669ADCA-6265-48B0-AAE4-7EE222476E7A}" presName="connTx" presStyleLbl="parChTrans1D2" presStyleIdx="0" presStyleCnt="4"/>
       <dgm:spPr/>
+      <dgm:t>
+        <a:bodyPr/>
+        <a:lstStyle/>
+        <a:p>
+          <a:endParaRPr lang="en-US"/>
+        </a:p>
+      </dgm:t>
     </dgm:pt>
     <dgm:pt modelId="{A2C5A60F-D791-4C1A-816B-91F872D942A7}" type="pres">
       <dgm:prSet presAssocID="{019B1368-E6F4-4DF8-9621-555C5F9EE990}" presName="node" presStyleLbl="node1" presStyleIdx="0" presStyleCnt="4">
@@ -4368,10 +4668,24 @@
     <dgm:pt modelId="{C30C7988-2979-4C57-B581-35357835163B}" type="pres">
       <dgm:prSet presAssocID="{CAD08196-8BC3-4DBF-B125-2D4B693BDDBB}" presName="Name9" presStyleLbl="parChTrans1D2" presStyleIdx="1" presStyleCnt="4"/>
       <dgm:spPr/>
+      <dgm:t>
+        <a:bodyPr/>
+        <a:lstStyle/>
+        <a:p>
+          <a:endParaRPr lang="en-US"/>
+        </a:p>
+      </dgm:t>
     </dgm:pt>
     <dgm:pt modelId="{F063716C-8404-4D5B-A837-BD1F893E75FA}" type="pres">
       <dgm:prSet presAssocID="{CAD08196-8BC3-4DBF-B125-2D4B693BDDBB}" presName="connTx" presStyleLbl="parChTrans1D2" presStyleIdx="1" presStyleCnt="4"/>
       <dgm:spPr/>
+      <dgm:t>
+        <a:bodyPr/>
+        <a:lstStyle/>
+        <a:p>
+          <a:endParaRPr lang="en-US"/>
+        </a:p>
+      </dgm:t>
     </dgm:pt>
     <dgm:pt modelId="{99CED985-6BDC-4D37-841D-8F65DC045BAF}" type="pres">
       <dgm:prSet presAssocID="{4F950967-BFB5-4DE4-B23B-4026F60CCE62}" presName="node" presStyleLbl="node1" presStyleIdx="1" presStyleCnt="4">
@@ -4380,14 +4694,35 @@
         </dgm:presLayoutVars>
       </dgm:prSet>
       <dgm:spPr/>
+      <dgm:t>
+        <a:bodyPr/>
+        <a:lstStyle/>
+        <a:p>
+          <a:endParaRPr lang="en-US"/>
+        </a:p>
+      </dgm:t>
     </dgm:pt>
     <dgm:pt modelId="{D2344716-D425-4725-9ADA-3C3F2B8F5B71}" type="pres">
       <dgm:prSet presAssocID="{90C679C3-821B-4DBF-8EEF-9D2C692B59E5}" presName="Name9" presStyleLbl="parChTrans1D2" presStyleIdx="2" presStyleCnt="4"/>
       <dgm:spPr/>
+      <dgm:t>
+        <a:bodyPr/>
+        <a:lstStyle/>
+        <a:p>
+          <a:endParaRPr lang="en-US"/>
+        </a:p>
+      </dgm:t>
     </dgm:pt>
     <dgm:pt modelId="{967A94A9-73FA-40F9-89C8-B5AE358A32F4}" type="pres">
       <dgm:prSet presAssocID="{90C679C3-821B-4DBF-8EEF-9D2C692B59E5}" presName="connTx" presStyleLbl="parChTrans1D2" presStyleIdx="2" presStyleCnt="4"/>
       <dgm:spPr/>
+      <dgm:t>
+        <a:bodyPr/>
+        <a:lstStyle/>
+        <a:p>
+          <a:endParaRPr lang="en-US"/>
+        </a:p>
+      </dgm:t>
     </dgm:pt>
     <dgm:pt modelId="{66D10175-255D-498D-BD6D-B9BAA7FD37AB}" type="pres">
       <dgm:prSet presAssocID="{A8876980-0D3C-4AFF-8E3C-F288E6B92630}" presName="node" presStyleLbl="node1" presStyleIdx="2" presStyleCnt="4">
@@ -4396,14 +4731,35 @@
         </dgm:presLayoutVars>
       </dgm:prSet>
       <dgm:spPr/>
+      <dgm:t>
+        <a:bodyPr/>
+        <a:lstStyle/>
+        <a:p>
+          <a:endParaRPr lang="en-US"/>
+        </a:p>
+      </dgm:t>
     </dgm:pt>
     <dgm:pt modelId="{1DAD54D3-327E-4B05-93BC-91EAE64E75C6}" type="pres">
       <dgm:prSet presAssocID="{F9451152-7757-40FA-8C16-D12CE1D31D6F}" presName="Name9" presStyleLbl="parChTrans1D2" presStyleIdx="3" presStyleCnt="4"/>
       <dgm:spPr/>
+      <dgm:t>
+        <a:bodyPr/>
+        <a:lstStyle/>
+        <a:p>
+          <a:endParaRPr lang="en-US"/>
+        </a:p>
+      </dgm:t>
     </dgm:pt>
     <dgm:pt modelId="{705AF114-2BA3-457C-A7CB-774BB7710DF3}" type="pres">
       <dgm:prSet presAssocID="{F9451152-7757-40FA-8C16-D12CE1D31D6F}" presName="connTx" presStyleLbl="parChTrans1D2" presStyleIdx="3" presStyleCnt="4"/>
       <dgm:spPr/>
+      <dgm:t>
+        <a:bodyPr/>
+        <a:lstStyle/>
+        <a:p>
+          <a:endParaRPr lang="en-US"/>
+        </a:p>
+      </dgm:t>
     </dgm:pt>
     <dgm:pt modelId="{2564DC54-0DF8-438E-97B9-FF09A10AF132}" type="pres">
       <dgm:prSet presAssocID="{25822CC7-8E32-4656-A8FE-CFA44817416C}" presName="node" presStyleLbl="node1" presStyleIdx="3" presStyleCnt="4">
@@ -4412,6 +4768,13 @@
         </dgm:presLayoutVars>
       </dgm:prSet>
       <dgm:spPr/>
+      <dgm:t>
+        <a:bodyPr/>
+        <a:lstStyle/>
+        <a:p>
+          <a:endParaRPr lang="en-US"/>
+        </a:p>
+      </dgm:t>
     </dgm:pt>
   </dgm:ptLst>
   <dgm:cxnLst>
@@ -4422,12 +4785,12 @@
     <dgm:cxn modelId="{A66F4884-0D54-4A2C-970B-34A607092567}" type="presOf" srcId="{25822CC7-8E32-4656-A8FE-CFA44817416C}" destId="{2564DC54-0DF8-438E-97B9-FF09A10AF132}" srcOrd="0" destOrd="0" presId="urn:microsoft.com/office/officeart/2005/8/layout/radial1"/>
     <dgm:cxn modelId="{CD6B0060-C978-40F0-90CC-8BD120313734}" srcId="{0CE5DC7E-3B50-46AA-BAAB-AF461EFC327E}" destId="{019B1368-E6F4-4DF8-9621-555C5F9EE990}" srcOrd="0" destOrd="0" parTransId="{5669ADCA-6265-48B0-AAE4-7EE222476E7A}" sibTransId="{08D6BC18-1FBC-4242-883F-71037B0CD7CC}"/>
     <dgm:cxn modelId="{4359B551-DB81-46C5-A2C1-A984355C6E3F}" type="presOf" srcId="{5669ADCA-6265-48B0-AAE4-7EE222476E7A}" destId="{2E5FB230-9B38-4AE6-99D9-657FBAC5641E}" srcOrd="0" destOrd="0" presId="urn:microsoft.com/office/officeart/2005/8/layout/radial1"/>
+    <dgm:cxn modelId="{DF8C1CA6-0BF0-43DA-A3F1-1212CB7E209F}" type="presOf" srcId="{59CB8A36-F376-4C3E-8AD1-7FC64692B5B7}" destId="{BD5AD237-31A9-4EEE-A0FF-DCDF4A467B31}" srcOrd="0" destOrd="0" presId="urn:microsoft.com/office/officeart/2005/8/layout/radial1"/>
     <dgm:cxn modelId="{FA83465B-1E11-4653-80C2-C3C3797A6B2D}" type="presOf" srcId="{019B1368-E6F4-4DF8-9621-555C5F9EE990}" destId="{A2C5A60F-D791-4C1A-816B-91F872D942A7}" srcOrd="0" destOrd="0" presId="urn:microsoft.com/office/officeart/2005/8/layout/radial1"/>
-    <dgm:cxn modelId="{DF8C1CA6-0BF0-43DA-A3F1-1212CB7E209F}" type="presOf" srcId="{59CB8A36-F376-4C3E-8AD1-7FC64692B5B7}" destId="{BD5AD237-31A9-4EEE-A0FF-DCDF4A467B31}" srcOrd="0" destOrd="0" presId="urn:microsoft.com/office/officeart/2005/8/layout/radial1"/>
     <dgm:cxn modelId="{7869CB28-45A6-43B4-BB5D-F245C4BF963B}" type="presOf" srcId="{90C679C3-821B-4DBF-8EEF-9D2C692B59E5}" destId="{967A94A9-73FA-40F9-89C8-B5AE358A32F4}" srcOrd="1" destOrd="0" presId="urn:microsoft.com/office/officeart/2005/8/layout/radial1"/>
     <dgm:cxn modelId="{E3FA1790-FA4D-4167-AA25-0891AB404F3A}" type="presOf" srcId="{CAD08196-8BC3-4DBF-B125-2D4B693BDDBB}" destId="{C30C7988-2979-4C57-B581-35357835163B}" srcOrd="0" destOrd="0" presId="urn:microsoft.com/office/officeart/2005/8/layout/radial1"/>
+    <dgm:cxn modelId="{4A712DD0-4385-43FE-A0AF-A07809F596E1}" type="presOf" srcId="{F9451152-7757-40FA-8C16-D12CE1D31D6F}" destId="{705AF114-2BA3-457C-A7CB-774BB7710DF3}" srcOrd="1" destOrd="0" presId="urn:microsoft.com/office/officeart/2005/8/layout/radial1"/>
     <dgm:cxn modelId="{0729C1C2-33F1-4ABD-867D-F83D0589063B}" type="presOf" srcId="{CAD08196-8BC3-4DBF-B125-2D4B693BDDBB}" destId="{F063716C-8404-4D5B-A837-BD1F893E75FA}" srcOrd="1" destOrd="0" presId="urn:microsoft.com/office/officeart/2005/8/layout/radial1"/>
-    <dgm:cxn modelId="{4A712DD0-4385-43FE-A0AF-A07809F596E1}" type="presOf" srcId="{F9451152-7757-40FA-8C16-D12CE1D31D6F}" destId="{705AF114-2BA3-457C-A7CB-774BB7710DF3}" srcOrd="1" destOrd="0" presId="urn:microsoft.com/office/officeart/2005/8/layout/radial1"/>
     <dgm:cxn modelId="{7AD31985-A264-4B78-A7E1-CDECCB36B457}" type="presOf" srcId="{4F950967-BFB5-4DE4-B23B-4026F60CCE62}" destId="{99CED985-6BDC-4D37-841D-8F65DC045BAF}" srcOrd="0" destOrd="0" presId="urn:microsoft.com/office/officeart/2005/8/layout/radial1"/>
     <dgm:cxn modelId="{86E66430-4C1C-4F96-BDAE-DB01F494BEC9}" type="presOf" srcId="{0CE5DC7E-3B50-46AA-BAAB-AF461EFC327E}" destId="{7D488BC9-2BBB-44C0-88DC-1EA6BDC413F1}" srcOrd="0" destOrd="0" presId="urn:microsoft.com/office/officeart/2005/8/layout/radial1"/>
     <dgm:cxn modelId="{D2AB469B-5A30-40D3-AB10-1649EA1F2475}" srcId="{0CE5DC7E-3B50-46AA-BAAB-AF461EFC327E}" destId="{4F950967-BFB5-4DE4-B23B-4026F60CCE62}" srcOrd="1" destOrd="0" parTransId="{CAD08196-8BC3-4DBF-B125-2D4B693BDDBB}" sibTransId="{362CF62E-12E0-4014-8944-BC92DB0B9E99}"/>
@@ -12441,7 +12804,7 @@
             <a:fld id="{9D2A6E17-AB36-4E53-A896-72D500841CBD}" type="datetimeFigureOut">
               <a:rPr lang="en-US" smtClean="0"/>
               <a:pPr/>
-              <a:t>11/6/2013</a:t>
+              <a:t>11/8/2013</a:t>
             </a:fld>
             <a:endParaRPr lang="en-US"/>
           </a:p>
@@ -12603,7 +12966,7 @@
             <a:fld id="{51355148-98C8-44B7-B615-545A12FD2603}" type="datetimeFigureOut">
               <a:rPr lang="en-US" smtClean="0"/>
               <a:pPr/>
-              <a:t>11/6/2013</a:t>
+              <a:t>11/8/2013</a:t>
             </a:fld>
             <a:endParaRPr lang="en-US"/>
           </a:p>
@@ -13184,7 +13547,7 @@
             <a:fld id="{617A4F30-FB30-424F-9F07-D851740F429F}" type="datetimeFigureOut">
               <a:rPr lang="en-US" smtClean="0"/>
               <a:pPr/>
-              <a:t>11/6/2013</a:t>
+              <a:t>11/8/2013</a:t>
             </a:fld>
             <a:endParaRPr lang="en-US"/>
           </a:p>
@@ -13351,7 +13714,7 @@
             <a:fld id="{617A4F30-FB30-424F-9F07-D851740F429F}" type="datetimeFigureOut">
               <a:rPr lang="en-US" smtClean="0"/>
               <a:pPr/>
-              <a:t>11/6/2013</a:t>
+              <a:t>11/8/2013</a:t>
             </a:fld>
             <a:endParaRPr lang="en-US"/>
           </a:p>
@@ -13528,7 +13891,7 @@
             <a:fld id="{617A4F30-FB30-424F-9F07-D851740F429F}" type="datetimeFigureOut">
               <a:rPr lang="en-US" smtClean="0"/>
               <a:pPr/>
-              <a:t>11/6/2013</a:t>
+              <a:t>11/8/2013</a:t>
             </a:fld>
             <a:endParaRPr lang="en-US"/>
           </a:p>
@@ -13695,7 +14058,7 @@
             <a:fld id="{617A4F30-FB30-424F-9F07-D851740F429F}" type="datetimeFigureOut">
               <a:rPr lang="en-US" smtClean="0"/>
               <a:pPr/>
-              <a:t>11/6/2013</a:t>
+              <a:t>11/8/2013</a:t>
             </a:fld>
             <a:endParaRPr lang="en-US"/>
           </a:p>
@@ -13938,7 +14301,7 @@
             <a:fld id="{617A4F30-FB30-424F-9F07-D851740F429F}" type="datetimeFigureOut">
               <a:rPr lang="en-US" smtClean="0"/>
               <a:pPr/>
-              <a:t>11/6/2013</a:t>
+              <a:t>11/8/2013</a:t>
             </a:fld>
             <a:endParaRPr lang="en-US"/>
           </a:p>
@@ -14223,7 +14586,7 @@
             <a:fld id="{617A4F30-FB30-424F-9F07-D851740F429F}" type="datetimeFigureOut">
               <a:rPr lang="en-US" smtClean="0"/>
               <a:pPr/>
-              <a:t>11/6/2013</a:t>
+              <a:t>11/8/2013</a:t>
             </a:fld>
             <a:endParaRPr lang="en-US"/>
           </a:p>
@@ -14642,7 +15005,7 @@
             <a:fld id="{617A4F30-FB30-424F-9F07-D851740F429F}" type="datetimeFigureOut">
               <a:rPr lang="en-US" smtClean="0"/>
               <a:pPr/>
-              <a:t>11/6/2013</a:t>
+              <a:t>11/8/2013</a:t>
             </a:fld>
             <a:endParaRPr lang="en-US"/>
           </a:p>
@@ -14757,7 +15120,7 @@
             <a:fld id="{617A4F30-FB30-424F-9F07-D851740F429F}" type="datetimeFigureOut">
               <a:rPr lang="en-US" smtClean="0"/>
               <a:pPr/>
-              <a:t>11/6/2013</a:t>
+              <a:t>11/8/2013</a:t>
             </a:fld>
             <a:endParaRPr lang="en-US"/>
           </a:p>
@@ -14849,7 +15212,7 @@
             <a:fld id="{617A4F30-FB30-424F-9F07-D851740F429F}" type="datetimeFigureOut">
               <a:rPr lang="en-US" smtClean="0"/>
               <a:pPr/>
-              <a:t>11/6/2013</a:t>
+              <a:t>11/8/2013</a:t>
             </a:fld>
             <a:endParaRPr lang="en-US"/>
           </a:p>
@@ -15123,7 +15486,7 @@
             <a:fld id="{617A4F30-FB30-424F-9F07-D851740F429F}" type="datetimeFigureOut">
               <a:rPr lang="en-US" smtClean="0"/>
               <a:pPr/>
-              <a:t>11/6/2013</a:t>
+              <a:t>11/8/2013</a:t>
             </a:fld>
             <a:endParaRPr lang="en-US"/>
           </a:p>
@@ -15373,7 +15736,7 @@
             <a:fld id="{617A4F30-FB30-424F-9F07-D851740F429F}" type="datetimeFigureOut">
               <a:rPr lang="en-US" smtClean="0"/>
               <a:pPr/>
-              <a:t>11/6/2013</a:t>
+              <a:t>11/8/2013</a:t>
             </a:fld>
             <a:endParaRPr lang="en-US"/>
           </a:p>
@@ -15583,7 +15946,7 @@
             <a:fld id="{617A4F30-FB30-424F-9F07-D851740F429F}" type="datetimeFigureOut">
               <a:rPr lang="en-US" smtClean="0"/>
               <a:pPr/>
-              <a:t>11/6/2013</a:t>
+              <a:t>11/8/2013</a:t>
             </a:fld>
             <a:endParaRPr lang="en-US"/>
           </a:p>
@@ -15975,11 +16338,7 @@
             </a:r>
             <a:r>
               <a:rPr lang="en-US" dirty="0" smtClean="0"/>
-              <a:t>Craft: </a:t>
-            </a:r>
-            <a:r>
-              <a:rPr lang="en-US" dirty="0" smtClean="0"/>
-              <a:t>#6</a:t>
+              <a:t>Craft: #6</a:t>
             </a:r>
             <a:endParaRPr lang="en-US" dirty="0"/>
           </a:p>
@@ -16014,26 +16373,14 @@
           <a:p>
             <a:r>
               <a:rPr lang="ru-RU" dirty="0" smtClean="0"/>
-              <a:t>Асинхронное использование сетевых </a:t>
-            </a:r>
-            <a:r>
-              <a:rPr lang="ru-RU" dirty="0" smtClean="0"/>
-              <a:t>механизмов</a:t>
+              <a:t>Асинхронное использование сетевых механизмов</a:t>
             </a:r>
             <a:endParaRPr lang="en-US" dirty="0" smtClean="0"/>
           </a:p>
           <a:p>
             <a:r>
               <a:rPr lang="en-US" dirty="0" smtClean="0"/>
-              <a:t>Task-Based Engine</a:t>
-            </a:r>
-            <a:r>
-              <a:rPr lang="en-US" dirty="0" smtClean="0"/>
-              <a:t>, </a:t>
-            </a:r>
-            <a:r>
-              <a:rPr lang="en-US" dirty="0" smtClean="0"/>
-              <a:t>Thread-Based Engine</a:t>
+              <a:t>Task-Based Engine, Thread-Based Engine</a:t>
             </a:r>
             <a:endParaRPr lang="ru-RU" dirty="0" smtClean="0"/>
           </a:p>
@@ -17471,15 +17818,7 @@
             </a:pPr>
             <a:r>
               <a:rPr lang="ru-RU" dirty="0" smtClean="0"/>
-              <a:t>	Маршрутизируемый </a:t>
-            </a:r>
-            <a:r>
-              <a:rPr lang="ru-RU" dirty="0" smtClean="0"/>
-              <a:t>протокол </a:t>
-            </a:r>
-            <a:r>
-              <a:rPr lang="ru-RU" dirty="0" smtClean="0"/>
-              <a:t>сетевого уровня</a:t>
+              <a:t>	Маршрутизируемый протокол сетевого уровня</a:t>
             </a:r>
             <a:endParaRPr lang="en-US" dirty="0"/>
           </a:p>
@@ -17543,13 +17882,7 @@
               <a:rPr lang="en-US" dirty="0" smtClean="0">
                 <a:hlinkClick r:id="rId3"/>
               </a:rPr>
-              <a:t>http://</a:t>
-            </a:r>
-            <a:r>
-              <a:rPr lang="en-US" dirty="0" smtClean="0">
-                <a:hlinkClick r:id="rId3"/>
-              </a:rPr>
-              <a:t>ru.wikipedia.org/wiki/Internet_Protocol</a:t>
+              <a:t>http://ru.wikipedia.org/wiki/Internet_Protocol</a:t>
             </a:r>
             <a:endParaRPr lang="en-US" dirty="0" smtClean="0"/>
           </a:p>
@@ -17662,11 +17995,7 @@
             </a:r>
             <a:r>
               <a:rPr lang="ru-RU" dirty="0" smtClean="0"/>
-              <a:t>пакета в 32-битных </a:t>
-            </a:r>
-            <a:r>
-              <a:rPr lang="ru-RU" dirty="0" smtClean="0"/>
-              <a:t>словах</a:t>
+              <a:t>пакета в 32-битных словах</a:t>
             </a:r>
             <a:endParaRPr lang="en-US" dirty="0" smtClean="0"/>
           </a:p>
@@ -17676,11 +18005,7 @@
           <a:p>
             <a:r>
               <a:rPr lang="en-US" dirty="0" smtClean="0"/>
-              <a:t>TTL (Time To Live</a:t>
-            </a:r>
-            <a:r>
-              <a:rPr lang="en-US" dirty="0" smtClean="0"/>
-              <a:t>): </a:t>
+              <a:t>TTL (Time To Live): </a:t>
             </a:r>
             <a:r>
               <a:rPr lang="ru-RU" dirty="0" smtClean="0"/>
@@ -18431,11 +18756,7 @@
           <a:p>
             <a:r>
               <a:rPr lang="en-US" dirty="0" smtClean="0"/>
-              <a:t>B</a:t>
-            </a:r>
-            <a:r>
-              <a:rPr lang="en-US" dirty="0" smtClean="0"/>
-              <a:t>roadcast</a:t>
+              <a:t>Broadcast</a:t>
             </a:r>
             <a:endParaRPr lang="en-US" dirty="0"/>
           </a:p>
@@ -18639,11 +18960,7 @@
           <a:p>
             <a:r>
               <a:rPr lang="en-US" dirty="0" smtClean="0"/>
-              <a:t>TCP </a:t>
-            </a:r>
-            <a:r>
-              <a:rPr lang="en-US" dirty="0" smtClean="0"/>
-              <a:t>(Transmission Control Protocol)</a:t>
+              <a:t>TCP (Transmission Control Protocol)</a:t>
             </a:r>
             <a:endParaRPr lang="en-US" dirty="0"/>
           </a:p>
@@ -18762,13 +19079,7 @@
               <a:rPr lang="en-US" dirty="0" smtClean="0">
                 <a:hlinkClick r:id="rId2"/>
               </a:rPr>
-              <a:t>http://</a:t>
-            </a:r>
-            <a:r>
-              <a:rPr lang="en-US" dirty="0" smtClean="0">
-                <a:hlinkClick r:id="rId2"/>
-              </a:rPr>
-              <a:t>ru.wikipedia.org/wiki/TCP</a:t>
+              <a:t>http://ru.wikipedia.org/wiki/TCP</a:t>
             </a:r>
             <a:endParaRPr lang="en-US" dirty="0" smtClean="0"/>
           </a:p>
@@ -19013,11 +19324,7 @@
           <a:p>
             <a:r>
               <a:rPr lang="en-US" dirty="0" smtClean="0"/>
-              <a:t>UDP </a:t>
-            </a:r>
-            <a:r>
-              <a:rPr lang="en-US" dirty="0" smtClean="0"/>
-              <a:t>(User Datagram Protocol)</a:t>
+              <a:t>UDP (User Datagram Protocol)</a:t>
             </a:r>
             <a:endParaRPr lang="en-US" dirty="0"/>
           </a:p>
@@ -19123,13 +19430,7 @@
               <a:rPr lang="en-US" dirty="0" smtClean="0">
                 <a:hlinkClick r:id="rId2"/>
               </a:rPr>
-              <a:t>http://</a:t>
-            </a:r>
-            <a:r>
-              <a:rPr lang="en-US" dirty="0" smtClean="0">
-                <a:hlinkClick r:id="rId2"/>
-              </a:rPr>
-              <a:t>ru.wikipedia.org/wiki/UDP</a:t>
+              <a:t>http://ru.wikipedia.org/wiki/UDP</a:t>
             </a:r>
             <a:endParaRPr lang="en-US" dirty="0" smtClean="0"/>
           </a:p>
@@ -19272,35 +19573,6 @@
           </a:p>
         </p:txBody>
       </p:sp>
-      <p:sp>
-        <p:nvSpPr>
-          <p:cNvPr id="3" name="Content Placeholder 2"/>
-          <p:cNvSpPr>
-            <a:spLocks noGrp="1"/>
-          </p:cNvSpPr>
-          <p:nvPr>
-            <p:ph idx="1"/>
-          </p:nvPr>
-        </p:nvSpPr>
-        <p:spPr>
-          <a:xfrm>
-            <a:off x="7391400" y="5943600"/>
-            <a:ext cx="1295400" cy="182563"/>
-          </a:xfrm>
-        </p:spPr>
-        <p:txBody>
-          <a:bodyPr>
-            <a:normAutofit fontScale="25000" lnSpcReduction="20000"/>
-          </a:bodyPr>
-          <a:lstStyle/>
-          <a:p>
-            <a:pPr>
-              <a:buNone/>
-            </a:pPr>
-            <a:endParaRPr lang="en-US" dirty="0"/>
-          </a:p>
-        </p:txBody>
-      </p:sp>
     </p:spTree>
   </p:cSld>
   <p:clrMapOvr>
@@ -19344,11 +19616,11 @@
           <a:lstStyle/>
           <a:p>
             <a:r>
-              <a:rPr lang="en-US" b="1" dirty="0" err="1" smtClean="0"/>
+              <a:rPr lang="en-US" dirty="0" err="1" smtClean="0"/>
               <a:t>Boost.Asio</a:t>
             </a:r>
             <a:r>
-              <a:rPr lang="en-US" b="1" dirty="0" smtClean="0"/>
+              <a:rPr lang="en-US" dirty="0" smtClean="0"/>
               <a:t> C++ Network Programming</a:t>
             </a:r>
             <a:endParaRPr lang="en-US" dirty="0"/>
@@ -19436,7 +19708,6 @@
               <a:rPr lang="en-US" dirty="0" smtClean="0"/>
               <a:t>http://it-ebooks.info/book/2723/</a:t>
             </a:r>
-            <a:endParaRPr lang="en-US" dirty="0" smtClean="0"/>
           </a:p>
         </p:txBody>
       </p:sp>
@@ -19480,7 +19751,15 @@
           <a:bodyPr/>
           <a:lstStyle/>
           <a:p>
-            <a:endParaRPr lang="en-US"/>
+            <a:r>
+              <a:rPr lang="en-US" dirty="0" smtClean="0"/>
+              <a:t>Sync, </a:t>
+            </a:r>
+            <a:r>
+              <a:rPr lang="en-US" dirty="0" err="1" smtClean="0"/>
+              <a:t>Async</a:t>
+            </a:r>
+            <a:endParaRPr lang="en-US" dirty="0"/>
           </a:p>
         </p:txBody>
       </p:sp>
@@ -19499,7 +19778,1757 @@
           <a:bodyPr/>
           <a:lstStyle/>
           <a:p>
+            <a:r>
+              <a:rPr lang="ru-RU" dirty="0" smtClean="0"/>
+              <a:t>Синхронность:</a:t>
+            </a:r>
+          </a:p>
+          <a:p>
+            <a:pPr lvl="1"/>
+            <a:r>
+              <a:rPr lang="ru-RU" dirty="0" smtClean="0"/>
+              <a:t>Просто для разработки</a:t>
+            </a:r>
+          </a:p>
+          <a:p>
+            <a:pPr lvl="1"/>
+            <a:r>
+              <a:rPr lang="ru-RU" dirty="0" smtClean="0"/>
+              <a:t>Решение простых задач по передаче информации</a:t>
+            </a:r>
+          </a:p>
+          <a:p>
+            <a:r>
+              <a:rPr lang="ru-RU" dirty="0" smtClean="0"/>
+              <a:t>Асинхронность:</a:t>
+            </a:r>
+          </a:p>
+          <a:p>
+            <a:pPr lvl="1"/>
+            <a:r>
+              <a:rPr lang="ru-RU" dirty="0" smtClean="0"/>
+              <a:t>Не тривиально для разработки</a:t>
+            </a:r>
+          </a:p>
+          <a:p>
+            <a:pPr lvl="1"/>
+            <a:r>
+              <a:rPr lang="ru-RU" dirty="0" smtClean="0"/>
+              <a:t>Решение задач любой сложности</a:t>
+            </a:r>
+          </a:p>
+          <a:p>
+            <a:pPr lvl="1"/>
+            <a:endParaRPr lang="en-US" dirty="0"/>
+          </a:p>
+        </p:txBody>
+      </p:sp>
+    </p:spTree>
+  </p:cSld>
+  <p:clrMapOvr>
+    <a:masterClrMapping/>
+  </p:clrMapOvr>
+</p:sld>
+</file>
+
+<file path=ppt/slides/slide25.xml><?xml version="1.0" encoding="utf-8"?>
+<p:sld xmlns:a="http://schemas.openxmlformats.org/drawingml/2006/main" xmlns:r="http://schemas.openxmlformats.org/officeDocument/2006/relationships" xmlns:p="http://schemas.openxmlformats.org/presentationml/2006/main">
+  <p:cSld>
+    <p:spTree>
+      <p:nvGrpSpPr>
+        <p:cNvPr id="1" name=""/>
+        <p:cNvGrpSpPr/>
+        <p:nvPr/>
+      </p:nvGrpSpPr>
+      <p:grpSpPr>
+        <a:xfrm>
+          <a:off x="0" y="0"/>
+          <a:ext cx="0" cy="0"/>
+          <a:chOff x="0" y="0"/>
+          <a:chExt cx="0" cy="0"/>
+        </a:xfrm>
+      </p:grpSpPr>
+      <p:sp>
+        <p:nvSpPr>
+          <p:cNvPr id="2" name="Title 1"/>
+          <p:cNvSpPr>
+            <a:spLocks noGrp="1"/>
+          </p:cNvSpPr>
+          <p:nvPr>
+            <p:ph type="title"/>
+          </p:nvPr>
+        </p:nvSpPr>
+        <p:spPr/>
+        <p:txBody>
+          <a:bodyPr/>
+          <a:lstStyle/>
+          <a:p>
+            <a:r>
+              <a:rPr lang="en-US" dirty="0" smtClean="0"/>
+              <a:t>TCP Reference</a:t>
+            </a:r>
+            <a:endParaRPr lang="en-US" dirty="0"/>
+          </a:p>
+        </p:txBody>
+      </p:sp>
+      <p:sp>
+        <p:nvSpPr>
+          <p:cNvPr id="3" name="Content Placeholder 2"/>
+          <p:cNvSpPr>
+            <a:spLocks noGrp="1"/>
+          </p:cNvSpPr>
+          <p:nvPr>
+            <p:ph idx="1"/>
+          </p:nvPr>
+        </p:nvSpPr>
+        <p:spPr/>
+        <p:txBody>
+          <a:bodyPr/>
+          <a:lstStyle/>
+          <a:p>
+            <a:r>
+              <a:rPr lang="en-US" dirty="0" smtClean="0"/>
+              <a:t>boost::</a:t>
+            </a:r>
+            <a:r>
+              <a:rPr lang="en-US" dirty="0" err="1" smtClean="0"/>
+              <a:t>asio</a:t>
+            </a:r>
+            <a:r>
+              <a:rPr lang="en-US" dirty="0" smtClean="0"/>
+              <a:t>::</a:t>
+            </a:r>
+            <a:r>
+              <a:rPr lang="en-US" dirty="0" err="1" smtClean="0"/>
+              <a:t>io_service</a:t>
+            </a:r>
+            <a:endParaRPr lang="en-US" dirty="0" smtClean="0"/>
+          </a:p>
+          <a:p>
+            <a:r>
+              <a:rPr lang="en-US" dirty="0" smtClean="0"/>
+              <a:t>boost::</a:t>
+            </a:r>
+            <a:r>
+              <a:rPr lang="en-US" dirty="0" err="1" smtClean="0"/>
+              <a:t>asio</a:t>
+            </a:r>
+            <a:r>
+              <a:rPr lang="en-US" dirty="0" smtClean="0"/>
+              <a:t>::</a:t>
+            </a:r>
+            <a:r>
+              <a:rPr lang="en-US" dirty="0" err="1" smtClean="0"/>
+              <a:t>ip</a:t>
+            </a:r>
+            <a:r>
+              <a:rPr lang="en-US" dirty="0" smtClean="0"/>
+              <a:t>::</a:t>
+            </a:r>
+            <a:r>
+              <a:rPr lang="en-US" dirty="0" err="1" smtClean="0"/>
+              <a:t>tcp</a:t>
+            </a:r>
+            <a:r>
+              <a:rPr lang="en-US" dirty="0" smtClean="0"/>
+              <a:t>::acceptor</a:t>
+            </a:r>
+          </a:p>
+          <a:p>
+            <a:r>
+              <a:rPr lang="en-US" dirty="0" smtClean="0"/>
+              <a:t>boost::</a:t>
+            </a:r>
+            <a:r>
+              <a:rPr lang="en-US" dirty="0" err="1" smtClean="0"/>
+              <a:t>asio</a:t>
+            </a:r>
+            <a:r>
+              <a:rPr lang="en-US" dirty="0" smtClean="0"/>
+              <a:t>::</a:t>
+            </a:r>
+            <a:r>
+              <a:rPr lang="en-US" dirty="0" err="1" smtClean="0"/>
+              <a:t>ip</a:t>
+            </a:r>
+            <a:r>
+              <a:rPr lang="en-US" dirty="0" smtClean="0"/>
+              <a:t>::</a:t>
+            </a:r>
+            <a:r>
+              <a:rPr lang="en-US" dirty="0" err="1" smtClean="0"/>
+              <a:t>tcp</a:t>
+            </a:r>
+            <a:r>
+              <a:rPr lang="en-US" dirty="0" smtClean="0"/>
+              <a:t>::socket</a:t>
+            </a:r>
+          </a:p>
+          <a:p>
+            <a:r>
+              <a:rPr lang="en-US" dirty="0" smtClean="0"/>
+              <a:t>boost::</a:t>
+            </a:r>
+            <a:r>
+              <a:rPr lang="en-US" dirty="0" err="1" smtClean="0"/>
+              <a:t>asio</a:t>
+            </a:r>
+            <a:r>
+              <a:rPr lang="en-US" dirty="0" smtClean="0"/>
+              <a:t>::</a:t>
+            </a:r>
+            <a:r>
+              <a:rPr lang="en-US" dirty="0" err="1" smtClean="0"/>
+              <a:t>ip</a:t>
+            </a:r>
+            <a:r>
+              <a:rPr lang="en-US" dirty="0" smtClean="0"/>
+              <a:t>::address::</a:t>
+            </a:r>
+            <a:r>
+              <a:rPr lang="en-US" dirty="0" err="1" smtClean="0"/>
+              <a:t>from_string</a:t>
+            </a:r>
+            <a:r>
+              <a:rPr lang="en-US" dirty="0" smtClean="0"/>
+              <a:t>( string )</a:t>
+            </a:r>
+          </a:p>
+          <a:p>
+            <a:r>
+              <a:rPr lang="en-US" dirty="0" smtClean="0"/>
+              <a:t>boost::</a:t>
+            </a:r>
+            <a:r>
+              <a:rPr lang="en-US" dirty="0" err="1" smtClean="0"/>
+              <a:t>asio</a:t>
+            </a:r>
+            <a:r>
+              <a:rPr lang="en-US" dirty="0" smtClean="0"/>
+              <a:t>::</a:t>
+            </a:r>
+            <a:r>
+              <a:rPr lang="en-US" dirty="0" err="1" smtClean="0"/>
+              <a:t>ip</a:t>
+            </a:r>
+            <a:r>
+              <a:rPr lang="en-US" dirty="0" smtClean="0"/>
+              <a:t>::</a:t>
+            </a:r>
+            <a:r>
+              <a:rPr lang="en-US" dirty="0" err="1" smtClean="0"/>
+              <a:t>tcp</a:t>
+            </a:r>
+            <a:r>
+              <a:rPr lang="en-US" dirty="0" smtClean="0"/>
+              <a:t>::endpoint</a:t>
+            </a:r>
+          </a:p>
+          <a:p>
+            <a:endParaRPr lang="en-US" dirty="0"/>
+          </a:p>
+        </p:txBody>
+      </p:sp>
+    </p:spTree>
+  </p:cSld>
+  <p:clrMapOvr>
+    <a:masterClrMapping/>
+  </p:clrMapOvr>
+</p:sld>
+</file>
+
+<file path=ppt/slides/slide26.xml><?xml version="1.0" encoding="utf-8"?>
+<p:sld xmlns:a="http://schemas.openxmlformats.org/drawingml/2006/main" xmlns:r="http://schemas.openxmlformats.org/officeDocument/2006/relationships" xmlns:p="http://schemas.openxmlformats.org/presentationml/2006/main">
+  <p:cSld>
+    <p:spTree>
+      <p:nvGrpSpPr>
+        <p:cNvPr id="1" name=""/>
+        <p:cNvGrpSpPr/>
+        <p:nvPr/>
+      </p:nvGrpSpPr>
+      <p:grpSpPr>
+        <a:xfrm>
+          <a:off x="0" y="0"/>
+          <a:ext cx="0" cy="0"/>
+          <a:chOff x="0" y="0"/>
+          <a:chExt cx="0" cy="0"/>
+        </a:xfrm>
+      </p:grpSpPr>
+      <p:sp>
+        <p:nvSpPr>
+          <p:cNvPr id="2" name="Title 1"/>
+          <p:cNvSpPr>
+            <a:spLocks noGrp="1"/>
+          </p:cNvSpPr>
+          <p:nvPr>
+            <p:ph type="title"/>
+          </p:nvPr>
+        </p:nvSpPr>
+        <p:spPr/>
+        <p:txBody>
+          <a:bodyPr/>
+          <a:lstStyle/>
+          <a:p>
+            <a:r>
+              <a:rPr lang="en-US" dirty="0" smtClean="0"/>
+              <a:t>Sync TCP Server Side</a:t>
+            </a:r>
+            <a:endParaRPr lang="en-US" dirty="0"/>
+          </a:p>
+        </p:txBody>
+      </p:sp>
+      <p:sp>
+        <p:nvSpPr>
+          <p:cNvPr id="3" name="Content Placeholder 2"/>
+          <p:cNvSpPr>
+            <a:spLocks noGrp="1"/>
+          </p:cNvSpPr>
+          <p:nvPr>
+            <p:ph idx="1"/>
+          </p:nvPr>
+        </p:nvSpPr>
+        <p:spPr/>
+        <p:txBody>
+          <a:bodyPr/>
+          <a:lstStyle/>
+          <a:p>
+            <a:endParaRPr lang="en-US" dirty="0"/>
+          </a:p>
+        </p:txBody>
+      </p:sp>
+      <p:sp>
+        <p:nvSpPr>
+          <p:cNvPr id="4" name="Rounded Rectangle 3"/>
+          <p:cNvSpPr/>
+          <p:nvPr/>
+        </p:nvSpPr>
+        <p:spPr>
+          <a:xfrm>
+            <a:off x="304800" y="1447800"/>
+            <a:ext cx="8534400" cy="4953000"/>
+          </a:xfrm>
+          <a:prstGeom prst="roundRect">
+            <a:avLst/>
+          </a:prstGeom>
+        </p:spPr>
+        <p:style>
+          <a:lnRef idx="2">
+            <a:schemeClr val="accent1">
+              <a:shade val="50000"/>
+            </a:schemeClr>
+          </a:lnRef>
+          <a:fillRef idx="1">
+            <a:schemeClr val="accent1"/>
+          </a:fillRef>
+          <a:effectRef idx="0">
+            <a:schemeClr val="accent1"/>
+          </a:effectRef>
+          <a:fontRef idx="minor">
+            <a:schemeClr val="lt1"/>
+          </a:fontRef>
+        </p:style>
+        <p:txBody>
+          <a:bodyPr rtlCol="0" anchor="ctr"/>
+          <a:lstStyle/>
+          <a:p>
+            <a:r>
+              <a:rPr lang="en-US" sz="2000" dirty="0" err="1" smtClean="0">
+                <a:latin typeface="Consolas" pitchFamily="49" charset="0"/>
+                <a:cs typeface="Consolas" pitchFamily="49" charset="0"/>
+              </a:rPr>
+              <a:t>io_service</a:t>
+            </a:r>
+            <a:r>
+              <a:rPr lang="en-US" sz="2000" dirty="0" smtClean="0">
+                <a:latin typeface="Consolas" pitchFamily="49" charset="0"/>
+                <a:cs typeface="Consolas" pitchFamily="49" charset="0"/>
+              </a:rPr>
+              <a:t> service;</a:t>
+            </a:r>
+          </a:p>
+          <a:p>
+            <a:endParaRPr lang="en-US" sz="2000" dirty="0" smtClean="0">
+              <a:latin typeface="Consolas" pitchFamily="49" charset="0"/>
+              <a:cs typeface="Consolas" pitchFamily="49" charset="0"/>
+            </a:endParaRPr>
+          </a:p>
+          <a:p>
+            <a:r>
+              <a:rPr lang="en-US" sz="2000" dirty="0" err="1" smtClean="0">
+                <a:latin typeface="Consolas" pitchFamily="49" charset="0"/>
+                <a:cs typeface="Consolas" pitchFamily="49" charset="0"/>
+              </a:rPr>
+              <a:t>ip</a:t>
+            </a:r>
+            <a:r>
+              <a:rPr lang="en-US" sz="2000" dirty="0" smtClean="0">
+                <a:latin typeface="Consolas" pitchFamily="49" charset="0"/>
+                <a:cs typeface="Consolas" pitchFamily="49" charset="0"/>
+              </a:rPr>
+              <a:t>::</a:t>
+            </a:r>
+            <a:r>
+              <a:rPr lang="en-US" sz="2000" dirty="0" err="1" smtClean="0">
+                <a:latin typeface="Consolas" pitchFamily="49" charset="0"/>
+                <a:cs typeface="Consolas" pitchFamily="49" charset="0"/>
+              </a:rPr>
+              <a:t>tcp</a:t>
+            </a:r>
+            <a:r>
+              <a:rPr lang="en-US" sz="2000" dirty="0" smtClean="0">
+                <a:latin typeface="Consolas" pitchFamily="49" charset="0"/>
+                <a:cs typeface="Consolas" pitchFamily="49" charset="0"/>
+              </a:rPr>
+              <a:t>::endpoint </a:t>
+            </a:r>
+            <a:r>
+              <a:rPr lang="en-US" sz="2000" dirty="0" err="1" smtClean="0">
+                <a:latin typeface="Consolas" pitchFamily="49" charset="0"/>
+                <a:cs typeface="Consolas" pitchFamily="49" charset="0"/>
+              </a:rPr>
+              <a:t>ep</a:t>
+            </a:r>
+            <a:r>
+              <a:rPr lang="en-US" sz="2000" dirty="0" smtClean="0">
+                <a:latin typeface="Consolas" pitchFamily="49" charset="0"/>
+                <a:cs typeface="Consolas" pitchFamily="49" charset="0"/>
+              </a:rPr>
+              <a:t>( </a:t>
+            </a:r>
+            <a:r>
+              <a:rPr lang="en-US" sz="2000" dirty="0" err="1" smtClean="0">
+                <a:latin typeface="Consolas" pitchFamily="49" charset="0"/>
+                <a:cs typeface="Consolas" pitchFamily="49" charset="0"/>
+              </a:rPr>
+              <a:t>ip</a:t>
+            </a:r>
+            <a:r>
+              <a:rPr lang="en-US" sz="2000" dirty="0" smtClean="0">
+                <a:latin typeface="Consolas" pitchFamily="49" charset="0"/>
+                <a:cs typeface="Consolas" pitchFamily="49" charset="0"/>
+              </a:rPr>
+              <a:t>::</a:t>
+            </a:r>
+            <a:r>
+              <a:rPr lang="en-US" sz="2000" dirty="0" err="1" smtClean="0">
+                <a:latin typeface="Consolas" pitchFamily="49" charset="0"/>
+                <a:cs typeface="Consolas" pitchFamily="49" charset="0"/>
+              </a:rPr>
+              <a:t>tcp</a:t>
+            </a:r>
+            <a:r>
+              <a:rPr lang="en-US" sz="2000" dirty="0" smtClean="0">
+                <a:latin typeface="Consolas" pitchFamily="49" charset="0"/>
+                <a:cs typeface="Consolas" pitchFamily="49" charset="0"/>
+              </a:rPr>
+              <a:t>::v4() , 50000 );</a:t>
+            </a:r>
+          </a:p>
+          <a:p>
+            <a:r>
+              <a:rPr lang="en-US" sz="2000" dirty="0" err="1" smtClean="0">
+                <a:latin typeface="Consolas" pitchFamily="49" charset="0"/>
+                <a:cs typeface="Consolas" pitchFamily="49" charset="0"/>
+              </a:rPr>
+              <a:t>ip</a:t>
+            </a:r>
+            <a:r>
+              <a:rPr lang="en-US" sz="2000" dirty="0" smtClean="0">
+                <a:latin typeface="Consolas" pitchFamily="49" charset="0"/>
+                <a:cs typeface="Consolas" pitchFamily="49" charset="0"/>
+              </a:rPr>
+              <a:t>::</a:t>
+            </a:r>
+            <a:r>
+              <a:rPr lang="en-US" sz="2000" dirty="0" err="1" smtClean="0">
+                <a:latin typeface="Consolas" pitchFamily="49" charset="0"/>
+                <a:cs typeface="Consolas" pitchFamily="49" charset="0"/>
+              </a:rPr>
+              <a:t>tcp</a:t>
+            </a:r>
+            <a:r>
+              <a:rPr lang="en-US" sz="2000" dirty="0" smtClean="0">
+                <a:latin typeface="Consolas" pitchFamily="49" charset="0"/>
+                <a:cs typeface="Consolas" pitchFamily="49" charset="0"/>
+              </a:rPr>
+              <a:t>::acceptor handler(service, </a:t>
+            </a:r>
+            <a:r>
+              <a:rPr lang="en-US" sz="2000" dirty="0" err="1" smtClean="0">
+                <a:latin typeface="Consolas" pitchFamily="49" charset="0"/>
+                <a:cs typeface="Consolas" pitchFamily="49" charset="0"/>
+              </a:rPr>
+              <a:t>ep</a:t>
+            </a:r>
+            <a:r>
+              <a:rPr lang="en-US" sz="2000" dirty="0" smtClean="0">
+                <a:latin typeface="Consolas" pitchFamily="49" charset="0"/>
+                <a:cs typeface="Consolas" pitchFamily="49" charset="0"/>
+              </a:rPr>
+              <a:t> );</a:t>
+            </a:r>
+          </a:p>
+          <a:p>
+            <a:endParaRPr lang="en-US" sz="2000" dirty="0" smtClean="0">
+              <a:latin typeface="Consolas" pitchFamily="49" charset="0"/>
+              <a:cs typeface="Consolas" pitchFamily="49" charset="0"/>
+            </a:endParaRPr>
+          </a:p>
+          <a:p>
+            <a:r>
+              <a:rPr lang="en-US" sz="2000" dirty="0" err="1" smtClean="0">
+                <a:latin typeface="Consolas" pitchFamily="49" charset="0"/>
+                <a:cs typeface="Consolas" pitchFamily="49" charset="0"/>
+              </a:rPr>
+              <a:t>ip</a:t>
+            </a:r>
+            <a:r>
+              <a:rPr lang="en-US" sz="2000" dirty="0" smtClean="0">
+                <a:latin typeface="Consolas" pitchFamily="49" charset="0"/>
+                <a:cs typeface="Consolas" pitchFamily="49" charset="0"/>
+              </a:rPr>
+              <a:t>::</a:t>
+            </a:r>
+            <a:r>
+              <a:rPr lang="en-US" sz="2000" dirty="0" err="1" smtClean="0">
+                <a:latin typeface="Consolas" pitchFamily="49" charset="0"/>
+                <a:cs typeface="Consolas" pitchFamily="49" charset="0"/>
+              </a:rPr>
+              <a:t>tcp</a:t>
+            </a:r>
+            <a:r>
+              <a:rPr lang="en-US" sz="2000" dirty="0" smtClean="0">
+                <a:latin typeface="Consolas" pitchFamily="49" charset="0"/>
+                <a:cs typeface="Consolas" pitchFamily="49" charset="0"/>
+              </a:rPr>
+              <a:t>::socket </a:t>
+            </a:r>
+            <a:r>
+              <a:rPr lang="en-US" sz="2000" dirty="0" err="1" smtClean="0">
+                <a:latin typeface="Consolas" pitchFamily="49" charset="0"/>
+                <a:cs typeface="Consolas" pitchFamily="49" charset="0"/>
+              </a:rPr>
+              <a:t>socket</a:t>
+            </a:r>
+            <a:r>
+              <a:rPr lang="en-US" sz="2000" dirty="0" smtClean="0">
+                <a:latin typeface="Consolas" pitchFamily="49" charset="0"/>
+                <a:cs typeface="Consolas" pitchFamily="49" charset="0"/>
+              </a:rPr>
+              <a:t>(service);</a:t>
+            </a:r>
+          </a:p>
+          <a:p>
+            <a:r>
+              <a:rPr lang="en-US" sz="2000" dirty="0" err="1" smtClean="0">
+                <a:latin typeface="Consolas" pitchFamily="49" charset="0"/>
+                <a:cs typeface="Consolas" pitchFamily="49" charset="0"/>
+              </a:rPr>
+              <a:t>acceptor_.accept</a:t>
+            </a:r>
+            <a:r>
+              <a:rPr lang="en-US" sz="2000" dirty="0" smtClean="0">
+                <a:latin typeface="Consolas" pitchFamily="49" charset="0"/>
+                <a:cs typeface="Consolas" pitchFamily="49" charset="0"/>
+              </a:rPr>
+              <a:t>( socket );</a:t>
+            </a:r>
+          </a:p>
+        </p:txBody>
+      </p:sp>
+    </p:spTree>
+  </p:cSld>
+  <p:clrMapOvr>
+    <a:masterClrMapping/>
+  </p:clrMapOvr>
+</p:sld>
+</file>
+
+<file path=ppt/slides/slide27.xml><?xml version="1.0" encoding="utf-8"?>
+<p:sld xmlns:a="http://schemas.openxmlformats.org/drawingml/2006/main" xmlns:r="http://schemas.openxmlformats.org/officeDocument/2006/relationships" xmlns:p="http://schemas.openxmlformats.org/presentationml/2006/main">
+  <p:cSld>
+    <p:spTree>
+      <p:nvGrpSpPr>
+        <p:cNvPr id="1" name=""/>
+        <p:cNvGrpSpPr/>
+        <p:nvPr/>
+      </p:nvGrpSpPr>
+      <p:grpSpPr>
+        <a:xfrm>
+          <a:off x="0" y="0"/>
+          <a:ext cx="0" cy="0"/>
+          <a:chOff x="0" y="0"/>
+          <a:chExt cx="0" cy="0"/>
+        </a:xfrm>
+      </p:grpSpPr>
+      <p:sp>
+        <p:nvSpPr>
+          <p:cNvPr id="2" name="Title 1"/>
+          <p:cNvSpPr>
+            <a:spLocks noGrp="1"/>
+          </p:cNvSpPr>
+          <p:nvPr>
+            <p:ph type="title"/>
+          </p:nvPr>
+        </p:nvSpPr>
+        <p:spPr/>
+        <p:txBody>
+          <a:bodyPr/>
+          <a:lstStyle/>
+          <a:p>
+            <a:r>
+              <a:rPr lang="en-US" dirty="0" smtClean="0"/>
+              <a:t>Sync TCP Client Side</a:t>
+            </a:r>
+            <a:endParaRPr lang="en-US" dirty="0"/>
+          </a:p>
+        </p:txBody>
+      </p:sp>
+      <p:sp>
+        <p:nvSpPr>
+          <p:cNvPr id="3" name="Content Placeholder 2"/>
+          <p:cNvSpPr>
+            <a:spLocks noGrp="1"/>
+          </p:cNvSpPr>
+          <p:nvPr>
+            <p:ph idx="1"/>
+          </p:nvPr>
+        </p:nvSpPr>
+        <p:spPr/>
+        <p:txBody>
+          <a:bodyPr/>
+          <a:lstStyle/>
+          <a:p>
             <a:endParaRPr lang="en-US"/>
+          </a:p>
+        </p:txBody>
+      </p:sp>
+      <p:sp>
+        <p:nvSpPr>
+          <p:cNvPr id="4" name="Rounded Rectangle 3"/>
+          <p:cNvSpPr/>
+          <p:nvPr/>
+        </p:nvSpPr>
+        <p:spPr>
+          <a:xfrm>
+            <a:off x="304800" y="1447800"/>
+            <a:ext cx="8534400" cy="4953000"/>
+          </a:xfrm>
+          <a:prstGeom prst="roundRect">
+            <a:avLst/>
+          </a:prstGeom>
+        </p:spPr>
+        <p:style>
+          <a:lnRef idx="2">
+            <a:schemeClr val="accent1">
+              <a:shade val="50000"/>
+            </a:schemeClr>
+          </a:lnRef>
+          <a:fillRef idx="1">
+            <a:schemeClr val="accent1"/>
+          </a:fillRef>
+          <a:effectRef idx="0">
+            <a:schemeClr val="accent1"/>
+          </a:effectRef>
+          <a:fontRef idx="minor">
+            <a:schemeClr val="lt1"/>
+          </a:fontRef>
+        </p:style>
+        <p:txBody>
+          <a:bodyPr rtlCol="0" anchor="ctr"/>
+          <a:lstStyle/>
+          <a:p>
+            <a:r>
+              <a:rPr lang="en-US" sz="2000" dirty="0" err="1" smtClean="0">
+                <a:latin typeface="Consolas" pitchFamily="49" charset="0"/>
+                <a:cs typeface="Consolas" pitchFamily="49" charset="0"/>
+              </a:rPr>
+              <a:t>io_service</a:t>
+            </a:r>
+            <a:r>
+              <a:rPr lang="en-US" sz="2000" dirty="0" smtClean="0">
+                <a:latin typeface="Consolas" pitchFamily="49" charset="0"/>
+                <a:cs typeface="Consolas" pitchFamily="49" charset="0"/>
+              </a:rPr>
+              <a:t> service;</a:t>
+            </a:r>
+          </a:p>
+          <a:p>
+            <a:r>
+              <a:rPr lang="en-US" sz="2000" dirty="0" err="1" smtClean="0">
+                <a:latin typeface="Consolas" pitchFamily="49" charset="0"/>
+                <a:cs typeface="Consolas" pitchFamily="49" charset="0"/>
+              </a:rPr>
+              <a:t>ip</a:t>
+            </a:r>
+            <a:r>
+              <a:rPr lang="en-US" sz="2000" dirty="0" smtClean="0">
+                <a:latin typeface="Consolas" pitchFamily="49" charset="0"/>
+                <a:cs typeface="Consolas" pitchFamily="49" charset="0"/>
+              </a:rPr>
+              <a:t>::</a:t>
+            </a:r>
+            <a:r>
+              <a:rPr lang="en-US" sz="2000" dirty="0" err="1" smtClean="0">
+                <a:latin typeface="Consolas" pitchFamily="49" charset="0"/>
+                <a:cs typeface="Consolas" pitchFamily="49" charset="0"/>
+              </a:rPr>
+              <a:t>tcp</a:t>
+            </a:r>
+            <a:r>
+              <a:rPr lang="en-US" sz="2000" dirty="0" smtClean="0">
+                <a:latin typeface="Consolas" pitchFamily="49" charset="0"/>
+                <a:cs typeface="Consolas" pitchFamily="49" charset="0"/>
+              </a:rPr>
+              <a:t>::socket sock(service);</a:t>
+            </a:r>
+          </a:p>
+          <a:p>
+            <a:endParaRPr lang="en-US" sz="2000" dirty="0" smtClean="0">
+              <a:latin typeface="Consolas" pitchFamily="49" charset="0"/>
+              <a:cs typeface="Consolas" pitchFamily="49" charset="0"/>
+            </a:endParaRPr>
+          </a:p>
+          <a:p>
+            <a:r>
+              <a:rPr lang="en-US" sz="2000" dirty="0" err="1" smtClean="0">
+                <a:latin typeface="Consolas" pitchFamily="49" charset="0"/>
+                <a:cs typeface="Consolas" pitchFamily="49" charset="0"/>
+              </a:rPr>
+              <a:t>ip</a:t>
+            </a:r>
+            <a:r>
+              <a:rPr lang="en-US" sz="2000" dirty="0" smtClean="0">
+                <a:latin typeface="Consolas" pitchFamily="49" charset="0"/>
+                <a:cs typeface="Consolas" pitchFamily="49" charset="0"/>
+              </a:rPr>
+              <a:t>::</a:t>
+            </a:r>
+            <a:r>
+              <a:rPr lang="en-US" sz="2000" dirty="0" err="1" smtClean="0">
+                <a:latin typeface="Consolas" pitchFamily="49" charset="0"/>
+                <a:cs typeface="Consolas" pitchFamily="49" charset="0"/>
+              </a:rPr>
+              <a:t>tcp</a:t>
+            </a:r>
+            <a:r>
+              <a:rPr lang="en-US" sz="2000" dirty="0" smtClean="0">
+                <a:latin typeface="Consolas" pitchFamily="49" charset="0"/>
+                <a:cs typeface="Consolas" pitchFamily="49" charset="0"/>
+              </a:rPr>
+              <a:t>::endpoint </a:t>
+            </a:r>
+            <a:r>
+              <a:rPr lang="en-US" sz="2000" dirty="0" err="1" smtClean="0">
+                <a:latin typeface="Consolas" pitchFamily="49" charset="0"/>
+                <a:cs typeface="Consolas" pitchFamily="49" charset="0"/>
+              </a:rPr>
+              <a:t>ep</a:t>
+            </a:r>
+            <a:r>
+              <a:rPr lang="en-US" sz="2000" dirty="0" smtClean="0">
+                <a:latin typeface="Consolas" pitchFamily="49" charset="0"/>
+                <a:cs typeface="Consolas" pitchFamily="49" charset="0"/>
+              </a:rPr>
+              <a:t>(</a:t>
+            </a:r>
+          </a:p>
+          <a:p>
+            <a:r>
+              <a:rPr lang="en-US" sz="2000" dirty="0" smtClean="0">
+                <a:latin typeface="Consolas" pitchFamily="49" charset="0"/>
+                <a:cs typeface="Consolas" pitchFamily="49" charset="0"/>
+              </a:rPr>
+              <a:t>	</a:t>
+            </a:r>
+            <a:r>
+              <a:rPr lang="en-US" sz="2000" dirty="0" err="1" smtClean="0">
+                <a:latin typeface="Consolas" pitchFamily="49" charset="0"/>
+                <a:cs typeface="Consolas" pitchFamily="49" charset="0"/>
+              </a:rPr>
+              <a:t>ip</a:t>
+            </a:r>
+            <a:r>
+              <a:rPr lang="en-US" sz="2000" dirty="0" smtClean="0">
+                <a:latin typeface="Consolas" pitchFamily="49" charset="0"/>
+                <a:cs typeface="Consolas" pitchFamily="49" charset="0"/>
+              </a:rPr>
+              <a:t>::address::</a:t>
+            </a:r>
+            <a:r>
+              <a:rPr lang="en-US" sz="2000" dirty="0" err="1" smtClean="0">
+                <a:latin typeface="Consolas" pitchFamily="49" charset="0"/>
+                <a:cs typeface="Consolas" pitchFamily="49" charset="0"/>
+              </a:rPr>
+              <a:t>from_string</a:t>
+            </a:r>
+            <a:r>
+              <a:rPr lang="en-US" sz="2000" dirty="0" smtClean="0">
+                <a:latin typeface="Consolas" pitchFamily="49" charset="0"/>
+                <a:cs typeface="Consolas" pitchFamily="49" charset="0"/>
+              </a:rPr>
+              <a:t>("127.0.0.1"), 5000);</a:t>
+            </a:r>
+          </a:p>
+          <a:p>
+            <a:endParaRPr lang="en-US" sz="2000" dirty="0" smtClean="0">
+              <a:latin typeface="Consolas" pitchFamily="49" charset="0"/>
+              <a:cs typeface="Consolas" pitchFamily="49" charset="0"/>
+            </a:endParaRPr>
+          </a:p>
+          <a:p>
+            <a:r>
+              <a:rPr lang="en-US" sz="2000" dirty="0" err="1" smtClean="0">
+                <a:latin typeface="Consolas" pitchFamily="49" charset="0"/>
+                <a:cs typeface="Consolas" pitchFamily="49" charset="0"/>
+              </a:rPr>
+              <a:t>sock.connect</a:t>
+            </a:r>
+            <a:r>
+              <a:rPr lang="en-US" sz="2000" dirty="0" smtClean="0">
+                <a:latin typeface="Consolas" pitchFamily="49" charset="0"/>
+                <a:cs typeface="Consolas" pitchFamily="49" charset="0"/>
+              </a:rPr>
+              <a:t>(</a:t>
+            </a:r>
+            <a:r>
+              <a:rPr lang="en-US" sz="2000" dirty="0" err="1" smtClean="0">
+                <a:latin typeface="Consolas" pitchFamily="49" charset="0"/>
+                <a:cs typeface="Consolas" pitchFamily="49" charset="0"/>
+              </a:rPr>
+              <a:t>ep</a:t>
+            </a:r>
+            <a:r>
+              <a:rPr lang="en-US" sz="2000" dirty="0" smtClean="0">
+                <a:latin typeface="Consolas" pitchFamily="49" charset="0"/>
+                <a:cs typeface="Consolas" pitchFamily="49" charset="0"/>
+              </a:rPr>
+              <a:t>);</a:t>
+            </a:r>
+          </a:p>
+        </p:txBody>
+      </p:sp>
+    </p:spTree>
+  </p:cSld>
+  <p:clrMapOvr>
+    <a:masterClrMapping/>
+  </p:clrMapOvr>
+</p:sld>
+</file>
+
+<file path=ppt/slides/slide28.xml><?xml version="1.0" encoding="utf-8"?>
+<p:sld xmlns:a="http://schemas.openxmlformats.org/drawingml/2006/main" xmlns:r="http://schemas.openxmlformats.org/officeDocument/2006/relationships" xmlns:p="http://schemas.openxmlformats.org/presentationml/2006/main">
+  <p:cSld>
+    <p:spTree>
+      <p:nvGrpSpPr>
+        <p:cNvPr id="1" name=""/>
+        <p:cNvGrpSpPr/>
+        <p:nvPr/>
+      </p:nvGrpSpPr>
+      <p:grpSpPr>
+        <a:xfrm>
+          <a:off x="0" y="0"/>
+          <a:ext cx="0" cy="0"/>
+          <a:chOff x="0" y="0"/>
+          <a:chExt cx="0" cy="0"/>
+        </a:xfrm>
+      </p:grpSpPr>
+      <p:sp>
+        <p:nvSpPr>
+          <p:cNvPr id="2" name="Title 1"/>
+          <p:cNvSpPr>
+            <a:spLocks noGrp="1"/>
+          </p:cNvSpPr>
+          <p:nvPr>
+            <p:ph type="title"/>
+          </p:nvPr>
+        </p:nvSpPr>
+        <p:spPr/>
+        <p:txBody>
+          <a:bodyPr>
+            <a:normAutofit/>
+          </a:bodyPr>
+          <a:lstStyle/>
+          <a:p>
+            <a:pPr lvl="0"/>
+            <a:r>
+              <a:rPr lang="en-US" dirty="0" err="1" smtClean="0"/>
+              <a:t>Async</a:t>
+            </a:r>
+            <a:r>
+              <a:rPr lang="en-US" dirty="0" smtClean="0"/>
+              <a:t> TCP Server Side</a:t>
+            </a:r>
+            <a:endParaRPr lang="en-US" dirty="0"/>
+          </a:p>
+        </p:txBody>
+      </p:sp>
+      <p:sp>
+        <p:nvSpPr>
+          <p:cNvPr id="3" name="Content Placeholder 2"/>
+          <p:cNvSpPr>
+            <a:spLocks noGrp="1"/>
+          </p:cNvSpPr>
+          <p:nvPr>
+            <p:ph idx="1"/>
+          </p:nvPr>
+        </p:nvSpPr>
+        <p:spPr/>
+        <p:txBody>
+          <a:bodyPr/>
+          <a:lstStyle/>
+          <a:p>
+            <a:endParaRPr lang="en-US" dirty="0"/>
+          </a:p>
+        </p:txBody>
+      </p:sp>
+      <p:sp>
+        <p:nvSpPr>
+          <p:cNvPr id="4" name="Title 1"/>
+          <p:cNvSpPr txBox="1">
+            <a:spLocks/>
+          </p:cNvSpPr>
+          <p:nvPr/>
+        </p:nvSpPr>
+        <p:spPr>
+          <a:xfrm>
+            <a:off x="457200" y="274638"/>
+            <a:ext cx="8229600" cy="1143000"/>
+          </a:xfrm>
+          <a:prstGeom prst="rect">
+            <a:avLst/>
+          </a:prstGeom>
+        </p:spPr>
+        <p:txBody>
+          <a:bodyPr vert="horz" lIns="91440" tIns="45720" rIns="91440" bIns="45720" rtlCol="0" anchor="ctr">
+            <a:normAutofit/>
+          </a:bodyPr>
+          <a:lstStyle/>
+          <a:p>
+            <a:pPr marL="0" marR="0" lvl="0" indent="0" algn="ctr" defTabSz="914400" rtl="0" eaLnBrk="1" fontAlgn="auto" latinLnBrk="0" hangingPunct="1">
+              <a:lnSpc>
+                <a:spcPct val="100000"/>
+              </a:lnSpc>
+              <a:spcBef>
+                <a:spcPct val="0"/>
+              </a:spcBef>
+              <a:spcAft>
+                <a:spcPts val="0"/>
+              </a:spcAft>
+              <a:buClrTx/>
+              <a:buSzTx/>
+              <a:buFontTx/>
+              <a:buNone/>
+              <a:tabLst/>
+              <a:defRPr/>
+            </a:pPr>
+            <a:endParaRPr kumimoji="0" lang="en-US" sz="4400" b="0" i="0" u="none" strike="noStrike" kern="1200" cap="none" spc="0" normalizeH="0" baseline="0" noProof="0" dirty="0">
+              <a:ln>
+                <a:noFill/>
+              </a:ln>
+              <a:solidFill>
+                <a:schemeClr val="tx1"/>
+              </a:solidFill>
+              <a:effectLst/>
+              <a:uLnTx/>
+              <a:uFillTx/>
+              <a:latin typeface="+mj-lt"/>
+              <a:ea typeface="+mj-ea"/>
+              <a:cs typeface="+mj-cs"/>
+            </a:endParaRPr>
+          </a:p>
+        </p:txBody>
+      </p:sp>
+      <p:sp>
+        <p:nvSpPr>
+          <p:cNvPr id="5" name="Rounded Rectangle 4"/>
+          <p:cNvSpPr/>
+          <p:nvPr/>
+        </p:nvSpPr>
+        <p:spPr>
+          <a:xfrm>
+            <a:off x="304800" y="1447800"/>
+            <a:ext cx="8534400" cy="4953000"/>
+          </a:xfrm>
+          <a:prstGeom prst="roundRect">
+            <a:avLst/>
+          </a:prstGeom>
+        </p:spPr>
+        <p:style>
+          <a:lnRef idx="2">
+            <a:schemeClr val="accent1">
+              <a:shade val="50000"/>
+            </a:schemeClr>
+          </a:lnRef>
+          <a:fillRef idx="1">
+            <a:schemeClr val="accent1"/>
+          </a:fillRef>
+          <a:effectRef idx="0">
+            <a:schemeClr val="accent1"/>
+          </a:effectRef>
+          <a:fontRef idx="minor">
+            <a:schemeClr val="lt1"/>
+          </a:fontRef>
+        </p:style>
+        <p:txBody>
+          <a:bodyPr rtlCol="0" anchor="ctr"/>
+          <a:lstStyle/>
+          <a:p>
+            <a:r>
+              <a:rPr lang="en-US" dirty="0" smtClean="0"/>
+              <a:t> </a:t>
+            </a:r>
+            <a:r>
+              <a:rPr lang="en-US" dirty="0" smtClean="0">
+                <a:latin typeface="Consolas" pitchFamily="49" charset="0"/>
+                <a:cs typeface="Consolas" pitchFamily="49" charset="0"/>
+              </a:rPr>
+              <a:t>void </a:t>
+            </a:r>
+            <a:r>
+              <a:rPr lang="en-US" dirty="0" err="1" smtClean="0">
+                <a:latin typeface="Consolas" pitchFamily="49" charset="0"/>
+                <a:cs typeface="Consolas" pitchFamily="49" charset="0"/>
+              </a:rPr>
+              <a:t>start_accept</a:t>
+            </a:r>
+            <a:r>
+              <a:rPr lang="en-US" dirty="0" smtClean="0">
+                <a:latin typeface="Consolas" pitchFamily="49" charset="0"/>
+                <a:cs typeface="Consolas" pitchFamily="49" charset="0"/>
+              </a:rPr>
+              <a:t>(</a:t>
+            </a:r>
+            <a:r>
+              <a:rPr lang="en-US" dirty="0" err="1" smtClean="0">
+                <a:latin typeface="Consolas" pitchFamily="49" charset="0"/>
+                <a:cs typeface="Consolas" pitchFamily="49" charset="0"/>
+              </a:rPr>
+              <a:t>socket_ptr</a:t>
+            </a:r>
+            <a:r>
+              <a:rPr lang="en-US" dirty="0" smtClean="0">
+                <a:latin typeface="Consolas" pitchFamily="49" charset="0"/>
+                <a:cs typeface="Consolas" pitchFamily="49" charset="0"/>
+              </a:rPr>
+              <a:t> socket)</a:t>
+            </a:r>
+          </a:p>
+          <a:p>
+            <a:r>
+              <a:rPr lang="en-US" dirty="0" smtClean="0">
+                <a:latin typeface="Consolas" pitchFamily="49" charset="0"/>
+                <a:cs typeface="Consolas" pitchFamily="49" charset="0"/>
+              </a:rPr>
+              <a:t> {</a:t>
+            </a:r>
+          </a:p>
+          <a:p>
+            <a:r>
+              <a:rPr lang="en-US" dirty="0" smtClean="0">
+                <a:latin typeface="Consolas" pitchFamily="49" charset="0"/>
+                <a:cs typeface="Consolas" pitchFamily="49" charset="0"/>
+              </a:rPr>
+              <a:t>    </a:t>
+            </a:r>
+            <a:r>
+              <a:rPr lang="en-US" dirty="0" err="1" smtClean="0">
+                <a:latin typeface="Consolas" pitchFamily="49" charset="0"/>
+                <a:cs typeface="Consolas" pitchFamily="49" charset="0"/>
+              </a:rPr>
+              <a:t>acc.async_accept</a:t>
+            </a:r>
+            <a:r>
+              <a:rPr lang="en-US" dirty="0" smtClean="0">
+                <a:latin typeface="Consolas" pitchFamily="49" charset="0"/>
+                <a:cs typeface="Consolas" pitchFamily="49" charset="0"/>
+              </a:rPr>
+              <a:t>( *socket, </a:t>
+            </a:r>
+          </a:p>
+          <a:p>
+            <a:r>
+              <a:rPr lang="en-US" dirty="0" smtClean="0">
+                <a:latin typeface="Consolas" pitchFamily="49" charset="0"/>
+                <a:cs typeface="Consolas" pitchFamily="49" charset="0"/>
+              </a:rPr>
+              <a:t>	boost::bind( </a:t>
+            </a:r>
+          </a:p>
+          <a:p>
+            <a:r>
+              <a:rPr lang="en-US" dirty="0" smtClean="0">
+                <a:latin typeface="Consolas" pitchFamily="49" charset="0"/>
+                <a:cs typeface="Consolas" pitchFamily="49" charset="0"/>
+              </a:rPr>
+              <a:t>	    </a:t>
+            </a:r>
+            <a:r>
+              <a:rPr lang="en-US" dirty="0" err="1" smtClean="0">
+                <a:latin typeface="Consolas" pitchFamily="49" charset="0"/>
+                <a:cs typeface="Consolas" pitchFamily="49" charset="0"/>
+              </a:rPr>
+              <a:t>handle_accept</a:t>
+            </a:r>
+            <a:r>
+              <a:rPr lang="en-US" dirty="0" smtClean="0">
+                <a:latin typeface="Consolas" pitchFamily="49" charset="0"/>
+                <a:cs typeface="Consolas" pitchFamily="49" charset="0"/>
+              </a:rPr>
+              <a:t>, </a:t>
+            </a:r>
+          </a:p>
+          <a:p>
+            <a:r>
+              <a:rPr lang="en-US" dirty="0" smtClean="0">
+                <a:latin typeface="Consolas" pitchFamily="49" charset="0"/>
+                <a:cs typeface="Consolas" pitchFamily="49" charset="0"/>
+              </a:rPr>
+              <a:t>	    socket, </a:t>
+            </a:r>
+          </a:p>
+          <a:p>
+            <a:r>
+              <a:rPr lang="en-US" dirty="0" smtClean="0">
+                <a:latin typeface="Consolas" pitchFamily="49" charset="0"/>
+                <a:cs typeface="Consolas" pitchFamily="49" charset="0"/>
+              </a:rPr>
+              <a:t>          boost::</a:t>
+            </a:r>
+            <a:r>
+              <a:rPr lang="en-US" dirty="0" err="1" smtClean="0">
+                <a:latin typeface="Consolas" pitchFamily="49" charset="0"/>
+                <a:cs typeface="Consolas" pitchFamily="49" charset="0"/>
+              </a:rPr>
+              <a:t>asio</a:t>
+            </a:r>
+            <a:r>
+              <a:rPr lang="en-US" dirty="0" smtClean="0">
+                <a:latin typeface="Consolas" pitchFamily="49" charset="0"/>
+                <a:cs typeface="Consolas" pitchFamily="49" charset="0"/>
+              </a:rPr>
+              <a:t>::placeholders::error) );</a:t>
+            </a:r>
+          </a:p>
+          <a:p>
+            <a:r>
+              <a:rPr lang="en-US" dirty="0" smtClean="0">
+                <a:latin typeface="Consolas" pitchFamily="49" charset="0"/>
+                <a:cs typeface="Consolas" pitchFamily="49" charset="0"/>
+              </a:rPr>
+              <a:t> }</a:t>
+            </a:r>
+          </a:p>
+          <a:p>
+            <a:r>
+              <a:rPr lang="en-US" dirty="0" smtClean="0">
+                <a:latin typeface="Consolas" pitchFamily="49" charset="0"/>
+                <a:cs typeface="Consolas" pitchFamily="49" charset="0"/>
+              </a:rPr>
+              <a:t> void </a:t>
+            </a:r>
+            <a:r>
+              <a:rPr lang="en-US" dirty="0" err="1" smtClean="0">
+                <a:latin typeface="Consolas" pitchFamily="49" charset="0"/>
+                <a:cs typeface="Consolas" pitchFamily="49" charset="0"/>
+              </a:rPr>
+              <a:t>handle_accept</a:t>
+            </a:r>
+            <a:r>
+              <a:rPr lang="en-US" dirty="0" smtClean="0">
+                <a:latin typeface="Consolas" pitchFamily="49" charset="0"/>
+                <a:cs typeface="Consolas" pitchFamily="49" charset="0"/>
+              </a:rPr>
+              <a:t>(</a:t>
+            </a:r>
+            <a:r>
+              <a:rPr lang="en-US" dirty="0" err="1" smtClean="0">
+                <a:latin typeface="Consolas" pitchFamily="49" charset="0"/>
+                <a:cs typeface="Consolas" pitchFamily="49" charset="0"/>
+              </a:rPr>
+              <a:t>socket_ptr</a:t>
+            </a:r>
+            <a:r>
+              <a:rPr lang="en-US" dirty="0" smtClean="0">
+                <a:latin typeface="Consolas" pitchFamily="49" charset="0"/>
+                <a:cs typeface="Consolas" pitchFamily="49" charset="0"/>
+              </a:rPr>
+              <a:t> socket, const 	boost::system::</a:t>
+            </a:r>
+            <a:r>
+              <a:rPr lang="en-US" dirty="0" err="1" smtClean="0">
+                <a:latin typeface="Consolas" pitchFamily="49" charset="0"/>
+                <a:cs typeface="Consolas" pitchFamily="49" charset="0"/>
+              </a:rPr>
+              <a:t>error_code</a:t>
+            </a:r>
+            <a:r>
+              <a:rPr lang="en-US" dirty="0" smtClean="0">
+                <a:latin typeface="Consolas" pitchFamily="49" charset="0"/>
+                <a:cs typeface="Consolas" pitchFamily="49" charset="0"/>
+              </a:rPr>
+              <a:t> &amp; error) </a:t>
+            </a:r>
+          </a:p>
+          <a:p>
+            <a:r>
+              <a:rPr lang="en-US" dirty="0" smtClean="0">
+                <a:latin typeface="Consolas" pitchFamily="49" charset="0"/>
+                <a:cs typeface="Consolas" pitchFamily="49" charset="0"/>
+              </a:rPr>
+              <a:t> {</a:t>
+            </a:r>
+          </a:p>
+          <a:p>
+            <a:r>
+              <a:rPr lang="en-US" dirty="0" smtClean="0">
+                <a:latin typeface="Consolas" pitchFamily="49" charset="0"/>
+                <a:cs typeface="Consolas" pitchFamily="49" charset="0"/>
+              </a:rPr>
+              <a:t>	if ( error ) return;</a:t>
+            </a:r>
+          </a:p>
+          <a:p>
+            <a:r>
+              <a:rPr lang="en-US" dirty="0" smtClean="0">
+                <a:latin typeface="Consolas" pitchFamily="49" charset="0"/>
+                <a:cs typeface="Consolas" pitchFamily="49" charset="0"/>
+              </a:rPr>
+              <a:t>	</a:t>
+            </a:r>
+            <a:r>
+              <a:rPr lang="en-US" i="1" dirty="0" smtClean="0">
+                <a:latin typeface="Consolas" pitchFamily="49" charset="0"/>
+                <a:cs typeface="Consolas" pitchFamily="49" charset="0"/>
+              </a:rPr>
+              <a:t>// actions with new socket</a:t>
+            </a:r>
+          </a:p>
+          <a:p>
+            <a:r>
+              <a:rPr lang="en-US" dirty="0" smtClean="0">
+                <a:latin typeface="Consolas" pitchFamily="49" charset="0"/>
+                <a:cs typeface="Consolas" pitchFamily="49" charset="0"/>
+              </a:rPr>
+              <a:t>	 </a:t>
+            </a:r>
+            <a:r>
+              <a:rPr lang="en-US" dirty="0" err="1" smtClean="0">
+                <a:latin typeface="Consolas" pitchFamily="49" charset="0"/>
+                <a:cs typeface="Consolas" pitchFamily="49" charset="0"/>
+              </a:rPr>
+              <a:t>socket_ptr</a:t>
+            </a:r>
+            <a:r>
+              <a:rPr lang="en-US" dirty="0" smtClean="0">
+                <a:latin typeface="Consolas" pitchFamily="49" charset="0"/>
+                <a:cs typeface="Consolas" pitchFamily="49" charset="0"/>
+              </a:rPr>
+              <a:t> </a:t>
+            </a:r>
+            <a:r>
+              <a:rPr lang="en-US" dirty="0" err="1" smtClean="0">
+                <a:latin typeface="Consolas" pitchFamily="49" charset="0"/>
+                <a:cs typeface="Consolas" pitchFamily="49" charset="0"/>
+              </a:rPr>
+              <a:t>new_socket</a:t>
+            </a:r>
+            <a:r>
+              <a:rPr lang="en-US" dirty="0" smtClean="0">
+                <a:latin typeface="Consolas" pitchFamily="49" charset="0"/>
+                <a:cs typeface="Consolas" pitchFamily="49" charset="0"/>
+              </a:rPr>
+              <a:t>(</a:t>
+            </a:r>
+          </a:p>
+          <a:p>
+            <a:r>
+              <a:rPr lang="en-US" dirty="0" smtClean="0">
+                <a:latin typeface="Consolas" pitchFamily="49" charset="0"/>
+                <a:cs typeface="Consolas" pitchFamily="49" charset="0"/>
+              </a:rPr>
+              <a:t>		new </a:t>
+            </a:r>
+            <a:r>
+              <a:rPr lang="en-US" dirty="0" err="1" smtClean="0">
+                <a:latin typeface="Consolas" pitchFamily="49" charset="0"/>
+                <a:cs typeface="Consolas" pitchFamily="49" charset="0"/>
+              </a:rPr>
+              <a:t>ip</a:t>
+            </a:r>
+            <a:r>
+              <a:rPr lang="en-US" dirty="0" smtClean="0">
+                <a:latin typeface="Consolas" pitchFamily="49" charset="0"/>
+                <a:cs typeface="Consolas" pitchFamily="49" charset="0"/>
+              </a:rPr>
+              <a:t>::</a:t>
+            </a:r>
+            <a:r>
+              <a:rPr lang="en-US" dirty="0" err="1" smtClean="0">
+                <a:latin typeface="Consolas" pitchFamily="49" charset="0"/>
+                <a:cs typeface="Consolas" pitchFamily="49" charset="0"/>
+              </a:rPr>
+              <a:t>tcp</a:t>
+            </a:r>
+            <a:r>
+              <a:rPr lang="en-US" dirty="0" smtClean="0">
+                <a:latin typeface="Consolas" pitchFamily="49" charset="0"/>
+                <a:cs typeface="Consolas" pitchFamily="49" charset="0"/>
+              </a:rPr>
+              <a:t>::socket(service));</a:t>
+            </a:r>
+          </a:p>
+          <a:p>
+            <a:r>
+              <a:rPr lang="en-US" dirty="0" smtClean="0">
+                <a:latin typeface="Consolas" pitchFamily="49" charset="0"/>
+                <a:cs typeface="Consolas" pitchFamily="49" charset="0"/>
+              </a:rPr>
+              <a:t>	 </a:t>
+            </a:r>
+            <a:r>
+              <a:rPr lang="en-US" dirty="0" err="1" smtClean="0">
+                <a:latin typeface="Consolas" pitchFamily="49" charset="0"/>
+                <a:cs typeface="Consolas" pitchFamily="49" charset="0"/>
+              </a:rPr>
+              <a:t>start_accept</a:t>
+            </a:r>
+            <a:r>
+              <a:rPr lang="en-US" dirty="0" smtClean="0">
+                <a:latin typeface="Consolas" pitchFamily="49" charset="0"/>
+                <a:cs typeface="Consolas" pitchFamily="49" charset="0"/>
+              </a:rPr>
+              <a:t>(</a:t>
+            </a:r>
+            <a:r>
+              <a:rPr lang="en-US" dirty="0" err="1" smtClean="0">
+                <a:latin typeface="Consolas" pitchFamily="49" charset="0"/>
+                <a:cs typeface="Consolas" pitchFamily="49" charset="0"/>
+              </a:rPr>
+              <a:t>new_socket</a:t>
+            </a:r>
+            <a:r>
+              <a:rPr lang="en-US" dirty="0" smtClean="0">
+                <a:latin typeface="Consolas" pitchFamily="49" charset="0"/>
+                <a:cs typeface="Consolas" pitchFamily="49" charset="0"/>
+              </a:rPr>
+              <a:t>);</a:t>
+            </a:r>
+          </a:p>
+          <a:p>
+            <a:r>
+              <a:rPr lang="en-US" dirty="0" smtClean="0">
+                <a:latin typeface="Consolas" pitchFamily="49" charset="0"/>
+                <a:cs typeface="Consolas" pitchFamily="49" charset="0"/>
+              </a:rPr>
+              <a:t> }</a:t>
+            </a:r>
+          </a:p>
+        </p:txBody>
+      </p:sp>
+    </p:spTree>
+  </p:cSld>
+  <p:clrMapOvr>
+    <a:masterClrMapping/>
+  </p:clrMapOvr>
+</p:sld>
+</file>
+
+<file path=ppt/slides/slide29.xml><?xml version="1.0" encoding="utf-8"?>
+<p:sld xmlns:a="http://schemas.openxmlformats.org/drawingml/2006/main" xmlns:r="http://schemas.openxmlformats.org/officeDocument/2006/relationships" xmlns:p="http://schemas.openxmlformats.org/presentationml/2006/main">
+  <p:cSld>
+    <p:spTree>
+      <p:nvGrpSpPr>
+        <p:cNvPr id="1" name=""/>
+        <p:cNvGrpSpPr/>
+        <p:nvPr/>
+      </p:nvGrpSpPr>
+      <p:grpSpPr>
+        <a:xfrm>
+          <a:off x="0" y="0"/>
+          <a:ext cx="0" cy="0"/>
+          <a:chOff x="0" y="0"/>
+          <a:chExt cx="0" cy="0"/>
+        </a:xfrm>
+      </p:grpSpPr>
+      <p:sp>
+        <p:nvSpPr>
+          <p:cNvPr id="2" name="Title 1"/>
+          <p:cNvSpPr>
+            <a:spLocks noGrp="1"/>
+          </p:cNvSpPr>
+          <p:nvPr>
+            <p:ph type="title"/>
+          </p:nvPr>
+        </p:nvSpPr>
+        <p:spPr/>
+        <p:txBody>
+          <a:bodyPr/>
+          <a:lstStyle/>
+          <a:p>
+            <a:r>
+              <a:rPr lang="en-US" dirty="0" err="1" smtClean="0"/>
+              <a:t>Async</a:t>
+            </a:r>
+            <a:r>
+              <a:rPr lang="en-US" dirty="0" smtClean="0"/>
+              <a:t> TCP Client Side</a:t>
+            </a:r>
+            <a:endParaRPr lang="en-US" dirty="0"/>
+          </a:p>
+        </p:txBody>
+      </p:sp>
+      <p:sp>
+        <p:nvSpPr>
+          <p:cNvPr id="3" name="Content Placeholder 2"/>
+          <p:cNvSpPr>
+            <a:spLocks noGrp="1"/>
+          </p:cNvSpPr>
+          <p:nvPr>
+            <p:ph idx="1"/>
+          </p:nvPr>
+        </p:nvSpPr>
+        <p:spPr/>
+        <p:txBody>
+          <a:bodyPr/>
+          <a:lstStyle/>
+          <a:p>
+            <a:endParaRPr lang="en-US"/>
+          </a:p>
+        </p:txBody>
+      </p:sp>
+      <p:sp>
+        <p:nvSpPr>
+          <p:cNvPr id="4" name="Rounded Rectangle 3"/>
+          <p:cNvSpPr/>
+          <p:nvPr/>
+        </p:nvSpPr>
+        <p:spPr>
+          <a:xfrm>
+            <a:off x="304800" y="1447800"/>
+            <a:ext cx="8534400" cy="4953000"/>
+          </a:xfrm>
+          <a:prstGeom prst="roundRect">
+            <a:avLst/>
+          </a:prstGeom>
+        </p:spPr>
+        <p:style>
+          <a:lnRef idx="2">
+            <a:schemeClr val="accent1">
+              <a:shade val="50000"/>
+            </a:schemeClr>
+          </a:lnRef>
+          <a:fillRef idx="1">
+            <a:schemeClr val="accent1"/>
+          </a:fillRef>
+          <a:effectRef idx="0">
+            <a:schemeClr val="accent1"/>
+          </a:effectRef>
+          <a:fontRef idx="minor">
+            <a:schemeClr val="lt1"/>
+          </a:fontRef>
+        </p:style>
+        <p:txBody>
+          <a:bodyPr rtlCol="0" anchor="ctr"/>
+          <a:lstStyle/>
+          <a:p>
+            <a:r>
+              <a:rPr lang="en-US" sz="2000" dirty="0" err="1" smtClean="0">
+                <a:latin typeface="Consolas" pitchFamily="49" charset="0"/>
+                <a:cs typeface="Consolas" pitchFamily="49" charset="0"/>
+              </a:rPr>
+              <a:t>ip</a:t>
+            </a:r>
+            <a:r>
+              <a:rPr lang="en-US" sz="2000" dirty="0" smtClean="0">
+                <a:latin typeface="Consolas" pitchFamily="49" charset="0"/>
+                <a:cs typeface="Consolas" pitchFamily="49" charset="0"/>
+              </a:rPr>
+              <a:t>::</a:t>
+            </a:r>
+            <a:r>
+              <a:rPr lang="en-US" sz="2000" dirty="0" err="1" smtClean="0">
+                <a:latin typeface="Consolas" pitchFamily="49" charset="0"/>
+                <a:cs typeface="Consolas" pitchFamily="49" charset="0"/>
+              </a:rPr>
+              <a:t>tcp</a:t>
+            </a:r>
+            <a:r>
+              <a:rPr lang="en-US" sz="2000" dirty="0" smtClean="0">
+                <a:latin typeface="Consolas" pitchFamily="49" charset="0"/>
+                <a:cs typeface="Consolas" pitchFamily="49" charset="0"/>
+              </a:rPr>
+              <a:t>::endpoint </a:t>
+            </a:r>
+            <a:r>
+              <a:rPr lang="en-US" sz="2000" dirty="0" err="1" smtClean="0">
+                <a:latin typeface="Consolas" pitchFamily="49" charset="0"/>
+                <a:cs typeface="Consolas" pitchFamily="49" charset="0"/>
+              </a:rPr>
+              <a:t>ep</a:t>
+            </a:r>
+            <a:r>
+              <a:rPr lang="en-US" sz="2000" dirty="0" smtClean="0">
+                <a:latin typeface="Consolas" pitchFamily="49" charset="0"/>
+                <a:cs typeface="Consolas" pitchFamily="49" charset="0"/>
+              </a:rPr>
+              <a:t>(</a:t>
+            </a:r>
+            <a:r>
+              <a:rPr lang="en-US" sz="2000" dirty="0" err="1" smtClean="0">
+                <a:latin typeface="Consolas" pitchFamily="49" charset="0"/>
+                <a:cs typeface="Consolas" pitchFamily="49" charset="0"/>
+              </a:rPr>
+              <a:t>from_string</a:t>
+            </a:r>
+            <a:r>
+              <a:rPr lang="en-US" sz="2000" dirty="0" smtClean="0">
+                <a:latin typeface="Consolas" pitchFamily="49" charset="0"/>
+                <a:cs typeface="Consolas" pitchFamily="49" charset="0"/>
+              </a:rPr>
+              <a:t>("127.0.0.1"), 50000); </a:t>
+            </a:r>
+          </a:p>
+          <a:p>
+            <a:r>
+              <a:rPr lang="en-US" sz="2000" dirty="0" err="1" smtClean="0">
+                <a:latin typeface="Consolas" pitchFamily="49" charset="0"/>
+                <a:cs typeface="Consolas" pitchFamily="49" charset="0"/>
+              </a:rPr>
+              <a:t>sock.async_connect</a:t>
+            </a:r>
+            <a:r>
+              <a:rPr lang="en-US" sz="2000" dirty="0" smtClean="0">
+                <a:latin typeface="Consolas" pitchFamily="49" charset="0"/>
+                <a:cs typeface="Consolas" pitchFamily="49" charset="0"/>
+              </a:rPr>
+              <a:t>(</a:t>
+            </a:r>
+            <a:r>
+              <a:rPr lang="en-US" sz="2000" dirty="0" err="1" smtClean="0">
+                <a:latin typeface="Consolas" pitchFamily="49" charset="0"/>
+                <a:cs typeface="Consolas" pitchFamily="49" charset="0"/>
+              </a:rPr>
+              <a:t>ep</a:t>
+            </a:r>
+            <a:r>
+              <a:rPr lang="en-US" sz="2000" dirty="0" smtClean="0">
+                <a:latin typeface="Consolas" pitchFamily="49" charset="0"/>
+                <a:cs typeface="Consolas" pitchFamily="49" charset="0"/>
+              </a:rPr>
+              <a:t>, </a:t>
+            </a:r>
+            <a:r>
+              <a:rPr lang="en-US" sz="2000" dirty="0" err="1" smtClean="0">
+                <a:latin typeface="Consolas" pitchFamily="49" charset="0"/>
+                <a:cs typeface="Consolas" pitchFamily="49" charset="0"/>
+              </a:rPr>
+              <a:t>on_connect</a:t>
+            </a:r>
+            <a:r>
+              <a:rPr lang="en-US" sz="2000" dirty="0" smtClean="0">
+                <a:latin typeface="Consolas" pitchFamily="49" charset="0"/>
+                <a:cs typeface="Consolas" pitchFamily="49" charset="0"/>
+              </a:rPr>
+              <a:t>); </a:t>
+            </a:r>
+          </a:p>
+          <a:p>
+            <a:r>
+              <a:rPr lang="en-US" sz="2000" dirty="0" err="1" smtClean="0">
+                <a:latin typeface="Consolas" pitchFamily="49" charset="0"/>
+                <a:cs typeface="Consolas" pitchFamily="49" charset="0"/>
+              </a:rPr>
+              <a:t>service.run</a:t>
+            </a:r>
+            <a:r>
+              <a:rPr lang="en-US" sz="2000" dirty="0" smtClean="0">
+                <a:latin typeface="Consolas" pitchFamily="49" charset="0"/>
+                <a:cs typeface="Consolas" pitchFamily="49" charset="0"/>
+              </a:rPr>
+              <a:t>();</a:t>
+            </a:r>
+          </a:p>
+          <a:p>
+            <a:endParaRPr lang="en-US" sz="2000" dirty="0" smtClean="0">
+              <a:latin typeface="Consolas" pitchFamily="49" charset="0"/>
+              <a:cs typeface="Consolas" pitchFamily="49" charset="0"/>
+            </a:endParaRPr>
+          </a:p>
+          <a:p>
+            <a:r>
+              <a:rPr lang="en-US" sz="2000" dirty="0" smtClean="0">
+                <a:latin typeface="Consolas" pitchFamily="49" charset="0"/>
+                <a:cs typeface="Consolas" pitchFamily="49" charset="0"/>
+              </a:rPr>
+              <a:t>void </a:t>
+            </a:r>
+            <a:r>
+              <a:rPr lang="en-US" sz="2000" dirty="0" err="1" smtClean="0">
+                <a:latin typeface="Consolas" pitchFamily="49" charset="0"/>
+                <a:cs typeface="Consolas" pitchFamily="49" charset="0"/>
+              </a:rPr>
+              <a:t>on_read</a:t>
+            </a:r>
+            <a:r>
+              <a:rPr lang="en-US" sz="2000" dirty="0" smtClean="0">
+                <a:latin typeface="Consolas" pitchFamily="49" charset="0"/>
+                <a:cs typeface="Consolas" pitchFamily="49" charset="0"/>
+              </a:rPr>
+              <a:t>(const boost::system::</a:t>
+            </a:r>
+            <a:r>
+              <a:rPr lang="en-US" sz="2000" dirty="0" err="1" smtClean="0">
+                <a:latin typeface="Consolas" pitchFamily="49" charset="0"/>
+                <a:cs typeface="Consolas" pitchFamily="49" charset="0"/>
+              </a:rPr>
+              <a:t>error_code</a:t>
+            </a:r>
+            <a:r>
+              <a:rPr lang="en-US" sz="2000" dirty="0" smtClean="0">
+                <a:latin typeface="Consolas" pitchFamily="49" charset="0"/>
+                <a:cs typeface="Consolas" pitchFamily="49" charset="0"/>
+              </a:rPr>
+              <a:t> &amp;err, std::</a:t>
+            </a:r>
+            <a:r>
+              <a:rPr lang="en-US" sz="2000" dirty="0" err="1" smtClean="0">
+                <a:latin typeface="Consolas" pitchFamily="49" charset="0"/>
+                <a:cs typeface="Consolas" pitchFamily="49" charset="0"/>
+              </a:rPr>
+              <a:t>size_t</a:t>
+            </a:r>
+            <a:r>
+              <a:rPr lang="en-US" sz="2000" dirty="0" smtClean="0">
+                <a:latin typeface="Consolas" pitchFamily="49" charset="0"/>
+                <a:cs typeface="Consolas" pitchFamily="49" charset="0"/>
+              </a:rPr>
+              <a:t> bytes)</a:t>
+            </a:r>
+          </a:p>
+          <a:p>
+            <a:r>
+              <a:rPr lang="en-US" sz="2000" dirty="0" smtClean="0">
+                <a:latin typeface="Consolas" pitchFamily="49" charset="0"/>
+                <a:cs typeface="Consolas" pitchFamily="49" charset="0"/>
+              </a:rPr>
+              <a:t>{</a:t>
+            </a:r>
+          </a:p>
+          <a:p>
+            <a:r>
+              <a:rPr lang="en-US" sz="2000" dirty="0" smtClean="0">
+                <a:latin typeface="Consolas" pitchFamily="49" charset="0"/>
+                <a:cs typeface="Consolas" pitchFamily="49" charset="0"/>
+              </a:rPr>
+              <a:t>}</a:t>
+            </a:r>
+          </a:p>
+          <a:p>
+            <a:r>
+              <a:rPr lang="en-US" sz="2000" dirty="0" smtClean="0">
+                <a:latin typeface="Consolas" pitchFamily="49" charset="0"/>
+                <a:cs typeface="Consolas" pitchFamily="49" charset="0"/>
+              </a:rPr>
+              <a:t>void </a:t>
+            </a:r>
+            <a:r>
+              <a:rPr lang="en-US" sz="2000" dirty="0" err="1" smtClean="0">
+                <a:latin typeface="Consolas" pitchFamily="49" charset="0"/>
+                <a:cs typeface="Consolas" pitchFamily="49" charset="0"/>
+              </a:rPr>
+              <a:t>on_connect</a:t>
+            </a:r>
+            <a:r>
+              <a:rPr lang="en-US" sz="2000" dirty="0" smtClean="0">
+                <a:latin typeface="Consolas" pitchFamily="49" charset="0"/>
+                <a:cs typeface="Consolas" pitchFamily="49" charset="0"/>
+              </a:rPr>
+              <a:t>(const boost::system::</a:t>
+            </a:r>
+            <a:r>
+              <a:rPr lang="en-US" sz="2000" dirty="0" err="1" smtClean="0">
+                <a:latin typeface="Consolas" pitchFamily="49" charset="0"/>
+                <a:cs typeface="Consolas" pitchFamily="49" charset="0"/>
+              </a:rPr>
+              <a:t>error_code</a:t>
+            </a:r>
+            <a:r>
+              <a:rPr lang="en-US" sz="2000" dirty="0" smtClean="0">
+                <a:latin typeface="Consolas" pitchFamily="49" charset="0"/>
+                <a:cs typeface="Consolas" pitchFamily="49" charset="0"/>
+              </a:rPr>
+              <a:t> &amp;err) </a:t>
+            </a:r>
+          </a:p>
+          <a:p>
+            <a:r>
+              <a:rPr lang="en-US" sz="2000" dirty="0" smtClean="0">
+                <a:latin typeface="Consolas" pitchFamily="49" charset="0"/>
+                <a:cs typeface="Consolas" pitchFamily="49" charset="0"/>
+              </a:rPr>
+              <a:t>{</a:t>
+            </a:r>
+          </a:p>
+          <a:p>
+            <a:r>
+              <a:rPr lang="en-US" sz="2000" dirty="0" smtClean="0">
+                <a:latin typeface="Consolas" pitchFamily="49" charset="0"/>
+                <a:cs typeface="Consolas" pitchFamily="49" charset="0"/>
+              </a:rPr>
+              <a:t>	</a:t>
+            </a:r>
+            <a:r>
+              <a:rPr lang="en-US" sz="2000" dirty="0" err="1" smtClean="0">
+                <a:latin typeface="Consolas" pitchFamily="49" charset="0"/>
+                <a:cs typeface="Consolas" pitchFamily="49" charset="0"/>
+              </a:rPr>
+              <a:t>socket.async_read_some</a:t>
+            </a:r>
+            <a:r>
+              <a:rPr lang="en-US" sz="2000" dirty="0" smtClean="0">
+                <a:latin typeface="Consolas" pitchFamily="49" charset="0"/>
+                <a:cs typeface="Consolas" pitchFamily="49" charset="0"/>
+              </a:rPr>
+              <a:t>(buffer(</a:t>
+            </a:r>
+            <a:r>
+              <a:rPr lang="en-US" sz="2000" dirty="0" err="1" smtClean="0">
+                <a:latin typeface="Consolas" pitchFamily="49" charset="0"/>
+                <a:cs typeface="Consolas" pitchFamily="49" charset="0"/>
+              </a:rPr>
+              <a:t>buff_read</a:t>
+            </a:r>
+            <a:r>
+              <a:rPr lang="en-US" sz="2000" dirty="0" smtClean="0">
+                <a:latin typeface="Consolas" pitchFamily="49" charset="0"/>
+                <a:cs typeface="Consolas" pitchFamily="49" charset="0"/>
+              </a:rPr>
+              <a:t>), </a:t>
+            </a:r>
+            <a:r>
+              <a:rPr lang="en-US" sz="2000" dirty="0" err="1" smtClean="0">
+                <a:latin typeface="Consolas" pitchFamily="49" charset="0"/>
+                <a:cs typeface="Consolas" pitchFamily="49" charset="0"/>
+              </a:rPr>
+              <a:t>on_read</a:t>
+            </a:r>
+            <a:r>
+              <a:rPr lang="en-US" sz="2000" dirty="0" smtClean="0">
+                <a:latin typeface="Consolas" pitchFamily="49" charset="0"/>
+                <a:cs typeface="Consolas" pitchFamily="49" charset="0"/>
+              </a:rPr>
+              <a:t>); </a:t>
+            </a:r>
+          </a:p>
+          <a:p>
+            <a:r>
+              <a:rPr lang="en-US" sz="2000" dirty="0" smtClean="0">
+                <a:latin typeface="Consolas" pitchFamily="49" charset="0"/>
+                <a:cs typeface="Consolas" pitchFamily="49" charset="0"/>
+              </a:rPr>
+              <a:t>}</a:t>
+            </a:r>
           </a:p>
         </p:txBody>
       </p:sp>
@@ -19678,13 +21707,7 @@
               <a:rPr lang="en-US" dirty="0" smtClean="0">
                 <a:hlinkClick r:id="rId2"/>
               </a:rPr>
-              <a:t>http://</a:t>
-            </a:r>
-            <a:r>
-              <a:rPr lang="en-US" dirty="0" smtClean="0">
-                <a:hlinkClick r:id="rId2"/>
-              </a:rPr>
-              <a:t>en.wikipedia.org/wiki/OSI_model</a:t>
+              <a:t>http://en.wikipedia.org/wiki/OSI_model</a:t>
             </a:r>
             <a:endParaRPr lang="en-US" dirty="0" smtClean="0"/>
           </a:p>
@@ -19728,6 +21751,1997 @@
 </p:sld>
 </file>
 
+<file path=ppt/slides/slide30.xml><?xml version="1.0" encoding="utf-8"?>
+<p:sld xmlns:a="http://schemas.openxmlformats.org/drawingml/2006/main" xmlns:r="http://schemas.openxmlformats.org/officeDocument/2006/relationships" xmlns:p="http://schemas.openxmlformats.org/presentationml/2006/main">
+  <p:cSld>
+    <p:spTree>
+      <p:nvGrpSpPr>
+        <p:cNvPr id="1" name=""/>
+        <p:cNvGrpSpPr/>
+        <p:nvPr/>
+      </p:nvGrpSpPr>
+      <p:grpSpPr>
+        <a:xfrm>
+          <a:off x="0" y="0"/>
+          <a:ext cx="0" cy="0"/>
+          <a:chOff x="0" y="0"/>
+          <a:chExt cx="0" cy="0"/>
+        </a:xfrm>
+      </p:grpSpPr>
+      <p:sp>
+        <p:nvSpPr>
+          <p:cNvPr id="2" name="Title 1"/>
+          <p:cNvSpPr>
+            <a:spLocks noGrp="1"/>
+          </p:cNvSpPr>
+          <p:nvPr>
+            <p:ph type="title"/>
+          </p:nvPr>
+        </p:nvSpPr>
+        <p:spPr/>
+        <p:txBody>
+          <a:bodyPr/>
+          <a:lstStyle/>
+          <a:p>
+            <a:r>
+              <a:rPr lang="en-US" dirty="0" smtClean="0"/>
+              <a:t>boost::</a:t>
+            </a:r>
+            <a:r>
+              <a:rPr lang="en-US" dirty="0" err="1" smtClean="0"/>
+              <a:t>asio</a:t>
+            </a:r>
+            <a:r>
+              <a:rPr lang="en-US" dirty="0" smtClean="0"/>
+              <a:t>::</a:t>
+            </a:r>
+            <a:r>
+              <a:rPr lang="en-US" dirty="0" err="1" smtClean="0"/>
+              <a:t>io_service</a:t>
+            </a:r>
+            <a:endParaRPr lang="en-US" dirty="0"/>
+          </a:p>
+        </p:txBody>
+      </p:sp>
+      <p:sp>
+        <p:nvSpPr>
+          <p:cNvPr id="3" name="Content Placeholder 2"/>
+          <p:cNvSpPr>
+            <a:spLocks noGrp="1"/>
+          </p:cNvSpPr>
+          <p:nvPr>
+            <p:ph idx="1"/>
+          </p:nvPr>
+        </p:nvSpPr>
+        <p:spPr/>
+        <p:txBody>
+          <a:bodyPr/>
+          <a:lstStyle/>
+          <a:p>
+            <a:endParaRPr lang="en-US"/>
+          </a:p>
+        </p:txBody>
+      </p:sp>
+      <p:sp>
+        <p:nvSpPr>
+          <p:cNvPr id="4" name="Rounded Rectangle 3"/>
+          <p:cNvSpPr/>
+          <p:nvPr/>
+        </p:nvSpPr>
+        <p:spPr>
+          <a:xfrm>
+            <a:off x="304800" y="1447800"/>
+            <a:ext cx="8534400" cy="4953000"/>
+          </a:xfrm>
+          <a:prstGeom prst="roundRect">
+            <a:avLst/>
+          </a:prstGeom>
+        </p:spPr>
+        <p:style>
+          <a:lnRef idx="2">
+            <a:schemeClr val="accent1">
+              <a:shade val="50000"/>
+            </a:schemeClr>
+          </a:lnRef>
+          <a:fillRef idx="1">
+            <a:schemeClr val="accent1"/>
+          </a:fillRef>
+          <a:effectRef idx="0">
+            <a:schemeClr val="accent1"/>
+          </a:effectRef>
+          <a:fontRef idx="minor">
+            <a:schemeClr val="lt1"/>
+          </a:fontRef>
+        </p:style>
+        <p:txBody>
+          <a:bodyPr rtlCol="0" anchor="ctr"/>
+          <a:lstStyle/>
+          <a:p>
+            <a:r>
+              <a:rPr lang="en-US" sz="2000" dirty="0" err="1" smtClean="0"/>
+              <a:t>io_service</a:t>
+            </a:r>
+            <a:r>
+              <a:rPr lang="en-US" sz="2000" dirty="0" smtClean="0"/>
+              <a:t> service;</a:t>
+            </a:r>
+          </a:p>
+          <a:p>
+            <a:endParaRPr lang="en-US" sz="2000" dirty="0" smtClean="0"/>
+          </a:p>
+          <a:p>
+            <a:r>
+              <a:rPr lang="en-US" sz="2000" dirty="0" smtClean="0"/>
+              <a:t>for ( </a:t>
+            </a:r>
+            <a:r>
+              <a:rPr lang="en-US" sz="2000" dirty="0" err="1" smtClean="0"/>
+              <a:t>size_t</a:t>
+            </a:r>
+            <a:r>
+              <a:rPr lang="en-US" sz="2000" dirty="0" smtClean="0"/>
+              <a:t> </a:t>
+            </a:r>
+            <a:r>
+              <a:rPr lang="en-US" sz="2000" dirty="0" err="1" smtClean="0"/>
+              <a:t>i</a:t>
+            </a:r>
+            <a:r>
+              <a:rPr lang="en-US" sz="2000" dirty="0" smtClean="0"/>
+              <a:t> = 0; </a:t>
+            </a:r>
+            <a:r>
+              <a:rPr lang="en-US" sz="2000" dirty="0" err="1" smtClean="0"/>
+              <a:t>i</a:t>
+            </a:r>
+            <a:r>
+              <a:rPr lang="en-US" sz="2000" dirty="0" smtClean="0"/>
+              <a:t> &lt; N; ++</a:t>
+            </a:r>
+            <a:r>
+              <a:rPr lang="en-US" sz="2000" dirty="0" err="1" smtClean="0"/>
+              <a:t>i</a:t>
+            </a:r>
+            <a:r>
+              <a:rPr lang="en-US" sz="2000" dirty="0" smtClean="0"/>
+              <a:t>) </a:t>
+            </a:r>
+          </a:p>
+          <a:p>
+            <a:r>
+              <a:rPr lang="en-US" sz="2000" dirty="0" smtClean="0"/>
+              <a:t>	boost::thread( </a:t>
+            </a:r>
+            <a:r>
+              <a:rPr lang="en-US" sz="2000" dirty="0" err="1" smtClean="0"/>
+              <a:t>run_service</a:t>
+            </a:r>
+            <a:r>
+              <a:rPr lang="en-US" sz="2000" dirty="0" smtClean="0"/>
+              <a:t> ); </a:t>
+            </a:r>
+          </a:p>
+          <a:p>
+            <a:endParaRPr lang="en-US" sz="2000" dirty="0" smtClean="0"/>
+          </a:p>
+          <a:p>
+            <a:r>
+              <a:rPr lang="en-US" sz="2000" dirty="0" smtClean="0"/>
+              <a:t>void </a:t>
+            </a:r>
+            <a:r>
+              <a:rPr lang="en-US" sz="2000" dirty="0" err="1" smtClean="0"/>
+              <a:t>run_service</a:t>
+            </a:r>
+            <a:r>
+              <a:rPr lang="en-US" sz="2000" dirty="0" smtClean="0"/>
+              <a:t>() </a:t>
+            </a:r>
+          </a:p>
+          <a:p>
+            <a:r>
+              <a:rPr lang="en-US" sz="2000" dirty="0" smtClean="0"/>
+              <a:t>{ </a:t>
+            </a:r>
+          </a:p>
+          <a:p>
+            <a:r>
+              <a:rPr lang="en-US" sz="2000" dirty="0" smtClean="0"/>
+              <a:t>	 </a:t>
+            </a:r>
+            <a:r>
+              <a:rPr lang="en-US" sz="2000" dirty="0" err="1" smtClean="0"/>
+              <a:t>service.run</a:t>
+            </a:r>
+            <a:r>
+              <a:rPr lang="en-US" sz="2000" dirty="0" smtClean="0"/>
+              <a:t>(); </a:t>
+            </a:r>
+          </a:p>
+          <a:p>
+            <a:r>
+              <a:rPr lang="en-US" sz="2000" dirty="0" smtClean="0"/>
+              <a:t>}</a:t>
+            </a:r>
+          </a:p>
+          <a:p>
+            <a:endParaRPr lang="en-US" sz="2400" dirty="0" smtClean="0"/>
+          </a:p>
+        </p:txBody>
+      </p:sp>
+    </p:spTree>
+  </p:cSld>
+  <p:clrMapOvr>
+    <a:masterClrMapping/>
+  </p:clrMapOvr>
+</p:sld>
+</file>
+
+<file path=ppt/slides/slide31.xml><?xml version="1.0" encoding="utf-8"?>
+<p:sld xmlns:a="http://schemas.openxmlformats.org/drawingml/2006/main" xmlns:r="http://schemas.openxmlformats.org/officeDocument/2006/relationships" xmlns:p="http://schemas.openxmlformats.org/presentationml/2006/main">
+  <p:cSld>
+    <p:spTree>
+      <p:nvGrpSpPr>
+        <p:cNvPr id="1" name=""/>
+        <p:cNvGrpSpPr/>
+        <p:nvPr/>
+      </p:nvGrpSpPr>
+      <p:grpSpPr>
+        <a:xfrm>
+          <a:off x="0" y="0"/>
+          <a:ext cx="0" cy="0"/>
+          <a:chOff x="0" y="0"/>
+          <a:chExt cx="0" cy="0"/>
+        </a:xfrm>
+      </p:grpSpPr>
+      <p:sp>
+        <p:nvSpPr>
+          <p:cNvPr id="2" name="Title 1"/>
+          <p:cNvSpPr>
+            <a:spLocks noGrp="1"/>
+          </p:cNvSpPr>
+          <p:nvPr>
+            <p:ph type="title"/>
+          </p:nvPr>
+        </p:nvSpPr>
+        <p:spPr/>
+        <p:txBody>
+          <a:bodyPr/>
+          <a:lstStyle/>
+          <a:p>
+            <a:endParaRPr lang="en-US"/>
+          </a:p>
+        </p:txBody>
+      </p:sp>
+      <p:sp>
+        <p:nvSpPr>
+          <p:cNvPr id="3" name="Content Placeholder 2"/>
+          <p:cNvSpPr>
+            <a:spLocks noGrp="1"/>
+          </p:cNvSpPr>
+          <p:nvPr>
+            <p:ph idx="1"/>
+          </p:nvPr>
+        </p:nvSpPr>
+        <p:spPr/>
+        <p:txBody>
+          <a:bodyPr/>
+          <a:lstStyle/>
+          <a:p>
+            <a:endParaRPr lang="en-US" dirty="0"/>
+          </a:p>
+        </p:txBody>
+      </p:sp>
+      <p:sp>
+        <p:nvSpPr>
+          <p:cNvPr id="4" name="Title 1"/>
+          <p:cNvSpPr txBox="1">
+            <a:spLocks/>
+          </p:cNvSpPr>
+          <p:nvPr/>
+        </p:nvSpPr>
+        <p:spPr>
+          <a:xfrm>
+            <a:off x="457200" y="2819400"/>
+            <a:ext cx="8229600" cy="1143000"/>
+          </a:xfrm>
+          <a:prstGeom prst="rect">
+            <a:avLst/>
+          </a:prstGeom>
+        </p:spPr>
+        <p:txBody>
+          <a:bodyPr vert="horz" lIns="91440" tIns="45720" rIns="91440" bIns="45720" rtlCol="0" anchor="ctr">
+            <a:noAutofit/>
+          </a:bodyPr>
+          <a:lstStyle/>
+          <a:p>
+            <a:pPr marL="0" marR="0" lvl="0" indent="0" algn="ctr" defTabSz="914400" rtl="0" eaLnBrk="1" fontAlgn="auto" latinLnBrk="0" hangingPunct="1">
+              <a:lnSpc>
+                <a:spcPct val="100000"/>
+              </a:lnSpc>
+              <a:spcBef>
+                <a:spcPct val="0"/>
+              </a:spcBef>
+              <a:spcAft>
+                <a:spcPts val="0"/>
+              </a:spcAft>
+              <a:buClrTx/>
+              <a:buSzTx/>
+              <a:buFontTx/>
+              <a:buNone/>
+              <a:tabLst/>
+              <a:defRPr/>
+            </a:pPr>
+            <a:r>
+              <a:rPr kumimoji="0" lang="en-US" sz="9600" b="0" i="0" u="none" strike="noStrike" kern="1200" cap="none" spc="0" normalizeH="0" baseline="0" noProof="0" dirty="0" smtClean="0">
+                <a:ln>
+                  <a:noFill/>
+                </a:ln>
+                <a:solidFill>
+                  <a:schemeClr val="tx1"/>
+                </a:solidFill>
+                <a:effectLst/>
+                <a:uLnTx/>
+                <a:uFillTx/>
+                <a:latin typeface="+mj-lt"/>
+                <a:ea typeface="+mj-ea"/>
+                <a:cs typeface="+mj-cs"/>
+              </a:rPr>
+              <a:t>?</a:t>
+            </a:r>
+            <a:endParaRPr kumimoji="0" lang="en-US" sz="9600" b="0" i="0" u="none" strike="noStrike" kern="1200" cap="none" spc="0" normalizeH="0" baseline="0" noProof="0" dirty="0">
+              <a:ln>
+                <a:noFill/>
+              </a:ln>
+              <a:solidFill>
+                <a:schemeClr val="tx1"/>
+              </a:solidFill>
+              <a:effectLst/>
+              <a:uLnTx/>
+              <a:uFillTx/>
+              <a:latin typeface="+mj-lt"/>
+              <a:ea typeface="+mj-ea"/>
+              <a:cs typeface="+mj-cs"/>
+            </a:endParaRPr>
+          </a:p>
+        </p:txBody>
+      </p:sp>
+    </p:spTree>
+  </p:cSld>
+  <p:clrMapOvr>
+    <a:masterClrMapping/>
+  </p:clrMapOvr>
+</p:sld>
+</file>
+
+<file path=ppt/slides/slide32.xml><?xml version="1.0" encoding="utf-8"?>
+<p:sld xmlns:a="http://schemas.openxmlformats.org/drawingml/2006/main" xmlns:r="http://schemas.openxmlformats.org/officeDocument/2006/relationships" xmlns:p="http://schemas.openxmlformats.org/presentationml/2006/main">
+  <p:cSld>
+    <p:spTree>
+      <p:nvGrpSpPr>
+        <p:cNvPr id="1" name=""/>
+        <p:cNvGrpSpPr/>
+        <p:nvPr/>
+      </p:nvGrpSpPr>
+      <p:grpSpPr>
+        <a:xfrm>
+          <a:off x="0" y="0"/>
+          <a:ext cx="0" cy="0"/>
+          <a:chOff x="0" y="0"/>
+          <a:chExt cx="0" cy="0"/>
+        </a:xfrm>
+      </p:grpSpPr>
+      <p:sp>
+        <p:nvSpPr>
+          <p:cNvPr id="2" name="Title 1"/>
+          <p:cNvSpPr>
+            <a:spLocks noGrp="1"/>
+          </p:cNvSpPr>
+          <p:nvPr>
+            <p:ph type="title"/>
+          </p:nvPr>
+        </p:nvSpPr>
+        <p:spPr/>
+        <p:txBody>
+          <a:bodyPr>
+            <a:normAutofit fontScale="90000"/>
+          </a:bodyPr>
+          <a:lstStyle/>
+          <a:p>
+            <a:r>
+              <a:rPr lang="en-US" dirty="0" smtClean="0"/>
+              <a:t>Task-Based Engine, Thread-Based Engine</a:t>
+            </a:r>
+            <a:endParaRPr lang="en-US" dirty="0"/>
+          </a:p>
+        </p:txBody>
+      </p:sp>
+      <p:sp>
+        <p:nvSpPr>
+          <p:cNvPr id="3" name="Content Placeholder 2"/>
+          <p:cNvSpPr>
+            <a:spLocks noGrp="1"/>
+          </p:cNvSpPr>
+          <p:nvPr>
+            <p:ph idx="1"/>
+          </p:nvPr>
+        </p:nvSpPr>
+        <p:spPr/>
+        <p:txBody>
+          <a:bodyPr>
+            <a:normAutofit lnSpcReduction="10000"/>
+          </a:bodyPr>
+          <a:lstStyle/>
+          <a:p>
+            <a:r>
+              <a:rPr lang="en-US" dirty="0" smtClean="0"/>
+              <a:t>Thread-Based Engine:</a:t>
+            </a:r>
+          </a:p>
+          <a:p>
+            <a:pPr lvl="1"/>
+            <a:r>
+              <a:rPr lang="ru-RU" dirty="0" smtClean="0"/>
+              <a:t>Простой код</a:t>
+            </a:r>
+          </a:p>
+          <a:p>
+            <a:pPr lvl="1"/>
+            <a:r>
+              <a:rPr lang="ru-RU" dirty="0" smtClean="0"/>
+              <a:t>Решение простых задач</a:t>
+            </a:r>
+          </a:p>
+          <a:p>
+            <a:pPr lvl="1"/>
+            <a:r>
+              <a:rPr lang="ru-RU" dirty="0" smtClean="0"/>
+              <a:t>Для каждой задачи свой поток</a:t>
+            </a:r>
+          </a:p>
+          <a:p>
+            <a:r>
+              <a:rPr lang="en-US" dirty="0" smtClean="0"/>
+              <a:t>Task-Based Engine</a:t>
+            </a:r>
+          </a:p>
+          <a:p>
+            <a:pPr lvl="1"/>
+            <a:r>
+              <a:rPr lang="ru-RU" dirty="0" smtClean="0"/>
+              <a:t>Сложный код</a:t>
+            </a:r>
+          </a:p>
+          <a:p>
+            <a:pPr lvl="1"/>
+            <a:r>
+              <a:rPr lang="ru-RU" dirty="0" smtClean="0"/>
+              <a:t>Решение нетривиальных задач</a:t>
+            </a:r>
+          </a:p>
+          <a:p>
+            <a:pPr lvl="1"/>
+            <a:r>
+              <a:rPr lang="ru-RU" dirty="0" smtClean="0"/>
+              <a:t>Определённые количество потоков, на каждый тип задач</a:t>
+            </a:r>
+          </a:p>
+          <a:p>
+            <a:pPr lvl="1"/>
+            <a:endParaRPr lang="en-US" dirty="0"/>
+          </a:p>
+        </p:txBody>
+      </p:sp>
+    </p:spTree>
+  </p:cSld>
+  <p:clrMapOvr>
+    <a:masterClrMapping/>
+  </p:clrMapOvr>
+</p:sld>
+</file>
+
+<file path=ppt/slides/slide33.xml><?xml version="1.0" encoding="utf-8"?>
+<p:sld xmlns:a="http://schemas.openxmlformats.org/drawingml/2006/main" xmlns:r="http://schemas.openxmlformats.org/officeDocument/2006/relationships" xmlns:p="http://schemas.openxmlformats.org/presentationml/2006/main">
+  <p:cSld>
+    <p:spTree>
+      <p:nvGrpSpPr>
+        <p:cNvPr id="1" name=""/>
+        <p:cNvGrpSpPr/>
+        <p:nvPr/>
+      </p:nvGrpSpPr>
+      <p:grpSpPr>
+        <a:xfrm>
+          <a:off x="0" y="0"/>
+          <a:ext cx="0" cy="0"/>
+          <a:chOff x="0" y="0"/>
+          <a:chExt cx="0" cy="0"/>
+        </a:xfrm>
+      </p:grpSpPr>
+      <p:sp>
+        <p:nvSpPr>
+          <p:cNvPr id="2" name="Title 1"/>
+          <p:cNvSpPr>
+            <a:spLocks noGrp="1"/>
+          </p:cNvSpPr>
+          <p:nvPr>
+            <p:ph type="title"/>
+          </p:nvPr>
+        </p:nvSpPr>
+        <p:spPr/>
+        <p:txBody>
+          <a:bodyPr/>
+          <a:lstStyle/>
+          <a:p>
+            <a:r>
+              <a:rPr lang="en-US" dirty="0" smtClean="0"/>
+              <a:t>Thread Based Engine</a:t>
+            </a:r>
+            <a:endParaRPr lang="en-US" dirty="0"/>
+          </a:p>
+        </p:txBody>
+      </p:sp>
+      <p:sp>
+        <p:nvSpPr>
+          <p:cNvPr id="3" name="Content Placeholder 2"/>
+          <p:cNvSpPr>
+            <a:spLocks noGrp="1"/>
+          </p:cNvSpPr>
+          <p:nvPr>
+            <p:ph idx="1"/>
+          </p:nvPr>
+        </p:nvSpPr>
+        <p:spPr/>
+        <p:txBody>
+          <a:bodyPr/>
+          <a:lstStyle/>
+          <a:p>
+            <a:pPr lvl="1">
+              <a:buNone/>
+            </a:pPr>
+            <a:endParaRPr lang="en-US" dirty="0"/>
+          </a:p>
+        </p:txBody>
+      </p:sp>
+      <p:sp>
+        <p:nvSpPr>
+          <p:cNvPr id="4" name="Rounded Rectangle 3"/>
+          <p:cNvSpPr/>
+          <p:nvPr/>
+        </p:nvSpPr>
+        <p:spPr>
+          <a:xfrm>
+            <a:off x="304800" y="1447800"/>
+            <a:ext cx="8534400" cy="4953000"/>
+          </a:xfrm>
+          <a:prstGeom prst="roundRect">
+            <a:avLst/>
+          </a:prstGeom>
+        </p:spPr>
+        <p:style>
+          <a:lnRef idx="2">
+            <a:schemeClr val="accent1">
+              <a:shade val="50000"/>
+            </a:schemeClr>
+          </a:lnRef>
+          <a:fillRef idx="1">
+            <a:schemeClr val="accent1"/>
+          </a:fillRef>
+          <a:effectRef idx="0">
+            <a:schemeClr val="accent1"/>
+          </a:effectRef>
+          <a:fontRef idx="minor">
+            <a:schemeClr val="lt1"/>
+          </a:fontRef>
+        </p:style>
+        <p:txBody>
+          <a:bodyPr rtlCol="0" anchor="ctr"/>
+          <a:lstStyle/>
+          <a:p>
+            <a:r>
+              <a:rPr lang="en-US" sz="2000" dirty="0" smtClean="0">
+                <a:latin typeface="Consolas" pitchFamily="49" charset="0"/>
+                <a:cs typeface="Consolas" pitchFamily="49" charset="0"/>
+              </a:rPr>
+              <a:t>void </a:t>
+            </a:r>
+            <a:r>
+              <a:rPr lang="en-US" sz="2000" dirty="0" err="1" smtClean="0">
+                <a:latin typeface="Consolas" pitchFamily="49" charset="0"/>
+                <a:cs typeface="Consolas" pitchFamily="49" charset="0"/>
+              </a:rPr>
+              <a:t>thread_proc</a:t>
+            </a:r>
+            <a:r>
+              <a:rPr lang="en-US" sz="2000" dirty="0" smtClean="0">
+                <a:latin typeface="Consolas" pitchFamily="49" charset="0"/>
+                <a:cs typeface="Consolas" pitchFamily="49" charset="0"/>
+              </a:rPr>
+              <a:t>()</a:t>
+            </a:r>
+          </a:p>
+          <a:p>
+            <a:r>
+              <a:rPr lang="en-US" sz="2000" dirty="0" smtClean="0">
+                <a:latin typeface="Consolas" pitchFamily="49" charset="0"/>
+                <a:cs typeface="Consolas" pitchFamily="49" charset="0"/>
+              </a:rPr>
+              <a:t>{</a:t>
+            </a:r>
+          </a:p>
+          <a:p>
+            <a:r>
+              <a:rPr lang="en-US" sz="2000" dirty="0" smtClean="0">
+                <a:latin typeface="Consolas" pitchFamily="49" charset="0"/>
+                <a:cs typeface="Consolas" pitchFamily="49" charset="0"/>
+              </a:rPr>
+              <a:t>	// do job</a:t>
+            </a:r>
+          </a:p>
+          <a:p>
+            <a:r>
+              <a:rPr lang="en-US" sz="2000" dirty="0" smtClean="0">
+                <a:latin typeface="Consolas" pitchFamily="49" charset="0"/>
+                <a:cs typeface="Consolas" pitchFamily="49" charset="0"/>
+              </a:rPr>
+              <a:t>}</a:t>
+            </a:r>
+          </a:p>
+          <a:p>
+            <a:r>
+              <a:rPr lang="en-US" sz="2000" dirty="0" smtClean="0">
+                <a:latin typeface="Consolas" pitchFamily="49" charset="0"/>
+                <a:cs typeface="Consolas" pitchFamily="49" charset="0"/>
+              </a:rPr>
+              <a:t>for(;</a:t>
+            </a:r>
+            <a:r>
+              <a:rPr lang="en-US" sz="2000" dirty="0" err="1" smtClean="0">
+                <a:latin typeface="Consolas" pitchFamily="49" charset="0"/>
+                <a:cs typeface="Consolas" pitchFamily="49" charset="0"/>
+              </a:rPr>
+              <a:t>dir_it</a:t>
+            </a:r>
+            <a:r>
+              <a:rPr lang="en-US" sz="2000" dirty="0" smtClean="0">
+                <a:latin typeface="Consolas" pitchFamily="49" charset="0"/>
+                <a:cs typeface="Consolas" pitchFamily="49" charset="0"/>
+              </a:rPr>
+              <a:t> != </a:t>
+            </a:r>
+            <a:r>
+              <a:rPr lang="en-US" sz="2000" dirty="0" err="1" smtClean="0">
+                <a:latin typeface="Consolas" pitchFamily="49" charset="0"/>
+                <a:cs typeface="Consolas" pitchFamily="49" charset="0"/>
+              </a:rPr>
+              <a:t>end_it</a:t>
+            </a:r>
+            <a:r>
+              <a:rPr lang="en-US" sz="2000" dirty="0" smtClean="0">
+                <a:latin typeface="Consolas" pitchFamily="49" charset="0"/>
+                <a:cs typeface="Consolas" pitchFamily="49" charset="0"/>
+              </a:rPr>
+              <a:t>; ++</a:t>
+            </a:r>
+            <a:r>
+              <a:rPr lang="en-US" sz="2000" dirty="0" err="1" smtClean="0">
+                <a:latin typeface="Consolas" pitchFamily="49" charset="0"/>
+                <a:cs typeface="Consolas" pitchFamily="49" charset="0"/>
+              </a:rPr>
+              <a:t>dir_it</a:t>
+            </a:r>
+            <a:r>
+              <a:rPr lang="en-US" sz="2000" dirty="0" smtClean="0">
+                <a:latin typeface="Consolas" pitchFamily="49" charset="0"/>
+                <a:cs typeface="Consolas" pitchFamily="49" charset="0"/>
+              </a:rPr>
+              <a:t>)</a:t>
+            </a:r>
+          </a:p>
+          <a:p>
+            <a:r>
+              <a:rPr lang="en-US" sz="2000" dirty="0" smtClean="0">
+                <a:latin typeface="Consolas" pitchFamily="49" charset="0"/>
+                <a:cs typeface="Consolas" pitchFamily="49" charset="0"/>
+              </a:rPr>
+              <a:t>{</a:t>
+            </a:r>
+          </a:p>
+          <a:p>
+            <a:r>
+              <a:rPr lang="en-US" sz="2000" dirty="0" smtClean="0">
+                <a:latin typeface="Consolas" pitchFamily="49" charset="0"/>
+                <a:cs typeface="Consolas" pitchFamily="49" charset="0"/>
+              </a:rPr>
+              <a:t>	 </a:t>
+            </a:r>
+            <a:r>
+              <a:rPr lang="en-US" sz="2000" dirty="0" err="1" smtClean="0">
+                <a:latin typeface="Consolas" pitchFamily="49" charset="0"/>
+                <a:cs typeface="Consolas" pitchFamily="49" charset="0"/>
+              </a:rPr>
+              <a:t>threads.create_thread</a:t>
+            </a:r>
+            <a:r>
+              <a:rPr lang="en-US" sz="2000" dirty="0" smtClean="0">
+                <a:latin typeface="Consolas" pitchFamily="49" charset="0"/>
+                <a:cs typeface="Consolas" pitchFamily="49" charset="0"/>
+              </a:rPr>
+              <a:t>( &amp;</a:t>
+            </a:r>
+            <a:r>
+              <a:rPr lang="en-US" sz="2000" dirty="0" err="1" smtClean="0">
+                <a:latin typeface="Consolas" pitchFamily="49" charset="0"/>
+                <a:cs typeface="Consolas" pitchFamily="49" charset="0"/>
+              </a:rPr>
+              <a:t>thread_func</a:t>
+            </a:r>
+            <a:r>
+              <a:rPr lang="en-US" sz="2000" dirty="0" smtClean="0">
+                <a:latin typeface="Consolas" pitchFamily="49" charset="0"/>
+                <a:cs typeface="Consolas" pitchFamily="49" charset="0"/>
+              </a:rPr>
+              <a:t> ); 	</a:t>
+            </a:r>
+          </a:p>
+          <a:p>
+            <a:r>
+              <a:rPr lang="en-US" sz="2000" dirty="0" smtClean="0">
+                <a:latin typeface="Consolas" pitchFamily="49" charset="0"/>
+                <a:cs typeface="Consolas" pitchFamily="49" charset="0"/>
+              </a:rPr>
+              <a:t>}</a:t>
+            </a:r>
+          </a:p>
+        </p:txBody>
+      </p:sp>
+    </p:spTree>
+  </p:cSld>
+  <p:clrMapOvr>
+    <a:masterClrMapping/>
+  </p:clrMapOvr>
+</p:sld>
+</file>
+
+<file path=ppt/slides/slide34.xml><?xml version="1.0" encoding="utf-8"?>
+<p:sld xmlns:a="http://schemas.openxmlformats.org/drawingml/2006/main" xmlns:r="http://schemas.openxmlformats.org/officeDocument/2006/relationships" xmlns:p="http://schemas.openxmlformats.org/presentationml/2006/main">
+  <p:cSld>
+    <p:spTree>
+      <p:nvGrpSpPr>
+        <p:cNvPr id="1" name=""/>
+        <p:cNvGrpSpPr/>
+        <p:nvPr/>
+      </p:nvGrpSpPr>
+      <p:grpSpPr>
+        <a:xfrm>
+          <a:off x="0" y="0"/>
+          <a:ext cx="0" cy="0"/>
+          <a:chOff x="0" y="0"/>
+          <a:chExt cx="0" cy="0"/>
+        </a:xfrm>
+      </p:grpSpPr>
+      <p:sp>
+        <p:nvSpPr>
+          <p:cNvPr id="2" name="Title 1"/>
+          <p:cNvSpPr>
+            <a:spLocks noGrp="1"/>
+          </p:cNvSpPr>
+          <p:nvPr>
+            <p:ph type="title"/>
+          </p:nvPr>
+        </p:nvSpPr>
+        <p:spPr/>
+        <p:txBody>
+          <a:bodyPr/>
+          <a:lstStyle/>
+          <a:p>
+            <a:r>
+              <a:rPr lang="en-US" dirty="0" smtClean="0"/>
+              <a:t>Task Based Engine</a:t>
+            </a:r>
+            <a:endParaRPr lang="en-US" dirty="0"/>
+          </a:p>
+        </p:txBody>
+      </p:sp>
+      <p:sp>
+        <p:nvSpPr>
+          <p:cNvPr id="3" name="Content Placeholder 2"/>
+          <p:cNvSpPr>
+            <a:spLocks noGrp="1"/>
+          </p:cNvSpPr>
+          <p:nvPr>
+            <p:ph idx="1"/>
+          </p:nvPr>
+        </p:nvSpPr>
+        <p:spPr/>
+        <p:txBody>
+          <a:bodyPr/>
+          <a:lstStyle/>
+          <a:p>
+            <a:endParaRPr lang="en-US" dirty="0"/>
+          </a:p>
+        </p:txBody>
+      </p:sp>
+      <p:sp>
+        <p:nvSpPr>
+          <p:cNvPr id="4" name="Rounded Rectangle 3"/>
+          <p:cNvSpPr/>
+          <p:nvPr/>
+        </p:nvSpPr>
+        <p:spPr>
+          <a:xfrm>
+            <a:off x="304800" y="1447800"/>
+            <a:ext cx="8534400" cy="4953000"/>
+          </a:xfrm>
+          <a:prstGeom prst="roundRect">
+            <a:avLst/>
+          </a:prstGeom>
+        </p:spPr>
+        <p:style>
+          <a:lnRef idx="2">
+            <a:schemeClr val="accent1">
+              <a:shade val="50000"/>
+            </a:schemeClr>
+          </a:lnRef>
+          <a:fillRef idx="1">
+            <a:schemeClr val="accent1"/>
+          </a:fillRef>
+          <a:effectRef idx="0">
+            <a:schemeClr val="accent1"/>
+          </a:effectRef>
+          <a:fontRef idx="minor">
+            <a:schemeClr val="lt1"/>
+          </a:fontRef>
+        </p:style>
+        <p:txBody>
+          <a:bodyPr rtlCol="0" anchor="ctr"/>
+          <a:lstStyle/>
+          <a:p>
+            <a:r>
+              <a:rPr lang="en-US" sz="2000" dirty="0" smtClean="0">
+                <a:latin typeface="Consolas" pitchFamily="49" charset="0"/>
+                <a:cs typeface="Consolas" pitchFamily="49" charset="0"/>
+              </a:rPr>
+              <a:t>void processor()</a:t>
+            </a:r>
+          </a:p>
+          <a:p>
+            <a:r>
+              <a:rPr lang="en-US" sz="2000" dirty="0" smtClean="0">
+                <a:latin typeface="Consolas" pitchFamily="49" charset="0"/>
+                <a:cs typeface="Consolas" pitchFamily="49" charset="0"/>
+              </a:rPr>
+              <a:t>{</a:t>
+            </a:r>
+          </a:p>
+          <a:p>
+            <a:r>
+              <a:rPr lang="en-US" sz="2000" dirty="0" smtClean="0">
+                <a:latin typeface="Consolas" pitchFamily="49" charset="0"/>
+                <a:cs typeface="Consolas" pitchFamily="49" charset="0"/>
+              </a:rPr>
+              <a:t>	while (!stop )</a:t>
+            </a:r>
+          </a:p>
+          <a:p>
+            <a:r>
+              <a:rPr lang="en-US" sz="2000" dirty="0" smtClean="0">
+                <a:latin typeface="Consolas" pitchFamily="49" charset="0"/>
+                <a:cs typeface="Consolas" pitchFamily="49" charset="0"/>
+              </a:rPr>
+              <a:t>	{</a:t>
+            </a:r>
+          </a:p>
+          <a:p>
+            <a:r>
+              <a:rPr lang="en-US" sz="2000" dirty="0" smtClean="0">
+                <a:latin typeface="Consolas" pitchFamily="49" charset="0"/>
+                <a:cs typeface="Consolas" pitchFamily="49" charset="0"/>
+              </a:rPr>
+              <a:t>		task t = queue.pop();</a:t>
+            </a:r>
+          </a:p>
+          <a:p>
+            <a:r>
+              <a:rPr lang="en-US" sz="2000" dirty="0" smtClean="0">
+                <a:latin typeface="Consolas" pitchFamily="49" charset="0"/>
+                <a:cs typeface="Consolas" pitchFamily="49" charset="0"/>
+              </a:rPr>
+              <a:t>		</a:t>
+            </a:r>
+            <a:r>
+              <a:rPr lang="en-US" sz="2000" dirty="0" err="1" smtClean="0">
+                <a:latin typeface="Consolas" pitchFamily="49" charset="0"/>
+                <a:cs typeface="Consolas" pitchFamily="49" charset="0"/>
+              </a:rPr>
+              <a:t>t.do_job</a:t>
+            </a:r>
+            <a:r>
+              <a:rPr lang="en-US" sz="2000" dirty="0" smtClean="0">
+                <a:latin typeface="Consolas" pitchFamily="49" charset="0"/>
+                <a:cs typeface="Consolas" pitchFamily="49" charset="0"/>
+              </a:rPr>
+              <a:t>();</a:t>
+            </a:r>
+          </a:p>
+          <a:p>
+            <a:r>
+              <a:rPr lang="en-US" sz="2000" dirty="0" smtClean="0">
+                <a:latin typeface="Consolas" pitchFamily="49" charset="0"/>
+                <a:cs typeface="Consolas" pitchFamily="49" charset="0"/>
+              </a:rPr>
+              <a:t>	}</a:t>
+            </a:r>
+          </a:p>
+          <a:p>
+            <a:r>
+              <a:rPr lang="en-US" sz="2000" dirty="0" smtClean="0">
+                <a:latin typeface="Consolas" pitchFamily="49" charset="0"/>
+                <a:cs typeface="Consolas" pitchFamily="49" charset="0"/>
+              </a:rPr>
+              <a:t>}</a:t>
+            </a:r>
+          </a:p>
+          <a:p>
+            <a:r>
+              <a:rPr lang="en-US" sz="2000" dirty="0" smtClean="0">
+                <a:latin typeface="Consolas" pitchFamily="49" charset="0"/>
+                <a:cs typeface="Consolas" pitchFamily="49" charset="0"/>
+              </a:rPr>
+              <a:t>for( </a:t>
+            </a:r>
+            <a:r>
+              <a:rPr lang="en-US" sz="2000" dirty="0" err="1" smtClean="0">
+                <a:latin typeface="Consolas" pitchFamily="49" charset="0"/>
+                <a:cs typeface="Consolas" pitchFamily="49" charset="0"/>
+              </a:rPr>
+              <a:t>size_t</a:t>
+            </a:r>
+            <a:r>
+              <a:rPr lang="en-US" sz="2000" dirty="0" smtClean="0">
+                <a:latin typeface="Consolas" pitchFamily="49" charset="0"/>
+                <a:cs typeface="Consolas" pitchFamily="49" charset="0"/>
+              </a:rPr>
+              <a:t> </a:t>
+            </a:r>
+            <a:r>
+              <a:rPr lang="en-US" sz="2000" dirty="0" err="1" smtClean="0">
+                <a:latin typeface="Consolas" pitchFamily="49" charset="0"/>
+                <a:cs typeface="Consolas" pitchFamily="49" charset="0"/>
+              </a:rPr>
+              <a:t>i</a:t>
+            </a:r>
+            <a:r>
+              <a:rPr lang="en-US" sz="2000" dirty="0" smtClean="0">
+                <a:latin typeface="Consolas" pitchFamily="49" charset="0"/>
+                <a:cs typeface="Consolas" pitchFamily="49" charset="0"/>
+              </a:rPr>
+              <a:t> = 0 ; </a:t>
+            </a:r>
+            <a:r>
+              <a:rPr lang="en-US" sz="2000" dirty="0" err="1" smtClean="0">
+                <a:latin typeface="Consolas" pitchFamily="49" charset="0"/>
+                <a:cs typeface="Consolas" pitchFamily="49" charset="0"/>
+              </a:rPr>
+              <a:t>i</a:t>
+            </a:r>
+            <a:r>
+              <a:rPr lang="en-US" sz="2000" dirty="0" smtClean="0">
+                <a:latin typeface="Consolas" pitchFamily="49" charset="0"/>
+                <a:cs typeface="Consolas" pitchFamily="49" charset="0"/>
+              </a:rPr>
+              <a:t> &lt; </a:t>
+            </a:r>
+            <a:r>
+              <a:rPr lang="en-US" sz="2000" dirty="0" err="1" smtClean="0">
+                <a:latin typeface="Consolas" pitchFamily="49" charset="0"/>
+                <a:cs typeface="Consolas" pitchFamily="49" charset="0"/>
+              </a:rPr>
+              <a:t>number_of_processors</a:t>
+            </a:r>
+            <a:r>
+              <a:rPr lang="en-US" sz="2000" dirty="0" smtClean="0">
+                <a:latin typeface="Consolas" pitchFamily="49" charset="0"/>
+                <a:cs typeface="Consolas" pitchFamily="49" charset="0"/>
+              </a:rPr>
+              <a:t> ; ++</a:t>
+            </a:r>
+            <a:r>
+              <a:rPr lang="en-US" sz="2000" dirty="0" err="1" smtClean="0">
+                <a:latin typeface="Consolas" pitchFamily="49" charset="0"/>
+                <a:cs typeface="Consolas" pitchFamily="49" charset="0"/>
+              </a:rPr>
+              <a:t>i</a:t>
+            </a:r>
+            <a:r>
+              <a:rPr lang="en-US" sz="2000" dirty="0" smtClean="0">
+                <a:latin typeface="Consolas" pitchFamily="49" charset="0"/>
+                <a:cs typeface="Consolas" pitchFamily="49" charset="0"/>
+              </a:rPr>
+              <a:t> )</a:t>
+            </a:r>
+          </a:p>
+          <a:p>
+            <a:r>
+              <a:rPr lang="en-US" sz="2000" dirty="0" smtClean="0">
+                <a:latin typeface="Consolas" pitchFamily="49" charset="0"/>
+                <a:cs typeface="Consolas" pitchFamily="49" charset="0"/>
+              </a:rPr>
+              <a:t>{</a:t>
+            </a:r>
+          </a:p>
+          <a:p>
+            <a:r>
+              <a:rPr lang="en-US" sz="2000" dirty="0" smtClean="0">
+                <a:latin typeface="Consolas" pitchFamily="49" charset="0"/>
+                <a:cs typeface="Consolas" pitchFamily="49" charset="0"/>
+              </a:rPr>
+              <a:t>	 </a:t>
+            </a:r>
+            <a:r>
+              <a:rPr lang="en-US" sz="2000" dirty="0" err="1" smtClean="0">
+                <a:latin typeface="Consolas" pitchFamily="49" charset="0"/>
+                <a:cs typeface="Consolas" pitchFamily="49" charset="0"/>
+              </a:rPr>
+              <a:t>threads.create_thread</a:t>
+            </a:r>
+            <a:r>
+              <a:rPr lang="en-US" sz="2000" dirty="0" smtClean="0">
+                <a:latin typeface="Consolas" pitchFamily="49" charset="0"/>
+                <a:cs typeface="Consolas" pitchFamily="49" charset="0"/>
+              </a:rPr>
+              <a:t>( &amp;</a:t>
+            </a:r>
+            <a:r>
+              <a:rPr lang="en-US" sz="2000" dirty="0" err="1" smtClean="0">
+                <a:latin typeface="Consolas" pitchFamily="49" charset="0"/>
+                <a:cs typeface="Consolas" pitchFamily="49" charset="0"/>
+              </a:rPr>
+              <a:t>thread_func</a:t>
+            </a:r>
+            <a:r>
+              <a:rPr lang="en-US" sz="2000" dirty="0" smtClean="0">
+                <a:latin typeface="Consolas" pitchFamily="49" charset="0"/>
+                <a:cs typeface="Consolas" pitchFamily="49" charset="0"/>
+              </a:rPr>
+              <a:t> );  </a:t>
+            </a:r>
+          </a:p>
+          <a:p>
+            <a:r>
+              <a:rPr lang="en-US" sz="2000" dirty="0" smtClean="0">
+                <a:latin typeface="Consolas" pitchFamily="49" charset="0"/>
+                <a:cs typeface="Consolas" pitchFamily="49" charset="0"/>
+              </a:rPr>
+              <a:t>}</a:t>
+            </a:r>
+          </a:p>
+          <a:p>
+            <a:r>
+              <a:rPr lang="en-US" sz="2000" dirty="0" err="1" smtClean="0">
+                <a:latin typeface="Consolas" pitchFamily="49" charset="0"/>
+                <a:cs typeface="Consolas" pitchFamily="49" charset="0"/>
+              </a:rPr>
+              <a:t>queue.push</a:t>
+            </a:r>
+            <a:r>
+              <a:rPr lang="en-US" sz="2000" dirty="0" smtClean="0">
+                <a:latin typeface="Consolas" pitchFamily="49" charset="0"/>
+                <a:cs typeface="Consolas" pitchFamily="49" charset="0"/>
+              </a:rPr>
+              <a:t>( </a:t>
+            </a:r>
+            <a:r>
+              <a:rPr lang="en-US" sz="2000" dirty="0" err="1" smtClean="0">
+                <a:latin typeface="Consolas" pitchFamily="49" charset="0"/>
+                <a:cs typeface="Consolas" pitchFamily="49" charset="0"/>
+              </a:rPr>
+              <a:t>my_task</a:t>
+            </a:r>
+            <a:r>
+              <a:rPr lang="en-US" sz="2000" dirty="0" smtClean="0">
+                <a:latin typeface="Consolas" pitchFamily="49" charset="0"/>
+                <a:cs typeface="Consolas" pitchFamily="49" charset="0"/>
+              </a:rPr>
+              <a:t>( … ) );</a:t>
+            </a:r>
+          </a:p>
+        </p:txBody>
+      </p:sp>
+    </p:spTree>
+  </p:cSld>
+  <p:clrMapOvr>
+    <a:masterClrMapping/>
+  </p:clrMapOvr>
+</p:sld>
+</file>
+
+<file path=ppt/slides/slide35.xml><?xml version="1.0" encoding="utf-8"?>
+<p:sld xmlns:a="http://schemas.openxmlformats.org/drawingml/2006/main" xmlns:r="http://schemas.openxmlformats.org/officeDocument/2006/relationships" xmlns:p="http://schemas.openxmlformats.org/presentationml/2006/main">
+  <p:cSld>
+    <p:spTree>
+      <p:nvGrpSpPr>
+        <p:cNvPr id="1" name=""/>
+        <p:cNvGrpSpPr/>
+        <p:nvPr/>
+      </p:nvGrpSpPr>
+      <p:grpSpPr>
+        <a:xfrm>
+          <a:off x="0" y="0"/>
+          <a:ext cx="0" cy="0"/>
+          <a:chOff x="0" y="0"/>
+          <a:chExt cx="0" cy="0"/>
+        </a:xfrm>
+      </p:grpSpPr>
+      <p:sp>
+        <p:nvSpPr>
+          <p:cNvPr id="2" name="Title 1"/>
+          <p:cNvSpPr>
+            <a:spLocks noGrp="1"/>
+          </p:cNvSpPr>
+          <p:nvPr>
+            <p:ph type="title"/>
+          </p:nvPr>
+        </p:nvSpPr>
+        <p:spPr/>
+        <p:txBody>
+          <a:bodyPr/>
+          <a:lstStyle/>
+          <a:p>
+            <a:r>
+              <a:rPr lang="en-US" dirty="0" smtClean="0"/>
+              <a:t>Task</a:t>
+            </a:r>
+            <a:endParaRPr lang="en-US" dirty="0"/>
+          </a:p>
+        </p:txBody>
+      </p:sp>
+      <p:sp>
+        <p:nvSpPr>
+          <p:cNvPr id="3" name="Content Placeholder 2"/>
+          <p:cNvSpPr>
+            <a:spLocks noGrp="1"/>
+          </p:cNvSpPr>
+          <p:nvPr>
+            <p:ph idx="1"/>
+          </p:nvPr>
+        </p:nvSpPr>
+        <p:spPr/>
+        <p:txBody>
+          <a:bodyPr/>
+          <a:lstStyle/>
+          <a:p>
+            <a:endParaRPr lang="en-US"/>
+          </a:p>
+        </p:txBody>
+      </p:sp>
+      <p:sp>
+        <p:nvSpPr>
+          <p:cNvPr id="4" name="Rounded Rectangle 3"/>
+          <p:cNvSpPr/>
+          <p:nvPr/>
+        </p:nvSpPr>
+        <p:spPr>
+          <a:xfrm>
+            <a:off x="304800" y="1447800"/>
+            <a:ext cx="8534400" cy="4953000"/>
+          </a:xfrm>
+          <a:prstGeom prst="roundRect">
+            <a:avLst/>
+          </a:prstGeom>
+        </p:spPr>
+        <p:style>
+          <a:lnRef idx="2">
+            <a:schemeClr val="accent1">
+              <a:shade val="50000"/>
+            </a:schemeClr>
+          </a:lnRef>
+          <a:fillRef idx="1">
+            <a:schemeClr val="accent1"/>
+          </a:fillRef>
+          <a:effectRef idx="0">
+            <a:schemeClr val="accent1"/>
+          </a:effectRef>
+          <a:fontRef idx="minor">
+            <a:schemeClr val="lt1"/>
+          </a:fontRef>
+        </p:style>
+        <p:txBody>
+          <a:bodyPr rtlCol="0" anchor="ctr"/>
+          <a:lstStyle/>
+          <a:p>
+            <a:r>
+              <a:rPr lang="en-US" sz="2000" dirty="0" smtClean="0">
+                <a:latin typeface="Consolas" pitchFamily="49" charset="0"/>
+                <a:cs typeface="Consolas" pitchFamily="49" charset="0"/>
+              </a:rPr>
+              <a:t>template&lt; class T &gt;</a:t>
+            </a:r>
+          </a:p>
+          <a:p>
+            <a:r>
+              <a:rPr lang="en-US" sz="2000" dirty="0" smtClean="0">
+                <a:latin typeface="Consolas" pitchFamily="49" charset="0"/>
+                <a:cs typeface="Consolas" pitchFamily="49" charset="0"/>
+              </a:rPr>
+              <a:t>class </a:t>
+            </a:r>
+            <a:r>
+              <a:rPr lang="en-US" sz="2000" dirty="0" err="1" smtClean="0">
+                <a:latin typeface="Consolas" pitchFamily="49" charset="0"/>
+                <a:cs typeface="Consolas" pitchFamily="49" charset="0"/>
+              </a:rPr>
+              <a:t>task_processor</a:t>
+            </a:r>
+            <a:endParaRPr lang="en-US" sz="2000" dirty="0" smtClean="0">
+              <a:latin typeface="Consolas" pitchFamily="49" charset="0"/>
+              <a:cs typeface="Consolas" pitchFamily="49" charset="0"/>
+            </a:endParaRPr>
+          </a:p>
+          <a:p>
+            <a:r>
+              <a:rPr lang="en-US" sz="2000" dirty="0" smtClean="0">
+                <a:latin typeface="Consolas" pitchFamily="49" charset="0"/>
+                <a:cs typeface="Consolas" pitchFamily="49" charset="0"/>
+              </a:rPr>
+              <a:t>{</a:t>
+            </a:r>
+          </a:p>
+          <a:p>
+            <a:r>
+              <a:rPr lang="en-US" sz="2000" dirty="0" smtClean="0">
+                <a:latin typeface="Consolas" pitchFamily="49" charset="0"/>
+                <a:cs typeface="Consolas" pitchFamily="49" charset="0"/>
+              </a:rPr>
+              <a:t>	</a:t>
+            </a:r>
+            <a:r>
+              <a:rPr lang="en-US" sz="2000" dirty="0" smtClean="0">
+                <a:latin typeface="Consolas" pitchFamily="49" charset="0"/>
+                <a:cs typeface="Consolas" pitchFamily="49" charset="0"/>
+              </a:rPr>
+              <a:t>// next slide</a:t>
+            </a:r>
+          </a:p>
+          <a:p>
+            <a:r>
+              <a:rPr lang="en-US" sz="2000" dirty="0" smtClean="0">
+                <a:latin typeface="Consolas" pitchFamily="49" charset="0"/>
+                <a:cs typeface="Consolas" pitchFamily="49" charset="0"/>
+              </a:rPr>
+              <a:t>};</a:t>
+            </a:r>
+            <a:endParaRPr lang="en-US" sz="2000" dirty="0" smtClean="0">
+              <a:latin typeface="Consolas" pitchFamily="49" charset="0"/>
+              <a:cs typeface="Consolas" pitchFamily="49" charset="0"/>
+            </a:endParaRPr>
+          </a:p>
+          <a:p>
+            <a:r>
+              <a:rPr lang="en-US" sz="2000" dirty="0" smtClean="0">
+                <a:latin typeface="Consolas" pitchFamily="49" charset="0"/>
+                <a:cs typeface="Consolas" pitchFamily="49" charset="0"/>
+              </a:rPr>
+              <a:t>class task</a:t>
+            </a:r>
+          </a:p>
+          <a:p>
+            <a:r>
+              <a:rPr lang="en-US" sz="2000" dirty="0" smtClean="0">
+                <a:latin typeface="Consolas" pitchFamily="49" charset="0"/>
+                <a:cs typeface="Consolas" pitchFamily="49" charset="0"/>
+              </a:rPr>
+              <a:t>{</a:t>
+            </a:r>
+          </a:p>
+          <a:p>
+            <a:r>
+              <a:rPr lang="en-US" sz="2000" dirty="0" smtClean="0">
+                <a:latin typeface="Consolas" pitchFamily="49" charset="0"/>
+                <a:cs typeface="Consolas" pitchFamily="49" charset="0"/>
+              </a:rPr>
+              <a:t>	friend class </a:t>
+            </a:r>
+            <a:r>
+              <a:rPr lang="en-US" sz="2000" dirty="0" err="1" smtClean="0">
+                <a:latin typeface="Consolas" pitchFamily="49" charset="0"/>
+                <a:cs typeface="Consolas" pitchFamily="49" charset="0"/>
+              </a:rPr>
+              <a:t>task_processor</a:t>
+            </a:r>
+            <a:r>
+              <a:rPr lang="en-US" sz="2000" dirty="0" smtClean="0">
+                <a:latin typeface="Consolas" pitchFamily="49" charset="0"/>
+                <a:cs typeface="Consolas" pitchFamily="49" charset="0"/>
+              </a:rPr>
+              <a:t>&lt; task &gt;;</a:t>
+            </a:r>
+          </a:p>
+          <a:p>
+            <a:r>
+              <a:rPr lang="en-US" sz="2000" dirty="0" smtClean="0">
+                <a:latin typeface="Consolas" pitchFamily="49" charset="0"/>
+                <a:cs typeface="Consolas" pitchFamily="49" charset="0"/>
+              </a:rPr>
+              <a:t>	</a:t>
+            </a:r>
+            <a:r>
+              <a:rPr lang="en-US" sz="2000" dirty="0" smtClean="0">
+                <a:latin typeface="Consolas" pitchFamily="49" charset="0"/>
+                <a:cs typeface="Consolas" pitchFamily="49" charset="0"/>
+              </a:rPr>
+              <a:t>virtual void </a:t>
+            </a:r>
+            <a:r>
+              <a:rPr lang="en-US" sz="2000" dirty="0" err="1" smtClean="0">
+                <a:latin typeface="Consolas" pitchFamily="49" charset="0"/>
+                <a:cs typeface="Consolas" pitchFamily="49" charset="0"/>
+              </a:rPr>
+              <a:t>do_job</a:t>
+            </a:r>
+            <a:r>
+              <a:rPr lang="en-US" sz="2000" dirty="0" smtClean="0">
+                <a:latin typeface="Consolas" pitchFamily="49" charset="0"/>
+                <a:cs typeface="Consolas" pitchFamily="49" charset="0"/>
+              </a:rPr>
+              <a:t>();</a:t>
+            </a:r>
+          </a:p>
+          <a:p>
+            <a:r>
+              <a:rPr lang="en-US" sz="2000" dirty="0" smtClean="0">
+                <a:latin typeface="Consolas" pitchFamily="49" charset="0"/>
+                <a:cs typeface="Consolas" pitchFamily="49" charset="0"/>
+              </a:rPr>
+              <a:t>public:</a:t>
+            </a:r>
+          </a:p>
+          <a:p>
+            <a:r>
+              <a:rPr lang="en-US" sz="2000" dirty="0" smtClean="0">
+                <a:latin typeface="Consolas" pitchFamily="49" charset="0"/>
+                <a:cs typeface="Consolas" pitchFamily="49" charset="0"/>
+              </a:rPr>
+              <a:t>	virtual ~task(){}</a:t>
+            </a:r>
+          </a:p>
+          <a:p>
+            <a:r>
+              <a:rPr lang="en-US" sz="2000" dirty="0" smtClean="0">
+                <a:latin typeface="Consolas" pitchFamily="49" charset="0"/>
+                <a:cs typeface="Consolas" pitchFamily="49" charset="0"/>
+              </a:rPr>
+              <a:t>};</a:t>
+            </a:r>
+          </a:p>
+          <a:p>
+            <a:r>
+              <a:rPr lang="en-US" sz="2000" dirty="0" err="1" smtClean="0">
+                <a:latin typeface="Consolas" pitchFamily="49" charset="0"/>
+                <a:cs typeface="Consolas" pitchFamily="49" charset="0"/>
+              </a:rPr>
+              <a:t>typedef</a:t>
+            </a:r>
+            <a:r>
+              <a:rPr lang="en-US" sz="2000" dirty="0" smtClean="0">
+                <a:latin typeface="Consolas" pitchFamily="49" charset="0"/>
+                <a:cs typeface="Consolas" pitchFamily="49" charset="0"/>
+              </a:rPr>
+              <a:t> boost::</a:t>
+            </a:r>
+            <a:r>
+              <a:rPr lang="en-US" sz="2000" dirty="0" err="1" smtClean="0">
+                <a:latin typeface="Consolas" pitchFamily="49" charset="0"/>
+                <a:cs typeface="Consolas" pitchFamily="49" charset="0"/>
+              </a:rPr>
+              <a:t>shared_ptr</a:t>
+            </a:r>
+            <a:r>
+              <a:rPr lang="en-US" sz="2000" dirty="0" smtClean="0">
+                <a:latin typeface="Consolas" pitchFamily="49" charset="0"/>
+                <a:cs typeface="Consolas" pitchFamily="49" charset="0"/>
+              </a:rPr>
+              <a:t>&lt; task &gt; </a:t>
+            </a:r>
+            <a:r>
+              <a:rPr lang="en-US" sz="2000" dirty="0" err="1" smtClean="0">
+                <a:latin typeface="Consolas" pitchFamily="49" charset="0"/>
+                <a:cs typeface="Consolas" pitchFamily="49" charset="0"/>
+              </a:rPr>
+              <a:t>task_ptr</a:t>
+            </a:r>
+            <a:r>
+              <a:rPr lang="en-US" sz="2000" dirty="0" smtClean="0">
+                <a:latin typeface="Consolas" pitchFamily="49" charset="0"/>
+                <a:cs typeface="Consolas" pitchFamily="49" charset="0"/>
+              </a:rPr>
+              <a:t>;</a:t>
+            </a:r>
+            <a:endParaRPr lang="en-US" sz="2000" dirty="0" smtClean="0">
+              <a:latin typeface="Consolas" pitchFamily="49" charset="0"/>
+              <a:cs typeface="Consolas" pitchFamily="49" charset="0"/>
+            </a:endParaRPr>
+          </a:p>
+        </p:txBody>
+      </p:sp>
+    </p:spTree>
+  </p:cSld>
+  <p:clrMapOvr>
+    <a:masterClrMapping/>
+  </p:clrMapOvr>
+</p:sld>
+</file>
+
+<file path=ppt/slides/slide36.xml><?xml version="1.0" encoding="utf-8"?>
+<p:sld xmlns:a="http://schemas.openxmlformats.org/drawingml/2006/main" xmlns:r="http://schemas.openxmlformats.org/officeDocument/2006/relationships" xmlns:p="http://schemas.openxmlformats.org/presentationml/2006/main">
+  <p:cSld>
+    <p:spTree>
+      <p:nvGrpSpPr>
+        <p:cNvPr id="1" name=""/>
+        <p:cNvGrpSpPr/>
+        <p:nvPr/>
+      </p:nvGrpSpPr>
+      <p:grpSpPr>
+        <a:xfrm>
+          <a:off x="0" y="0"/>
+          <a:ext cx="0" cy="0"/>
+          <a:chOff x="0" y="0"/>
+          <a:chExt cx="0" cy="0"/>
+        </a:xfrm>
+      </p:grpSpPr>
+      <p:sp>
+        <p:nvSpPr>
+          <p:cNvPr id="2" name="Title 1"/>
+          <p:cNvSpPr>
+            <a:spLocks noGrp="1"/>
+          </p:cNvSpPr>
+          <p:nvPr>
+            <p:ph type="title"/>
+          </p:nvPr>
+        </p:nvSpPr>
+        <p:spPr/>
+        <p:txBody>
+          <a:bodyPr/>
+          <a:lstStyle/>
+          <a:p>
+            <a:r>
+              <a:rPr lang="en-US" dirty="0" smtClean="0"/>
+              <a:t>Task Processor</a:t>
+            </a:r>
+            <a:endParaRPr lang="en-US" dirty="0"/>
+          </a:p>
+        </p:txBody>
+      </p:sp>
+      <p:sp>
+        <p:nvSpPr>
+          <p:cNvPr id="3" name="Content Placeholder 2"/>
+          <p:cNvSpPr>
+            <a:spLocks noGrp="1"/>
+          </p:cNvSpPr>
+          <p:nvPr>
+            <p:ph idx="1"/>
+          </p:nvPr>
+        </p:nvSpPr>
+        <p:spPr/>
+        <p:txBody>
+          <a:bodyPr/>
+          <a:lstStyle/>
+          <a:p>
+            <a:endParaRPr lang="en-US"/>
+          </a:p>
+        </p:txBody>
+      </p:sp>
+      <p:sp>
+        <p:nvSpPr>
+          <p:cNvPr id="4" name="Rounded Rectangle 3"/>
+          <p:cNvSpPr/>
+          <p:nvPr/>
+        </p:nvSpPr>
+        <p:spPr>
+          <a:xfrm>
+            <a:off x="304800" y="1447800"/>
+            <a:ext cx="8534400" cy="4953000"/>
+          </a:xfrm>
+          <a:prstGeom prst="roundRect">
+            <a:avLst/>
+          </a:prstGeom>
+        </p:spPr>
+        <p:style>
+          <a:lnRef idx="2">
+            <a:schemeClr val="accent1">
+              <a:shade val="50000"/>
+            </a:schemeClr>
+          </a:lnRef>
+          <a:fillRef idx="1">
+            <a:schemeClr val="accent1"/>
+          </a:fillRef>
+          <a:effectRef idx="0">
+            <a:schemeClr val="accent1"/>
+          </a:effectRef>
+          <a:fontRef idx="minor">
+            <a:schemeClr val="lt1"/>
+          </a:fontRef>
+        </p:style>
+        <p:txBody>
+          <a:bodyPr rtlCol="0" anchor="ctr"/>
+          <a:lstStyle/>
+          <a:p>
+            <a:r>
+              <a:rPr lang="en-US" sz="1600" dirty="0" smtClean="0">
+                <a:latin typeface="Consolas" pitchFamily="49" charset="0"/>
+                <a:cs typeface="Consolas" pitchFamily="49" charset="0"/>
+              </a:rPr>
+              <a:t>template&lt; class T &gt;</a:t>
+            </a:r>
+          </a:p>
+          <a:p>
+            <a:r>
+              <a:rPr lang="en-US" sz="1600" dirty="0" smtClean="0">
+                <a:latin typeface="Consolas" pitchFamily="49" charset="0"/>
+                <a:cs typeface="Consolas" pitchFamily="49" charset="0"/>
+              </a:rPr>
+              <a:t>class </a:t>
+            </a:r>
+            <a:r>
+              <a:rPr lang="en-US" sz="1600" dirty="0" err="1" smtClean="0">
+                <a:latin typeface="Consolas" pitchFamily="49" charset="0"/>
+                <a:cs typeface="Consolas" pitchFamily="49" charset="0"/>
+              </a:rPr>
+              <a:t>task_processor</a:t>
+            </a:r>
+            <a:endParaRPr lang="en-US" sz="1600" dirty="0" smtClean="0">
+              <a:latin typeface="Consolas" pitchFamily="49" charset="0"/>
+              <a:cs typeface="Consolas" pitchFamily="49" charset="0"/>
+            </a:endParaRPr>
+          </a:p>
+          <a:p>
+            <a:r>
+              <a:rPr lang="en-US" sz="1600" dirty="0" smtClean="0">
+                <a:latin typeface="Consolas" pitchFamily="49" charset="0"/>
+                <a:cs typeface="Consolas" pitchFamily="49" charset="0"/>
+              </a:rPr>
+              <a:t>{</a:t>
+            </a:r>
+          </a:p>
+          <a:p>
+            <a:r>
+              <a:rPr lang="en-US" sz="1600" dirty="0" smtClean="0">
+                <a:latin typeface="Consolas" pitchFamily="49" charset="0"/>
+                <a:cs typeface="Consolas" pitchFamily="49" charset="0"/>
+              </a:rPr>
+              <a:t>    boost::</a:t>
+            </a:r>
+            <a:r>
+              <a:rPr lang="en-US" sz="1600" dirty="0" err="1" smtClean="0">
+                <a:latin typeface="Consolas" pitchFamily="49" charset="0"/>
+                <a:cs typeface="Consolas" pitchFamily="49" charset="0"/>
+              </a:rPr>
+              <a:t>thread_group</a:t>
+            </a:r>
+            <a:r>
+              <a:rPr lang="en-US" sz="1600" dirty="0" smtClean="0">
+                <a:latin typeface="Consolas" pitchFamily="49" charset="0"/>
+                <a:cs typeface="Consolas" pitchFamily="49" charset="0"/>
+              </a:rPr>
+              <a:t> processors_;</a:t>
+            </a:r>
+          </a:p>
+          <a:p>
+            <a:r>
+              <a:rPr lang="en-US" sz="1600" dirty="0" smtClean="0">
+                <a:latin typeface="Consolas" pitchFamily="49" charset="0"/>
+                <a:cs typeface="Consolas" pitchFamily="49" charset="0"/>
+              </a:rPr>
+              <a:t> </a:t>
+            </a:r>
+            <a:r>
+              <a:rPr lang="en-US" sz="1600" dirty="0" smtClean="0">
+                <a:latin typeface="Consolas" pitchFamily="49" charset="0"/>
+                <a:cs typeface="Consolas" pitchFamily="49" charset="0"/>
+              </a:rPr>
+              <a:t>   </a:t>
+            </a:r>
+            <a:r>
+              <a:rPr lang="en-US" sz="1600" dirty="0" err="1" smtClean="0">
+                <a:latin typeface="Consolas" pitchFamily="49" charset="0"/>
+                <a:cs typeface="Consolas" pitchFamily="49" charset="0"/>
+              </a:rPr>
+              <a:t>ts_queue</a:t>
+            </a:r>
+            <a:r>
+              <a:rPr lang="en-US" sz="1600" dirty="0" smtClean="0">
+                <a:latin typeface="Consolas" pitchFamily="49" charset="0"/>
+                <a:cs typeface="Consolas" pitchFamily="49" charset="0"/>
+              </a:rPr>
+              <a:t>&lt; </a:t>
+            </a:r>
+            <a:r>
+              <a:rPr lang="en-US" sz="1600" dirty="0" err="1" smtClean="0">
+                <a:latin typeface="Consolas" pitchFamily="49" charset="0"/>
+                <a:cs typeface="Consolas" pitchFamily="49" charset="0"/>
+              </a:rPr>
+              <a:t>task_ptr</a:t>
+            </a:r>
+            <a:r>
+              <a:rPr lang="en-US" sz="1600" dirty="0" smtClean="0">
+                <a:latin typeface="Consolas" pitchFamily="49" charset="0"/>
+                <a:cs typeface="Consolas" pitchFamily="49" charset="0"/>
+              </a:rPr>
+              <a:t> &gt; queue;</a:t>
+            </a:r>
+          </a:p>
+          <a:p>
+            <a:r>
+              <a:rPr lang="en-US" sz="1600" dirty="0" smtClean="0">
+                <a:latin typeface="Consolas" pitchFamily="49" charset="0"/>
+                <a:cs typeface="Consolas" pitchFamily="49" charset="0"/>
+              </a:rPr>
+              <a:t>    void processing()</a:t>
+            </a:r>
+          </a:p>
+          <a:p>
+            <a:r>
+              <a:rPr lang="en-US" sz="1600" dirty="0" smtClean="0">
+                <a:latin typeface="Consolas" pitchFamily="49" charset="0"/>
+                <a:cs typeface="Consolas" pitchFamily="49" charset="0"/>
+              </a:rPr>
+              <a:t>    {</a:t>
+            </a:r>
+          </a:p>
+          <a:p>
+            <a:r>
+              <a:rPr lang="en-US" sz="1600" dirty="0" smtClean="0">
+                <a:latin typeface="Consolas" pitchFamily="49" charset="0"/>
+                <a:cs typeface="Consolas" pitchFamily="49" charset="0"/>
+              </a:rPr>
+              <a:t>        while (!stop)</a:t>
+            </a:r>
+          </a:p>
+          <a:p>
+            <a:r>
+              <a:rPr lang="en-US" sz="1600" dirty="0" smtClean="0">
+                <a:latin typeface="Consolas" pitchFamily="49" charset="0"/>
+                <a:cs typeface="Consolas" pitchFamily="49" charset="0"/>
+              </a:rPr>
+              <a:t> </a:t>
+            </a:r>
+            <a:r>
+              <a:rPr lang="en-US" sz="1600" dirty="0" smtClean="0">
+                <a:latin typeface="Consolas" pitchFamily="49" charset="0"/>
+                <a:cs typeface="Consolas" pitchFamily="49" charset="0"/>
+              </a:rPr>
+              <a:t>       {</a:t>
+            </a:r>
+          </a:p>
+          <a:p>
+            <a:r>
+              <a:rPr lang="en-US" sz="1600" dirty="0" smtClean="0">
+                <a:latin typeface="Consolas" pitchFamily="49" charset="0"/>
+                <a:cs typeface="Consolas" pitchFamily="49" charset="0"/>
+              </a:rPr>
+              <a:t>		</a:t>
+            </a:r>
+            <a:r>
+              <a:rPr lang="en-US" sz="1600" dirty="0" err="1" smtClean="0">
+                <a:latin typeface="Consolas" pitchFamily="49" charset="0"/>
+                <a:cs typeface="Consolas" pitchFamily="49" charset="0"/>
+              </a:rPr>
+              <a:t>task_ptr</a:t>
+            </a:r>
+            <a:r>
+              <a:rPr lang="en-US" sz="1600" dirty="0" smtClean="0">
+                <a:latin typeface="Consolas" pitchFamily="49" charset="0"/>
+                <a:cs typeface="Consolas" pitchFamily="49" charset="0"/>
+              </a:rPr>
+              <a:t> t = queue.pop(); // magic</a:t>
+            </a:r>
+          </a:p>
+          <a:p>
+            <a:r>
+              <a:rPr lang="en-US" sz="1600" dirty="0" smtClean="0">
+                <a:latin typeface="Consolas" pitchFamily="49" charset="0"/>
+                <a:cs typeface="Consolas" pitchFamily="49" charset="0"/>
+              </a:rPr>
+              <a:t>	</a:t>
+            </a:r>
+            <a:r>
+              <a:rPr lang="en-US" sz="1600" dirty="0" smtClean="0">
+                <a:latin typeface="Consolas" pitchFamily="49" charset="0"/>
+                <a:cs typeface="Consolas" pitchFamily="49" charset="0"/>
+              </a:rPr>
+              <a:t>	</a:t>
+            </a:r>
+            <a:r>
+              <a:rPr lang="en-US" sz="1600" dirty="0" err="1" smtClean="0">
+                <a:latin typeface="Consolas" pitchFamily="49" charset="0"/>
+                <a:cs typeface="Consolas" pitchFamily="49" charset="0"/>
+              </a:rPr>
+              <a:t>t.do_job</a:t>
+            </a:r>
+            <a:r>
+              <a:rPr lang="en-US" sz="1600" dirty="0" smtClean="0">
+                <a:latin typeface="Consolas" pitchFamily="49" charset="0"/>
+                <a:cs typeface="Consolas" pitchFamily="49" charset="0"/>
+              </a:rPr>
+              <a:t>();</a:t>
+            </a:r>
+          </a:p>
+          <a:p>
+            <a:r>
+              <a:rPr lang="en-US" sz="1600" dirty="0" smtClean="0">
+                <a:latin typeface="Consolas" pitchFamily="49" charset="0"/>
+                <a:cs typeface="Consolas" pitchFamily="49" charset="0"/>
+              </a:rPr>
+              <a:t> </a:t>
+            </a:r>
+            <a:r>
+              <a:rPr lang="en-US" sz="1600" dirty="0" smtClean="0">
+                <a:latin typeface="Consolas" pitchFamily="49" charset="0"/>
+                <a:cs typeface="Consolas" pitchFamily="49" charset="0"/>
+              </a:rPr>
+              <a:t>       }</a:t>
+            </a:r>
+            <a:br>
+              <a:rPr lang="en-US" sz="1600" dirty="0" smtClean="0">
+                <a:latin typeface="Consolas" pitchFamily="49" charset="0"/>
+                <a:cs typeface="Consolas" pitchFamily="49" charset="0"/>
+              </a:rPr>
+            </a:br>
+            <a:r>
+              <a:rPr lang="en-US" sz="1600" dirty="0" smtClean="0">
+                <a:latin typeface="Consolas" pitchFamily="49" charset="0"/>
+                <a:cs typeface="Consolas" pitchFamily="49" charset="0"/>
+              </a:rPr>
+              <a:t>    }</a:t>
+            </a:r>
+          </a:p>
+          <a:p>
+            <a:r>
+              <a:rPr lang="en-US" sz="1600" dirty="0" smtClean="0">
+                <a:latin typeface="Consolas" pitchFamily="49" charset="0"/>
+                <a:cs typeface="Consolas" pitchFamily="49" charset="0"/>
+              </a:rPr>
+              <a:t> </a:t>
+            </a:r>
+            <a:r>
+              <a:rPr lang="en-US" sz="1600" dirty="0" smtClean="0">
+                <a:latin typeface="Consolas" pitchFamily="49" charset="0"/>
+                <a:cs typeface="Consolas" pitchFamily="49" charset="0"/>
+              </a:rPr>
+              <a:t>   </a:t>
+            </a:r>
+            <a:r>
+              <a:rPr lang="en-US" sz="1600" dirty="0" err="1" smtClean="0">
+                <a:latin typeface="Consolas" pitchFamily="49" charset="0"/>
+                <a:cs typeface="Consolas" pitchFamily="49" charset="0"/>
+              </a:rPr>
+              <a:t>task_processor</a:t>
+            </a:r>
+            <a:r>
+              <a:rPr lang="en-US" sz="1600" dirty="0" smtClean="0">
+                <a:latin typeface="Consolas" pitchFamily="49" charset="0"/>
+                <a:cs typeface="Consolas" pitchFamily="49" charset="0"/>
+              </a:rPr>
+              <a:t>( const </a:t>
+            </a:r>
+            <a:r>
+              <a:rPr lang="en-US" sz="1600" dirty="0" err="1" smtClean="0">
+                <a:latin typeface="Consolas" pitchFamily="49" charset="0"/>
+                <a:cs typeface="Consolas" pitchFamily="49" charset="0"/>
+              </a:rPr>
+              <a:t>size_t</a:t>
+            </a:r>
+            <a:r>
+              <a:rPr lang="en-US" sz="1600" dirty="0" smtClean="0">
+                <a:latin typeface="Consolas" pitchFamily="49" charset="0"/>
+                <a:cs typeface="Consolas" pitchFamily="49" charset="0"/>
+              </a:rPr>
+              <a:t> N = 4 )</a:t>
+            </a:r>
+          </a:p>
+          <a:p>
+            <a:r>
+              <a:rPr lang="en-US" sz="1600" dirty="0" smtClean="0">
+                <a:latin typeface="Consolas" pitchFamily="49" charset="0"/>
+                <a:cs typeface="Consolas" pitchFamily="49" charset="0"/>
+              </a:rPr>
+              <a:t> </a:t>
+            </a:r>
+            <a:r>
+              <a:rPr lang="en-US" sz="1600" dirty="0" smtClean="0">
+                <a:latin typeface="Consolas" pitchFamily="49" charset="0"/>
+                <a:cs typeface="Consolas" pitchFamily="49" charset="0"/>
+              </a:rPr>
+              <a:t>   { </a:t>
+            </a:r>
+          </a:p>
+          <a:p>
+            <a:r>
+              <a:rPr lang="en-US" sz="1600" dirty="0" smtClean="0">
+                <a:latin typeface="Consolas" pitchFamily="49" charset="0"/>
+                <a:cs typeface="Consolas" pitchFamily="49" charset="0"/>
+              </a:rPr>
+              <a:t>	</a:t>
+            </a:r>
+            <a:r>
+              <a:rPr lang="en-US" sz="1600" dirty="0" smtClean="0">
+                <a:latin typeface="Consolas" pitchFamily="49" charset="0"/>
+                <a:cs typeface="Consolas" pitchFamily="49" charset="0"/>
+              </a:rPr>
+              <a:t>  // create threads</a:t>
+            </a:r>
+          </a:p>
+          <a:p>
+            <a:r>
+              <a:rPr lang="en-US" sz="1600" dirty="0" smtClean="0">
+                <a:latin typeface="Consolas" pitchFamily="49" charset="0"/>
+                <a:cs typeface="Consolas" pitchFamily="49" charset="0"/>
+              </a:rPr>
+              <a:t> </a:t>
+            </a:r>
+            <a:r>
+              <a:rPr lang="en-US" sz="1600" dirty="0" smtClean="0">
+                <a:latin typeface="Consolas" pitchFamily="49" charset="0"/>
+                <a:cs typeface="Consolas" pitchFamily="49" charset="0"/>
+              </a:rPr>
+              <a:t>   }</a:t>
+            </a:r>
+          </a:p>
+          <a:p>
+            <a:r>
+              <a:rPr lang="en-US" sz="1600" dirty="0" smtClean="0">
+                <a:latin typeface="Consolas" pitchFamily="49" charset="0"/>
+                <a:cs typeface="Consolas" pitchFamily="49" charset="0"/>
+              </a:rPr>
+              <a:t>};</a:t>
+            </a:r>
+          </a:p>
+        </p:txBody>
+      </p:sp>
+    </p:spTree>
+  </p:cSld>
+  <p:clrMapOvr>
+    <a:masterClrMapping/>
+  </p:clrMapOvr>
+</p:sld>
+</file>
+
+<file path=ppt/slides/slide37.xml><?xml version="1.0" encoding="utf-8"?>
+<p:sld xmlns:a="http://schemas.openxmlformats.org/drawingml/2006/main" xmlns:r="http://schemas.openxmlformats.org/officeDocument/2006/relationships" xmlns:p="http://schemas.openxmlformats.org/presentationml/2006/main">
+  <p:cSld>
+    <p:spTree>
+      <p:nvGrpSpPr>
+        <p:cNvPr id="1" name=""/>
+        <p:cNvGrpSpPr/>
+        <p:nvPr/>
+      </p:nvGrpSpPr>
+      <p:grpSpPr>
+        <a:xfrm>
+          <a:off x="0" y="0"/>
+          <a:ext cx="0" cy="0"/>
+          <a:chOff x="0" y="0"/>
+          <a:chExt cx="0" cy="0"/>
+        </a:xfrm>
+      </p:grpSpPr>
+      <p:sp>
+        <p:nvSpPr>
+          <p:cNvPr id="2" name="Title 1"/>
+          <p:cNvSpPr>
+            <a:spLocks noGrp="1"/>
+          </p:cNvSpPr>
+          <p:nvPr>
+            <p:ph type="title"/>
+          </p:nvPr>
+        </p:nvSpPr>
+        <p:spPr/>
+        <p:txBody>
+          <a:bodyPr/>
+          <a:lstStyle/>
+          <a:p>
+            <a:endParaRPr lang="en-US" dirty="0"/>
+          </a:p>
+        </p:txBody>
+      </p:sp>
+      <p:sp>
+        <p:nvSpPr>
+          <p:cNvPr id="3" name="Content Placeholder 2"/>
+          <p:cNvSpPr>
+            <a:spLocks noGrp="1"/>
+          </p:cNvSpPr>
+          <p:nvPr>
+            <p:ph idx="1"/>
+          </p:nvPr>
+        </p:nvSpPr>
+        <p:spPr/>
+        <p:txBody>
+          <a:bodyPr/>
+          <a:lstStyle/>
+          <a:p>
+            <a:endParaRPr lang="en-US"/>
+          </a:p>
+        </p:txBody>
+      </p:sp>
+      <p:sp>
+        <p:nvSpPr>
+          <p:cNvPr id="4" name="Title 1"/>
+          <p:cNvSpPr txBox="1">
+            <a:spLocks/>
+          </p:cNvSpPr>
+          <p:nvPr/>
+        </p:nvSpPr>
+        <p:spPr>
+          <a:xfrm>
+            <a:off x="457200" y="2819400"/>
+            <a:ext cx="8229600" cy="1143000"/>
+          </a:xfrm>
+          <a:prstGeom prst="rect">
+            <a:avLst/>
+          </a:prstGeom>
+        </p:spPr>
+        <p:txBody>
+          <a:bodyPr vert="horz" lIns="91440" tIns="45720" rIns="91440" bIns="45720" rtlCol="0" anchor="ctr">
+            <a:noAutofit/>
+          </a:bodyPr>
+          <a:lstStyle/>
+          <a:p>
+            <a:pPr marL="0" marR="0" lvl="0" indent="0" algn="ctr" defTabSz="914400" rtl="0" eaLnBrk="1" fontAlgn="auto" latinLnBrk="0" hangingPunct="1">
+              <a:lnSpc>
+                <a:spcPct val="100000"/>
+              </a:lnSpc>
+              <a:spcBef>
+                <a:spcPct val="0"/>
+              </a:spcBef>
+              <a:spcAft>
+                <a:spcPts val="0"/>
+              </a:spcAft>
+              <a:buClrTx/>
+              <a:buSzTx/>
+              <a:buFontTx/>
+              <a:buNone/>
+              <a:tabLst/>
+              <a:defRPr/>
+            </a:pPr>
+            <a:r>
+              <a:rPr kumimoji="0" lang="en-US" sz="9600" b="0" i="0" u="none" strike="noStrike" kern="1200" cap="none" spc="0" normalizeH="0" baseline="0" noProof="0" dirty="0" smtClean="0">
+                <a:ln>
+                  <a:noFill/>
+                </a:ln>
+                <a:solidFill>
+                  <a:schemeClr val="tx1"/>
+                </a:solidFill>
+                <a:effectLst/>
+                <a:uLnTx/>
+                <a:uFillTx/>
+                <a:latin typeface="+mj-lt"/>
+                <a:ea typeface="+mj-ea"/>
+                <a:cs typeface="+mj-cs"/>
+              </a:rPr>
+              <a:t>?</a:t>
+            </a:r>
+            <a:endParaRPr kumimoji="0" lang="en-US" sz="9600" b="0" i="0" u="none" strike="noStrike" kern="1200" cap="none" spc="0" normalizeH="0" baseline="0" noProof="0" dirty="0">
+              <a:ln>
+                <a:noFill/>
+              </a:ln>
+              <a:solidFill>
+                <a:schemeClr val="tx1"/>
+              </a:solidFill>
+              <a:effectLst/>
+              <a:uLnTx/>
+              <a:uFillTx/>
+              <a:latin typeface="+mj-lt"/>
+              <a:ea typeface="+mj-ea"/>
+              <a:cs typeface="+mj-cs"/>
+            </a:endParaRPr>
+          </a:p>
+        </p:txBody>
+      </p:sp>
+    </p:spTree>
+  </p:cSld>
+  <p:clrMapOvr>
+    <a:masterClrMapping/>
+  </p:clrMapOvr>
+</p:sld>
+</file>
+
 <file path=ppt/slides/slide4.xml><?xml version="1.0" encoding="utf-8"?>
 <p:sld xmlns:a="http://schemas.openxmlformats.org/drawingml/2006/main" xmlns:r="http://schemas.openxmlformats.org/officeDocument/2006/relationships" xmlns:p="http://schemas.openxmlformats.org/presentationml/2006/main">
   <p:cSld>
@@ -19797,11 +23811,7 @@
           <a:p>
             <a:r>
               <a:rPr lang="en-US" dirty="0" smtClean="0"/>
-              <a:t>IEEE 802.15 (Bluetooth</a:t>
-            </a:r>
-            <a:r>
-              <a:rPr lang="en-US" dirty="0" smtClean="0"/>
-              <a:t>)</a:t>
+              <a:t>IEEE 802.15 (Bluetooth)</a:t>
             </a:r>
           </a:p>
           <a:p>
@@ -20083,13 +24093,7 @@
               <a:rPr lang="en-US" dirty="0" smtClean="0">
                 <a:hlinkClick r:id="rId2"/>
               </a:rPr>
-              <a:t>http://</a:t>
-            </a:r>
-            <a:r>
-              <a:rPr lang="en-US" dirty="0" smtClean="0">
-                <a:hlinkClick r:id="rId2"/>
-              </a:rPr>
-              <a:t>ru.wikipedia.org/wiki/Maximum_transmission_unit</a:t>
+              <a:t>http://ru.wikipedia.org/wiki/Maximum_transmission_unit</a:t>
             </a:r>
             <a:endParaRPr lang="en-US" dirty="0" smtClean="0"/>
           </a:p>
@@ -20233,13 +24237,7 @@
               <a:rPr lang="en-US" dirty="0" smtClean="0">
                 <a:hlinkClick r:id="rId3"/>
               </a:rPr>
-              <a:t>http://</a:t>
-            </a:r>
-            <a:r>
-              <a:rPr lang="en-US" dirty="0" smtClean="0">
-                <a:hlinkClick r:id="rId3"/>
-              </a:rPr>
-              <a:t>ru.wikipedia.org/wiki/Logical_link_control</a:t>
+              <a:t>http://ru.wikipedia.org/wiki/Logical_link_control</a:t>
             </a:r>
             <a:endParaRPr lang="en-US" dirty="0" smtClean="0"/>
           </a:p>
@@ -20383,13 +24381,7 @@
               <a:rPr lang="en-US" dirty="0" smtClean="0">
                 <a:hlinkClick r:id="rId3"/>
               </a:rPr>
-              <a:t>http://</a:t>
-            </a:r>
-            <a:r>
-              <a:rPr lang="en-US" dirty="0" smtClean="0">
-                <a:hlinkClick r:id="rId3"/>
-              </a:rPr>
-              <a:t>ru.wikipedia.org/wiki/Ethernet</a:t>
+              <a:t>http://ru.wikipedia.org/wiki/Ethernet</a:t>
             </a:r>
             <a:endParaRPr lang="en-US" dirty="0" smtClean="0"/>
           </a:p>

</xml_diff>